<commit_message>
Sikkerhet i Azure slide har fått litt informasjon
</commit_message>
<xml_diff>
--- a/Workshop_3/Presentasjon/Azureskolen-Workshop#3.pptx
+++ b/Workshop_3/Presentasjon/Azureskolen-Workshop#3.pptx
@@ -1151,6 +1151,173 @@
           <a:p>
             <a:r>
               <a:rPr lang="nb-NO" dirty="0"/>
+              <a:t>Lagvis sikkerhet:</a:t>
+            </a:r>
+            <a:br>
+              <a:rPr lang="nb-NO" dirty="0"/>
+            </a:br>
+            <a:r>
+              <a:rPr lang="nb-NO" dirty="0" err="1"/>
+              <a:t>Physical</a:t>
+            </a:r>
+            <a:r>
+              <a:rPr lang="nb-NO" dirty="0"/>
+              <a:t> Security (Fysisk sikring)</a:t>
+            </a:r>
+          </a:p>
+          <a:p>
+            <a:r>
+              <a:rPr lang="nb-NO" dirty="0"/>
+              <a:t>Identity and Access (identitet og tilgangskontroll)</a:t>
+            </a:r>
+          </a:p>
+          <a:p>
+            <a:r>
+              <a:rPr lang="nb-NO" dirty="0"/>
+              <a:t>Perimeter</a:t>
+            </a:r>
+          </a:p>
+          <a:p>
+            <a:r>
+              <a:rPr lang="nb-NO" dirty="0"/>
+              <a:t>Network</a:t>
+            </a:r>
+          </a:p>
+          <a:p>
+            <a:r>
+              <a:rPr lang="nb-NO" dirty="0" err="1"/>
+              <a:t>Compute</a:t>
+            </a:r>
+            <a:endParaRPr lang="nb-NO" dirty="0"/>
+          </a:p>
+          <a:p>
+            <a:r>
+              <a:rPr lang="nb-NO" dirty="0"/>
+              <a:t>Application</a:t>
+            </a:r>
+          </a:p>
+          <a:p>
+            <a:r>
+              <a:rPr lang="nb-NO" dirty="0"/>
+              <a:t>Data</a:t>
+            </a:r>
+          </a:p>
+          <a:p>
+            <a:endParaRPr lang="nb-NO" dirty="0"/>
+          </a:p>
+          <a:p>
+            <a:r>
+              <a:rPr lang="nb-NO" dirty="0"/>
+              <a:t>Zero trust </a:t>
+            </a:r>
+            <a:r>
+              <a:rPr lang="nb-NO" dirty="0" err="1"/>
+              <a:t>model</a:t>
+            </a:r>
+            <a:r>
+              <a:rPr lang="nb-NO" dirty="0"/>
+              <a:t>:</a:t>
+            </a:r>
+          </a:p>
+          <a:p>
+            <a:r>
+              <a:rPr lang="en-US" sz="1200" b="0" i="0" kern="1200" dirty="0">
+                <a:solidFill>
+                  <a:schemeClr val="tx1"/>
+                </a:solidFill>
+                <a:effectLst/>
+                <a:latin typeface="+mn-lt"/>
+                <a:ea typeface="+mn-ea"/>
+                <a:cs typeface="+mn-cs"/>
+              </a:rPr>
+              <a:t>which states that you should never assume trust but instead continually validate trust. </a:t>
+            </a:r>
+            <a:endParaRPr lang="nb-NO" dirty="0"/>
+          </a:p>
+        </p:txBody>
+      </p:sp>
+      <p:sp>
+        <p:nvSpPr>
+          <p:cNvPr id="4" name="Slide Number Placeholder 3"/>
+          <p:cNvSpPr>
+            <a:spLocks noGrp="1"/>
+          </p:cNvSpPr>
+          <p:nvPr>
+            <p:ph type="sldNum" sz="quarter" idx="5"/>
+          </p:nvPr>
+        </p:nvSpPr>
+        <p:spPr/>
+        <p:txBody>
+          <a:bodyPr/>
+          <a:lstStyle/>
+          <a:p>
+            <a:fld id="{180377DB-C4B0-49B2-8838-0F01BA83B7C4}" type="slidenum">
+              <a:rPr lang="nb-NO" smtClean="0"/>
+              <a:t>5</a:t>
+            </a:fld>
+            <a:endParaRPr lang="nb-NO"/>
+          </a:p>
+        </p:txBody>
+      </p:sp>
+    </p:spTree>
+    <p:extLst>
+      <p:ext uri="{BB962C8B-B14F-4D97-AF65-F5344CB8AC3E}">
+        <p14:creationId xmlns:p14="http://schemas.microsoft.com/office/powerpoint/2010/main" val="629287430"/>
+      </p:ext>
+    </p:extLst>
+  </p:cSld>
+  <p:clrMapOvr>
+    <a:masterClrMapping/>
+  </p:clrMapOvr>
+</p:notes>
+</file>
+
+<file path=ppt/notesSlides/notesSlide3.xml><?xml version="1.0" encoding="utf-8"?>
+<p:notes xmlns:a="http://schemas.openxmlformats.org/drawingml/2006/main" xmlns:r="http://schemas.openxmlformats.org/officeDocument/2006/relationships" xmlns:p="http://schemas.openxmlformats.org/presentationml/2006/main">
+  <p:cSld>
+    <p:spTree>
+      <p:nvGrpSpPr>
+        <p:cNvPr id="1" name=""/>
+        <p:cNvGrpSpPr/>
+        <p:nvPr/>
+      </p:nvGrpSpPr>
+      <p:grpSpPr>
+        <a:xfrm>
+          <a:off x="0" y="0"/>
+          <a:ext cx="0" cy="0"/>
+          <a:chOff x="0" y="0"/>
+          <a:chExt cx="0" cy="0"/>
+        </a:xfrm>
+      </p:grpSpPr>
+      <p:sp>
+        <p:nvSpPr>
+          <p:cNvPr id="2" name="Slide Image Placeholder 1"/>
+          <p:cNvSpPr>
+            <a:spLocks noGrp="1" noRot="1" noChangeAspect="1"/>
+          </p:cNvSpPr>
+          <p:nvPr>
+            <p:ph type="sldImg"/>
+          </p:nvPr>
+        </p:nvSpPr>
+        <p:spPr/>
+      </p:sp>
+      <p:sp>
+        <p:nvSpPr>
+          <p:cNvPr id="3" name="Notes Placeholder 2"/>
+          <p:cNvSpPr>
+            <a:spLocks noGrp="1"/>
+          </p:cNvSpPr>
+          <p:nvPr>
+            <p:ph type="body" idx="1"/>
+          </p:nvPr>
+        </p:nvSpPr>
+        <p:spPr/>
+        <p:txBody>
+          <a:bodyPr/>
+          <a:lstStyle/>
+          <a:p>
+            <a:r>
+              <a:rPr lang="nb-NO" dirty="0"/>
               <a:t>Vise </a:t>
             </a:r>
             <a:r>
@@ -10886,22 +11053,13 @@
           <a:p>
             <a:r>
               <a:rPr lang="nb-NO" dirty="0"/>
-              <a:t>Leksjon 3 : </a:t>
+              <a:t>Bonus-leksjon: Sas-token og </a:t>
             </a:r>
             <a:r>
               <a:rPr lang="nb-NO" dirty="0" err="1"/>
-              <a:t>Monitorering</a:t>
-            </a:r>
-            <a:r>
-              <a:rPr lang="nb-NO" dirty="0"/>
-              <a:t> og telemetri: Application Insights</a:t>
-            </a:r>
-          </a:p>
-          <a:p>
-            <a:r>
-              <a:rPr lang="nb-NO" dirty="0"/>
-              <a:t>Bonus-leksjon:</a:t>
-            </a:r>
+              <a:t>vnet</a:t>
+            </a:r>
+            <a:endParaRPr lang="nb-NO" dirty="0"/>
           </a:p>
         </p:txBody>
       </p:sp>
@@ -10978,6 +11136,102 @@
           <a:bodyPr/>
           <a:lstStyle/>
           <a:p>
+            <a:r>
+              <a:rPr lang="nb-NO" dirty="0"/>
+              <a:t>Lagvis sikkerhet</a:t>
+            </a:r>
+          </a:p>
+          <a:p>
+            <a:r>
+              <a:rPr lang="nb-NO" dirty="0"/>
+              <a:t>Zero Trust </a:t>
+            </a:r>
+            <a:r>
+              <a:rPr lang="nb-NO" dirty="0" err="1"/>
+              <a:t>model</a:t>
+            </a:r>
+            <a:endParaRPr lang="nb-NO" dirty="0"/>
+          </a:p>
+          <a:p>
+            <a:r>
+              <a:rPr lang="nb-NO" dirty="0"/>
+              <a:t>Hva ønsker man å beskytte?</a:t>
+            </a:r>
+          </a:p>
+          <a:p>
+            <a:pPr lvl="1"/>
+            <a:r>
+              <a:rPr lang="nb-NO" dirty="0"/>
+              <a:t>Data/informasjon</a:t>
+            </a:r>
+          </a:p>
+          <a:p>
+            <a:r>
+              <a:rPr lang="nb-NO" dirty="0"/>
+              <a:t>Delt ansvar</a:t>
+            </a:r>
+          </a:p>
+          <a:p>
+            <a:pPr lvl="1"/>
+            <a:r>
+              <a:rPr lang="nb-NO" dirty="0"/>
+              <a:t>Hva tar </a:t>
+            </a:r>
+            <a:r>
+              <a:rPr lang="nb-NO" dirty="0" err="1"/>
+              <a:t>Azure</a:t>
+            </a:r>
+            <a:r>
+              <a:rPr lang="nb-NO" dirty="0"/>
+              <a:t> ansvar for?</a:t>
+            </a:r>
+          </a:p>
+          <a:p>
+            <a:pPr lvl="1"/>
+            <a:r>
+              <a:rPr lang="nb-NO" dirty="0"/>
+              <a:t>Hva har du ansvar for?</a:t>
+            </a:r>
+          </a:p>
+          <a:p>
+            <a:pPr lvl="1"/>
+            <a:r>
+              <a:rPr lang="nb-NO" dirty="0" err="1"/>
+              <a:t>PaaS</a:t>
+            </a:r>
+            <a:r>
+              <a:rPr lang="nb-NO" dirty="0"/>
+              <a:t>, </a:t>
+            </a:r>
+            <a:r>
+              <a:rPr lang="nb-NO" dirty="0" err="1"/>
+              <a:t>SaaS</a:t>
+            </a:r>
+            <a:r>
+              <a:rPr lang="nb-NO" dirty="0"/>
+              <a:t> eller </a:t>
+            </a:r>
+            <a:r>
+              <a:rPr lang="nb-NO" dirty="0" err="1"/>
+              <a:t>IaaS</a:t>
+            </a:r>
+            <a:endParaRPr lang="nb-NO" dirty="0"/>
+          </a:p>
+          <a:p>
+            <a:r>
+              <a:rPr lang="nb-NO" dirty="0"/>
+              <a:t>SSO</a:t>
+            </a:r>
+          </a:p>
+          <a:p>
+            <a:pPr lvl="1"/>
+            <a:r>
+              <a:rPr lang="nb-NO" dirty="0"/>
+              <a:t>Færre brukere, mer sikkert?</a:t>
+            </a:r>
+          </a:p>
+          <a:p>
+            <a:pPr lvl="1"/>
             <a:endParaRPr lang="nb-NO" dirty="0"/>
           </a:p>
         </p:txBody>
@@ -12904,15 +13158,6 @@
 </file>
 
 <file path=customXml/item2.xml><?xml version="1.0" encoding="utf-8"?>
-<?mso-contentType ?>
-<FormTemplates xmlns="http://schemas.microsoft.com/sharepoint/v3/contenttype/forms">
-  <Display>DocumentLibraryForm</Display>
-  <Edit>DocumentLibraryForm</Edit>
-  <New>DocumentLibraryForm</New>
-</FormTemplates>
-</file>
-
-<file path=customXml/item3.xml><?xml version="1.0" encoding="utf-8"?>
 <ct:contentTypeSchema xmlns:ct="http://schemas.microsoft.com/office/2006/metadata/contentType" xmlns:ma="http://schemas.microsoft.com/office/2006/metadata/properties/metaAttributes" ct:_="" ma:_="" ma:contentTypeName="Document" ma:contentTypeID="0x0101005D3CE5A03C88D04F8FE0CC8617320B29" ma:contentTypeVersion="2" ma:contentTypeDescription="Create a new document." ma:contentTypeScope="" ma:versionID="23c508fadb5761cd27fdc7efc393bb78">
   <xsd:schema xmlns:xsd="http://www.w3.org/2001/XMLSchema" xmlns:xs="http://www.w3.org/2001/XMLSchema" xmlns:p="http://schemas.microsoft.com/office/2006/metadata/properties" xmlns:ns2="323bcd62-7d27-4513-9df1-9bc20f03554b" targetNamespace="http://schemas.microsoft.com/office/2006/metadata/properties" ma:root="true" ma:fieldsID="4120a6a9df7c81c23a4d646d2ccf1355" ns2:_="">
     <xsd:import namespace="323bcd62-7d27-4513-9df1-9bc20f03554b"/>
@@ -13044,6 +13289,15 @@
 </ct:contentTypeSchema>
 </file>
 
+<file path=customXml/item3.xml><?xml version="1.0" encoding="utf-8"?>
+<?mso-contentType ?>
+<FormTemplates xmlns="http://schemas.microsoft.com/sharepoint/v3/contenttype/forms">
+  <Display>DocumentLibraryForm</Display>
+  <Edit>DocumentLibraryForm</Edit>
+  <New>DocumentLibraryForm</New>
+</FormTemplates>
+</file>
+
 <file path=customXml/itemProps1.xml><?xml version="1.0" encoding="utf-8"?>
 <ds:datastoreItem xmlns:ds="http://schemas.openxmlformats.org/officeDocument/2006/customXml" ds:itemID="{9D2CB842-18D5-4EEF-9009-B0CAFCE7AC3E}">
   <ds:schemaRefs>
@@ -13062,14 +13316,6 @@
 </file>
 
 <file path=customXml/itemProps2.xml><?xml version="1.0" encoding="utf-8"?>
-<ds:datastoreItem xmlns:ds="http://schemas.openxmlformats.org/officeDocument/2006/customXml" ds:itemID="{BB82CC63-55FC-4D22-9ED3-DB88AF6228E1}">
-  <ds:schemaRefs>
-    <ds:schemaRef ds:uri="http://schemas.microsoft.com/sharepoint/v3/contenttype/forms"/>
-  </ds:schemaRefs>
-</ds:datastoreItem>
-</file>
-
-<file path=customXml/itemProps3.xml><?xml version="1.0" encoding="utf-8"?>
 <ds:datastoreItem xmlns:ds="http://schemas.openxmlformats.org/officeDocument/2006/customXml" ds:itemID="{0377EA4A-9170-43AD-A052-6EABC948F73F}">
   <ds:schemaRefs>
     <ds:schemaRef ds:uri="http://schemas.microsoft.com/office/2006/metadata/contentType"/>
@@ -13085,4 +13331,12 @@
     <ds:schemaRef ds:uri="http://schemas.microsoft.com/internal/obd"/>
   </ds:schemaRefs>
 </ds:datastoreItem>
+</file>
+
+<file path=customXml/itemProps3.xml><?xml version="1.0" encoding="utf-8"?>
+<ds:datastoreItem xmlns:ds="http://schemas.openxmlformats.org/officeDocument/2006/customXml" ds:itemID="{BB82CC63-55FC-4D22-9ED3-DB88AF6228E1}">
+  <ds:schemaRefs>
+    <ds:schemaRef ds:uri="http://schemas.microsoft.com/sharepoint/v3/contenttype/forms"/>
+  </ds:schemaRefs>
+</ds:datastoreItem>
 </file>
</xml_diff>

<commit_message>
Updated draft on presentation
</commit_message>
<xml_diff>
--- a/Workshop_3/Presentasjon/Azureskolen-Workshop#3.pptx
+++ b/Workshop_3/Presentasjon/Azureskolen-Workshop#3.pptx
@@ -7,10 +7,10 @@
     <p:sldMasterId id="2147483705" r:id="rId6"/>
   </p:sldMasterIdLst>
   <p:notesMasterIdLst>
-    <p:notesMasterId r:id="rId17"/>
+    <p:notesMasterId r:id="rId22"/>
   </p:notesMasterIdLst>
   <p:handoutMasterIdLst>
-    <p:handoutMasterId r:id="rId18"/>
+    <p:handoutMasterId r:id="rId23"/>
   </p:handoutMasterIdLst>
   <p:sldIdLst>
     <p:sldId id="256" r:id="rId7"/>
@@ -18,11 +18,16 @@
     <p:sldId id="259" r:id="rId9"/>
     <p:sldId id="260" r:id="rId10"/>
     <p:sldId id="284" r:id="rId11"/>
-    <p:sldId id="275" r:id="rId12"/>
-    <p:sldId id="288" r:id="rId13"/>
-    <p:sldId id="280" r:id="rId14"/>
-    <p:sldId id="287" r:id="rId15"/>
-    <p:sldId id="286" r:id="rId16"/>
+    <p:sldId id="291" r:id="rId12"/>
+    <p:sldId id="293" r:id="rId13"/>
+    <p:sldId id="290" r:id="rId14"/>
+    <p:sldId id="292" r:id="rId15"/>
+    <p:sldId id="275" r:id="rId16"/>
+    <p:sldId id="288" r:id="rId17"/>
+    <p:sldId id="289" r:id="rId18"/>
+    <p:sldId id="280" r:id="rId19"/>
+    <p:sldId id="287" r:id="rId20"/>
+    <p:sldId id="286" r:id="rId21"/>
   </p:sldIdLst>
   <p:sldSz cx="12192000" cy="6858000"/>
   <p:notesSz cx="6858000" cy="9144000"/>
@@ -585,7 +590,7 @@
           <a:p>
             <a:fld id="{54C52192-B826-4AE0-9CD6-BEA9467D12B3}" type="datetimeFigureOut">
               <a:rPr lang="nb-NO" smtClean="0"/>
-              <a:t>05.11.2019</a:t>
+              <a:t>12.11.2019</a:t>
             </a:fld>
             <a:endParaRPr lang="nb-NO"/>
           </a:p>
@@ -750,7 +755,7 @@
           <a:p>
             <a:fld id="{2696BCB2-2760-41B1-A1BE-7886EF110FCB}" type="datetimeFigureOut">
               <a:rPr lang="nb-NO" smtClean="0"/>
-              <a:t>05.11.2019</a:t>
+              <a:t>12.11.2019</a:t>
             </a:fld>
             <a:endParaRPr lang="nb-NO"/>
           </a:p>
@@ -1318,114 +1323,8 @@
           <a:p>
             <a:r>
               <a:rPr lang="nb-NO" dirty="0"/>
-              <a:t>MFA:</a:t>
-            </a:r>
-          </a:p>
-          <a:p>
-            <a:r>
-              <a:rPr lang="en-US" sz="1200" b="0" i="1" kern="1200" dirty="0">
-                <a:solidFill>
-                  <a:schemeClr val="tx1"/>
-                </a:solidFill>
-                <a:effectLst/>
-                <a:latin typeface="+mn-lt"/>
-                <a:ea typeface="+mn-ea"/>
-                <a:cs typeface="+mn-cs"/>
-              </a:rPr>
-              <a:t>Something you know</a:t>
-            </a:r>
-            <a:endParaRPr lang="en-US" sz="1200" b="0" i="0" kern="1200" dirty="0">
-              <a:solidFill>
-                <a:schemeClr val="tx1"/>
-              </a:solidFill>
-              <a:effectLst/>
-              <a:latin typeface="+mn-lt"/>
-              <a:ea typeface="+mn-ea"/>
-              <a:cs typeface="+mn-cs"/>
-            </a:endParaRPr>
-          </a:p>
-          <a:p>
-            <a:r>
-              <a:rPr lang="en-US" sz="1200" b="0" i="1" kern="1200" dirty="0">
-                <a:solidFill>
-                  <a:schemeClr val="tx1"/>
-                </a:solidFill>
-                <a:effectLst/>
-                <a:latin typeface="+mn-lt"/>
-                <a:ea typeface="+mn-ea"/>
-                <a:cs typeface="+mn-cs"/>
-              </a:rPr>
-              <a:t>Something you possess</a:t>
-            </a:r>
-            <a:endParaRPr lang="en-US" sz="1200" b="0" i="0" kern="1200" dirty="0">
-              <a:solidFill>
-                <a:schemeClr val="tx1"/>
-              </a:solidFill>
-              <a:effectLst/>
-              <a:latin typeface="+mn-lt"/>
-              <a:ea typeface="+mn-ea"/>
-              <a:cs typeface="+mn-cs"/>
-            </a:endParaRPr>
-          </a:p>
-          <a:p>
-            <a:r>
-              <a:rPr lang="en-US" sz="1200" b="0" i="1" kern="1200" dirty="0">
-                <a:solidFill>
-                  <a:schemeClr val="tx1"/>
-                </a:solidFill>
-                <a:effectLst/>
-                <a:latin typeface="+mn-lt"/>
-                <a:ea typeface="+mn-ea"/>
-                <a:cs typeface="+mn-cs"/>
-              </a:rPr>
-              <a:t>Something you are</a:t>
-            </a:r>
-            <a:endParaRPr lang="en-US" sz="1200" b="0" i="0" kern="1200" dirty="0">
-              <a:solidFill>
-                <a:schemeClr val="tx1"/>
-              </a:solidFill>
-              <a:effectLst/>
-              <a:latin typeface="+mn-lt"/>
-              <a:ea typeface="+mn-ea"/>
-              <a:cs typeface="+mn-cs"/>
-            </a:endParaRPr>
-          </a:p>
-          <a:p>
-            <a:endParaRPr lang="nb-NO" dirty="0"/>
-          </a:p>
-          <a:p>
-            <a:r>
-              <a:rPr lang="en-US" sz="1200" b="0" i="0" kern="1200" dirty="0">
-                <a:solidFill>
-                  <a:schemeClr val="tx1"/>
-                </a:solidFill>
-                <a:effectLst/>
-                <a:latin typeface="+mn-lt"/>
-                <a:ea typeface="+mn-ea"/>
-                <a:cs typeface="+mn-cs"/>
-              </a:rPr>
-              <a:t>By leveraging Azure AD for SSO you'll also have the ability to combine multiple data sources into an intelligent security graph</a:t>
-            </a:r>
-          </a:p>
-          <a:p>
-            <a:endParaRPr lang="en-US" sz="1200" b="0" i="0" kern="1200" dirty="0">
-              <a:solidFill>
-                <a:schemeClr val="tx1"/>
-              </a:solidFill>
-              <a:effectLst/>
-              <a:latin typeface="+mn-lt"/>
-              <a:ea typeface="+mn-ea"/>
-              <a:cs typeface="+mn-cs"/>
-            </a:endParaRPr>
-          </a:p>
-          <a:p>
-            <a:r>
-              <a:rPr lang="nb-NO" dirty="0">
-                <a:hlinkClick r:id="rId3"/>
-              </a:rPr>
-              <a:t>https://docs.microsoft.com/nb-no/learn/modules/intro-to-security-in-azure/3-identity-and-access</a:t>
-            </a:r>
-            <a:endParaRPr lang="nb-NO" dirty="0"/>
+              <a:t>Vårt ansvar </a:t>
+            </a:r>
           </a:p>
         </p:txBody>
       </p:sp>
@@ -1455,7 +1354,7 @@
     </p:spTree>
     <p:extLst>
       <p:ext uri="{BB962C8B-B14F-4D97-AF65-F5344CB8AC3E}">
-        <p14:creationId xmlns:p14="http://schemas.microsoft.com/office/powerpoint/2010/main" val="1334592713"/>
+        <p14:creationId xmlns:p14="http://schemas.microsoft.com/office/powerpoint/2010/main" val="2443316662"/>
       </p:ext>
     </p:extLst>
   </p:cSld>
@@ -1511,16 +1410,114 @@
           <a:p>
             <a:r>
               <a:rPr lang="nb-NO" dirty="0"/>
-              <a:t>Vise </a:t>
-            </a:r>
-            <a:r>
-              <a:rPr lang="nb-NO" dirty="0" err="1"/>
-              <a:t>deployment</a:t>
-            </a:r>
-            <a:r>
-              <a:rPr lang="nb-NO" dirty="0"/>
-              <a:t> av </a:t>
-            </a:r>
+              <a:t>MFA:</a:t>
+            </a:r>
+          </a:p>
+          <a:p>
+            <a:r>
+              <a:rPr lang="en-US" sz="1200" b="0" i="1" kern="1200" dirty="0">
+                <a:solidFill>
+                  <a:schemeClr val="tx1"/>
+                </a:solidFill>
+                <a:effectLst/>
+                <a:latin typeface="+mn-lt"/>
+                <a:ea typeface="+mn-ea"/>
+                <a:cs typeface="+mn-cs"/>
+              </a:rPr>
+              <a:t>Something you know</a:t>
+            </a:r>
+            <a:endParaRPr lang="en-US" sz="1200" b="0" i="0" kern="1200" dirty="0">
+              <a:solidFill>
+                <a:schemeClr val="tx1"/>
+              </a:solidFill>
+              <a:effectLst/>
+              <a:latin typeface="+mn-lt"/>
+              <a:ea typeface="+mn-ea"/>
+              <a:cs typeface="+mn-cs"/>
+            </a:endParaRPr>
+          </a:p>
+          <a:p>
+            <a:r>
+              <a:rPr lang="en-US" sz="1200" b="0" i="1" kern="1200" dirty="0">
+                <a:solidFill>
+                  <a:schemeClr val="tx1"/>
+                </a:solidFill>
+                <a:effectLst/>
+                <a:latin typeface="+mn-lt"/>
+                <a:ea typeface="+mn-ea"/>
+                <a:cs typeface="+mn-cs"/>
+              </a:rPr>
+              <a:t>Something you possess</a:t>
+            </a:r>
+            <a:endParaRPr lang="en-US" sz="1200" b="0" i="0" kern="1200" dirty="0">
+              <a:solidFill>
+                <a:schemeClr val="tx1"/>
+              </a:solidFill>
+              <a:effectLst/>
+              <a:latin typeface="+mn-lt"/>
+              <a:ea typeface="+mn-ea"/>
+              <a:cs typeface="+mn-cs"/>
+            </a:endParaRPr>
+          </a:p>
+          <a:p>
+            <a:r>
+              <a:rPr lang="en-US" sz="1200" b="0" i="1" kern="1200" dirty="0">
+                <a:solidFill>
+                  <a:schemeClr val="tx1"/>
+                </a:solidFill>
+                <a:effectLst/>
+                <a:latin typeface="+mn-lt"/>
+                <a:ea typeface="+mn-ea"/>
+                <a:cs typeface="+mn-cs"/>
+              </a:rPr>
+              <a:t>Something you are</a:t>
+            </a:r>
+            <a:endParaRPr lang="en-US" sz="1200" b="0" i="0" kern="1200" dirty="0">
+              <a:solidFill>
+                <a:schemeClr val="tx1"/>
+              </a:solidFill>
+              <a:effectLst/>
+              <a:latin typeface="+mn-lt"/>
+              <a:ea typeface="+mn-ea"/>
+              <a:cs typeface="+mn-cs"/>
+            </a:endParaRPr>
+          </a:p>
+          <a:p>
+            <a:endParaRPr lang="nb-NO" dirty="0"/>
+          </a:p>
+          <a:p>
+            <a:r>
+              <a:rPr lang="en-US" sz="1200" b="0" i="0" kern="1200" dirty="0">
+                <a:solidFill>
+                  <a:schemeClr val="tx1"/>
+                </a:solidFill>
+                <a:effectLst/>
+                <a:latin typeface="+mn-lt"/>
+                <a:ea typeface="+mn-ea"/>
+                <a:cs typeface="+mn-cs"/>
+              </a:rPr>
+              <a:t>By leveraging Azure AD for SSO you'll also have the ability to combine multiple data sources into an intelligent security graph</a:t>
+            </a:r>
+          </a:p>
+          <a:p>
+            <a:endParaRPr lang="en-US" sz="1200" b="0" i="0" kern="1200" dirty="0">
+              <a:solidFill>
+                <a:schemeClr val="tx1"/>
+              </a:solidFill>
+              <a:effectLst/>
+              <a:latin typeface="+mn-lt"/>
+              <a:ea typeface="+mn-ea"/>
+              <a:cs typeface="+mn-cs"/>
+            </a:endParaRPr>
+          </a:p>
+          <a:p>
+            <a:r>
+              <a:rPr lang="nb-NO" dirty="0">
+                <a:hlinkClick r:id="rId3"/>
+              </a:rPr>
+              <a:t>https://docs.microsoft.com/nb-no/learn/modules/intro-to-security-in-azure/3-identity-and-access</a:t>
+            </a:r>
+            <a:endParaRPr lang="nb-NO" dirty="0"/>
           </a:p>
         </p:txBody>
       </p:sp>
@@ -1541,7 +1538,7 @@
           <a:p>
             <a:fld id="{180377DB-C4B0-49B2-8838-0F01BA83B7C4}" type="slidenum">
               <a:rPr lang="nb-NO" smtClean="0"/>
-              <a:t>8</a:t>
+              <a:t>11</a:t>
             </a:fld>
             <a:endParaRPr lang="nb-NO"/>
           </a:p>
@@ -1550,7 +1547,7 @@
     </p:spTree>
     <p:extLst>
       <p:ext uri="{BB962C8B-B14F-4D97-AF65-F5344CB8AC3E}">
-        <p14:creationId xmlns:p14="http://schemas.microsoft.com/office/powerpoint/2010/main" val="2906306431"/>
+        <p14:creationId xmlns:p14="http://schemas.microsoft.com/office/powerpoint/2010/main" val="1334592713"/>
       </p:ext>
     </p:extLst>
   </p:cSld>
@@ -1605,6 +1602,101 @@
           <a:lstStyle/>
           <a:p>
             <a:r>
+              <a:rPr lang="nb-NO" dirty="0"/>
+              <a:t>Vise </a:t>
+            </a:r>
+            <a:r>
+              <a:rPr lang="nb-NO" dirty="0" err="1"/>
+              <a:t>deployment</a:t>
+            </a:r>
+            <a:r>
+              <a:rPr lang="nb-NO" dirty="0"/>
+              <a:t> av </a:t>
+            </a:r>
+          </a:p>
+        </p:txBody>
+      </p:sp>
+      <p:sp>
+        <p:nvSpPr>
+          <p:cNvPr id="4" name="Slide Number Placeholder 3"/>
+          <p:cNvSpPr>
+            <a:spLocks noGrp="1"/>
+          </p:cNvSpPr>
+          <p:nvPr>
+            <p:ph type="sldNum" sz="quarter" idx="5"/>
+          </p:nvPr>
+        </p:nvSpPr>
+        <p:spPr/>
+        <p:txBody>
+          <a:bodyPr/>
+          <a:lstStyle/>
+          <a:p>
+            <a:fld id="{180377DB-C4B0-49B2-8838-0F01BA83B7C4}" type="slidenum">
+              <a:rPr lang="nb-NO" smtClean="0"/>
+              <a:t>13</a:t>
+            </a:fld>
+            <a:endParaRPr lang="nb-NO"/>
+          </a:p>
+        </p:txBody>
+      </p:sp>
+    </p:spTree>
+    <p:extLst>
+      <p:ext uri="{BB962C8B-B14F-4D97-AF65-F5344CB8AC3E}">
+        <p14:creationId xmlns:p14="http://schemas.microsoft.com/office/powerpoint/2010/main" val="2906306431"/>
+      </p:ext>
+    </p:extLst>
+  </p:cSld>
+  <p:clrMapOvr>
+    <a:masterClrMapping/>
+  </p:clrMapOvr>
+</p:notes>
+</file>
+
+<file path=ppt/notesSlides/notesSlide6.xml><?xml version="1.0" encoding="utf-8"?>
+<p:notes xmlns:a="http://schemas.openxmlformats.org/drawingml/2006/main" xmlns:r="http://schemas.openxmlformats.org/officeDocument/2006/relationships" xmlns:p="http://schemas.openxmlformats.org/presentationml/2006/main">
+  <p:cSld>
+    <p:spTree>
+      <p:nvGrpSpPr>
+        <p:cNvPr id="1" name=""/>
+        <p:cNvGrpSpPr/>
+        <p:nvPr/>
+      </p:nvGrpSpPr>
+      <p:grpSpPr>
+        <a:xfrm>
+          <a:off x="0" y="0"/>
+          <a:ext cx="0" cy="0"/>
+          <a:chOff x="0" y="0"/>
+          <a:chExt cx="0" cy="0"/>
+        </a:xfrm>
+      </p:grpSpPr>
+      <p:sp>
+        <p:nvSpPr>
+          <p:cNvPr id="2" name="Slide Image Placeholder 1"/>
+          <p:cNvSpPr>
+            <a:spLocks noGrp="1" noRot="1" noChangeAspect="1"/>
+          </p:cNvSpPr>
+          <p:nvPr>
+            <p:ph type="sldImg"/>
+          </p:nvPr>
+        </p:nvSpPr>
+        <p:spPr/>
+      </p:sp>
+      <p:sp>
+        <p:nvSpPr>
+          <p:cNvPr id="3" name="Notes Placeholder 2"/>
+          <p:cNvSpPr>
+            <a:spLocks noGrp="1"/>
+          </p:cNvSpPr>
+          <p:nvPr>
+            <p:ph type="body" idx="1"/>
+          </p:nvPr>
+        </p:nvSpPr>
+        <p:spPr/>
+        <p:txBody>
+          <a:bodyPr/>
+          <a:lstStyle/>
+          <a:p>
+            <a:r>
               <a:rPr lang="nb-NO" dirty="0">
                 <a:hlinkClick r:id="rId3"/>
               </a:rPr>
@@ -1665,7 +1757,7 @@
           <a:p>
             <a:fld id="{180377DB-C4B0-49B2-8838-0F01BA83B7C4}" type="slidenum">
               <a:rPr lang="nb-NO" smtClean="0"/>
-              <a:t>9</a:t>
+              <a:t>14</a:t>
             </a:fld>
             <a:endParaRPr lang="nb-NO"/>
           </a:p>
@@ -11019,6 +11111,511 @@
           <p:cNvPr id="2" name="Content Placeholder 1">
             <a:extLst>
               <a:ext uri="{FF2B5EF4-FFF2-40B4-BE49-F238E27FC236}">
+                <a16:creationId xmlns:a16="http://schemas.microsoft.com/office/drawing/2014/main" id="{94B98822-8368-4C2D-B1AB-DBC5C478A3C8}"/>
+              </a:ext>
+            </a:extLst>
+          </p:cNvPr>
+          <p:cNvSpPr>
+            <a:spLocks noGrp="1"/>
+          </p:cNvSpPr>
+          <p:nvPr>
+            <p:ph idx="1"/>
+          </p:nvPr>
+        </p:nvSpPr>
+        <p:spPr/>
+        <p:txBody>
+          <a:bodyPr/>
+          <a:lstStyle/>
+          <a:p>
+            <a:pPr marL="0" indent="0">
+              <a:buNone/>
+            </a:pPr>
+            <a:endParaRPr lang="nb-NO" sz="4400" dirty="0"/>
+          </a:p>
+        </p:txBody>
+      </p:sp>
+      <p:sp>
+        <p:nvSpPr>
+          <p:cNvPr id="3" name="Title 2">
+            <a:extLst>
+              <a:ext uri="{FF2B5EF4-FFF2-40B4-BE49-F238E27FC236}">
+                <a16:creationId xmlns:a16="http://schemas.microsoft.com/office/drawing/2014/main" id="{6E551990-3A9C-43DC-8E56-7146D7720E17}"/>
+              </a:ext>
+            </a:extLst>
+          </p:cNvPr>
+          <p:cNvSpPr>
+            <a:spLocks noGrp="1"/>
+          </p:cNvSpPr>
+          <p:nvPr>
+            <p:ph type="title"/>
+          </p:nvPr>
+        </p:nvSpPr>
+        <p:spPr>
+          <a:xfrm>
+            <a:off x="1328585" y="376848"/>
+            <a:ext cx="10078991" cy="1325563"/>
+          </a:xfrm>
+        </p:spPr>
+        <p:txBody>
+          <a:bodyPr/>
+          <a:lstStyle/>
+          <a:p>
+            <a:r>
+              <a:rPr lang="nb-NO" dirty="0"/>
+              <a:t>Demo og leksjon 1</a:t>
+            </a:r>
+          </a:p>
+        </p:txBody>
+      </p:sp>
+    </p:spTree>
+    <p:extLst>
+      <p:ext uri="{BB962C8B-B14F-4D97-AF65-F5344CB8AC3E}">
+        <p14:creationId xmlns:p14="http://schemas.microsoft.com/office/powerpoint/2010/main" val="2246517485"/>
+      </p:ext>
+    </p:extLst>
+  </p:cSld>
+  <p:clrMapOvr>
+    <a:masterClrMapping/>
+  </p:clrMapOvr>
+</p:sld>
+</file>
+
+<file path=ppt/slides/slide11.xml><?xml version="1.0" encoding="utf-8"?>
+<p:sld xmlns:a="http://schemas.openxmlformats.org/drawingml/2006/main" xmlns:r="http://schemas.openxmlformats.org/officeDocument/2006/relationships" xmlns:p="http://schemas.openxmlformats.org/presentationml/2006/main">
+  <p:cSld>
+    <p:spTree>
+      <p:nvGrpSpPr>
+        <p:cNvPr id="1" name=""/>
+        <p:cNvGrpSpPr/>
+        <p:nvPr/>
+      </p:nvGrpSpPr>
+      <p:grpSpPr>
+        <a:xfrm>
+          <a:off x="0" y="0"/>
+          <a:ext cx="0" cy="0"/>
+          <a:chOff x="0" y="0"/>
+          <a:chExt cx="0" cy="0"/>
+        </a:xfrm>
+      </p:grpSpPr>
+      <p:sp>
+        <p:nvSpPr>
+          <p:cNvPr id="2" name="Content Placeholder 1">
+            <a:extLst>
+              <a:ext uri="{FF2B5EF4-FFF2-40B4-BE49-F238E27FC236}">
+                <a16:creationId xmlns:a16="http://schemas.microsoft.com/office/drawing/2014/main" id="{E3CAFEDC-D075-4BF1-8EEC-978810502890}"/>
+              </a:ext>
+            </a:extLst>
+          </p:cNvPr>
+          <p:cNvSpPr>
+            <a:spLocks noGrp="1"/>
+          </p:cNvSpPr>
+          <p:nvPr>
+            <p:ph idx="1"/>
+          </p:nvPr>
+        </p:nvSpPr>
+        <p:spPr/>
+        <p:txBody>
+          <a:bodyPr/>
+          <a:lstStyle/>
+          <a:p>
+            <a:r>
+              <a:rPr lang="nb-NO" dirty="0"/>
+              <a:t>Rollebasert identitetstjeneste </a:t>
+            </a:r>
+          </a:p>
+          <a:p>
+            <a:r>
+              <a:rPr lang="nb-NO" dirty="0"/>
+              <a:t>Active Directory sammen med on-</a:t>
+            </a:r>
+            <a:r>
+              <a:rPr lang="nb-NO" dirty="0" err="1"/>
+              <a:t>prem</a:t>
+            </a:r>
+            <a:endParaRPr lang="nb-NO" dirty="0"/>
+          </a:p>
+          <a:p>
+            <a:r>
+              <a:rPr lang="nb-NO" dirty="0" err="1"/>
+              <a:t>Authentication</a:t>
+            </a:r>
+            <a:endParaRPr lang="nb-NO" dirty="0"/>
+          </a:p>
+          <a:p>
+            <a:pPr lvl="1"/>
+            <a:r>
+              <a:rPr lang="nb-NO" dirty="0" err="1"/>
+              <a:t>Multi-factor</a:t>
+            </a:r>
+            <a:r>
+              <a:rPr lang="nb-NO" dirty="0"/>
+              <a:t> </a:t>
+            </a:r>
+            <a:r>
+              <a:rPr lang="nb-NO" dirty="0" err="1"/>
+              <a:t>Authentication</a:t>
+            </a:r>
+            <a:endParaRPr lang="nb-NO" dirty="0"/>
+          </a:p>
+          <a:p>
+            <a:r>
+              <a:rPr lang="nb-NO" dirty="0"/>
+              <a:t>Støtte for SSO</a:t>
+            </a:r>
+          </a:p>
+          <a:p>
+            <a:r>
+              <a:rPr lang="nb-NO" dirty="0"/>
+              <a:t>Identitet for tjenester</a:t>
+            </a:r>
+          </a:p>
+          <a:p>
+            <a:pPr lvl="1"/>
+            <a:r>
+              <a:rPr lang="en-US" dirty="0"/>
+              <a:t>A </a:t>
+            </a:r>
+            <a:r>
+              <a:rPr lang="en-US" b="1" dirty="0"/>
+              <a:t>service principal</a:t>
+            </a:r>
+            <a:r>
+              <a:rPr lang="en-US" dirty="0"/>
+              <a:t> is an identity that is used by a service or application. And like other identities, it can be assigned roles.</a:t>
+            </a:r>
+          </a:p>
+          <a:p>
+            <a:r>
+              <a:rPr lang="nb-NO" dirty="0"/>
+              <a:t>Role-based access control (RBAC)</a:t>
+            </a:r>
+          </a:p>
+          <a:p>
+            <a:endParaRPr lang="nb-NO" dirty="0"/>
+          </a:p>
+          <a:p>
+            <a:endParaRPr lang="nb-NO" dirty="0"/>
+          </a:p>
+        </p:txBody>
+      </p:sp>
+      <p:sp>
+        <p:nvSpPr>
+          <p:cNvPr id="3" name="Title 2">
+            <a:extLst>
+              <a:ext uri="{FF2B5EF4-FFF2-40B4-BE49-F238E27FC236}">
+                <a16:creationId xmlns:a16="http://schemas.microsoft.com/office/drawing/2014/main" id="{5D5C9A2C-D026-47EC-B66D-9D71F9088F91}"/>
+              </a:ext>
+            </a:extLst>
+          </p:cNvPr>
+          <p:cNvSpPr>
+            <a:spLocks noGrp="1"/>
+          </p:cNvSpPr>
+          <p:nvPr>
+            <p:ph type="title"/>
+          </p:nvPr>
+        </p:nvSpPr>
+        <p:spPr/>
+        <p:txBody>
+          <a:bodyPr/>
+          <a:lstStyle/>
+          <a:p>
+            <a:r>
+              <a:rPr lang="nb-NO"/>
+              <a:t>Azure AD</a:t>
+            </a:r>
+          </a:p>
+        </p:txBody>
+      </p:sp>
+    </p:spTree>
+    <p:extLst>
+      <p:ext uri="{BB962C8B-B14F-4D97-AF65-F5344CB8AC3E}">
+        <p14:creationId xmlns:p14="http://schemas.microsoft.com/office/powerpoint/2010/main" val="1057957658"/>
+      </p:ext>
+    </p:extLst>
+  </p:cSld>
+  <p:clrMapOvr>
+    <a:masterClrMapping/>
+  </p:clrMapOvr>
+</p:sld>
+</file>
+
+<file path=ppt/slides/slide12.xml><?xml version="1.0" encoding="utf-8"?>
+<p:sld xmlns:a="http://schemas.openxmlformats.org/drawingml/2006/main" xmlns:r="http://schemas.openxmlformats.org/officeDocument/2006/relationships" xmlns:p="http://schemas.openxmlformats.org/presentationml/2006/main">
+  <p:cSld>
+    <p:spTree>
+      <p:nvGrpSpPr>
+        <p:cNvPr id="1" name=""/>
+        <p:cNvGrpSpPr/>
+        <p:nvPr/>
+      </p:nvGrpSpPr>
+      <p:grpSpPr>
+        <a:xfrm>
+          <a:off x="0" y="0"/>
+          <a:ext cx="0" cy="0"/>
+          <a:chOff x="0" y="0"/>
+          <a:chExt cx="0" cy="0"/>
+        </a:xfrm>
+      </p:grpSpPr>
+      <p:sp>
+        <p:nvSpPr>
+          <p:cNvPr id="2" name="Content Placeholder 1">
+            <a:extLst>
+              <a:ext uri="{FF2B5EF4-FFF2-40B4-BE49-F238E27FC236}">
+                <a16:creationId xmlns:a16="http://schemas.microsoft.com/office/drawing/2014/main" id="{2DF91858-AB54-465A-AC65-86BFFFE44E4D}"/>
+              </a:ext>
+            </a:extLst>
+          </p:cNvPr>
+          <p:cNvSpPr>
+            <a:spLocks noGrp="1"/>
+          </p:cNvSpPr>
+          <p:nvPr>
+            <p:ph idx="1"/>
+          </p:nvPr>
+        </p:nvSpPr>
+        <p:spPr/>
+        <p:txBody>
+          <a:bodyPr/>
+          <a:lstStyle/>
+          <a:p>
+            <a:endParaRPr lang="nb-NO"/>
+          </a:p>
+        </p:txBody>
+      </p:sp>
+      <p:sp>
+        <p:nvSpPr>
+          <p:cNvPr id="3" name="Title 2">
+            <a:extLst>
+              <a:ext uri="{FF2B5EF4-FFF2-40B4-BE49-F238E27FC236}">
+                <a16:creationId xmlns:a16="http://schemas.microsoft.com/office/drawing/2014/main" id="{F95EA700-6D4A-49F7-B7E1-B7811FEC9882}"/>
+              </a:ext>
+            </a:extLst>
+          </p:cNvPr>
+          <p:cNvSpPr>
+            <a:spLocks noGrp="1"/>
+          </p:cNvSpPr>
+          <p:nvPr>
+            <p:ph type="title"/>
+          </p:nvPr>
+        </p:nvSpPr>
+        <p:spPr/>
+        <p:txBody>
+          <a:bodyPr/>
+          <a:lstStyle/>
+          <a:p>
+            <a:endParaRPr lang="nb-NO"/>
+          </a:p>
+        </p:txBody>
+      </p:sp>
+    </p:spTree>
+    <p:extLst>
+      <p:ext uri="{BB962C8B-B14F-4D97-AF65-F5344CB8AC3E}">
+        <p14:creationId xmlns:p14="http://schemas.microsoft.com/office/powerpoint/2010/main" val="3048862876"/>
+      </p:ext>
+    </p:extLst>
+  </p:cSld>
+  <p:clrMapOvr>
+    <a:masterClrMapping/>
+  </p:clrMapOvr>
+</p:sld>
+</file>
+
+<file path=ppt/slides/slide13.xml><?xml version="1.0" encoding="utf-8"?>
+<p:sld xmlns:a="http://schemas.openxmlformats.org/drawingml/2006/main" xmlns:r="http://schemas.openxmlformats.org/officeDocument/2006/relationships" xmlns:p="http://schemas.openxmlformats.org/presentationml/2006/main">
+  <p:cSld>
+    <p:spTree>
+      <p:nvGrpSpPr>
+        <p:cNvPr id="1" name=""/>
+        <p:cNvGrpSpPr/>
+        <p:nvPr/>
+      </p:nvGrpSpPr>
+      <p:grpSpPr>
+        <a:xfrm>
+          <a:off x="0" y="0"/>
+          <a:ext cx="0" cy="0"/>
+          <a:chOff x="0" y="0"/>
+          <a:chExt cx="0" cy="0"/>
+        </a:xfrm>
+      </p:grpSpPr>
+      <p:sp>
+        <p:nvSpPr>
+          <p:cNvPr id="2" name="Content Placeholder 1">
+            <a:extLst>
+              <a:ext uri="{FF2B5EF4-FFF2-40B4-BE49-F238E27FC236}">
+                <a16:creationId xmlns:a16="http://schemas.microsoft.com/office/drawing/2014/main" id="{01C6EDC8-A815-4F7B-95FE-5E19DA0863EE}"/>
+              </a:ext>
+            </a:extLst>
+          </p:cNvPr>
+          <p:cNvSpPr>
+            <a:spLocks noGrp="1"/>
+          </p:cNvSpPr>
+          <p:nvPr>
+            <p:ph idx="1"/>
+          </p:nvPr>
+        </p:nvSpPr>
+        <p:spPr/>
+        <p:txBody>
+          <a:bodyPr/>
+          <a:lstStyle/>
+          <a:p>
+            <a:r>
+              <a:rPr lang="nb-NO" dirty="0"/>
+              <a:t>Portal</a:t>
+            </a:r>
+          </a:p>
+          <a:p>
+            <a:r>
+              <a:rPr lang="nb-NO" dirty="0"/>
+              <a:t>Visual Studio</a:t>
+            </a:r>
+          </a:p>
+        </p:txBody>
+      </p:sp>
+      <p:sp>
+        <p:nvSpPr>
+          <p:cNvPr id="3" name="Title 2">
+            <a:extLst>
+              <a:ext uri="{FF2B5EF4-FFF2-40B4-BE49-F238E27FC236}">
+                <a16:creationId xmlns:a16="http://schemas.microsoft.com/office/drawing/2014/main" id="{9616A1BB-BF26-4AFE-905C-E67197F226A0}"/>
+              </a:ext>
+            </a:extLst>
+          </p:cNvPr>
+          <p:cNvSpPr>
+            <a:spLocks noGrp="1"/>
+          </p:cNvSpPr>
+          <p:nvPr>
+            <p:ph type="title"/>
+          </p:nvPr>
+        </p:nvSpPr>
+        <p:spPr/>
+        <p:txBody>
+          <a:bodyPr/>
+          <a:lstStyle/>
+          <a:p>
+            <a:r>
+              <a:rPr lang="nb-NO" dirty="0"/>
+              <a:t>Demo og Leksjon 2.</a:t>
+            </a:r>
+          </a:p>
+        </p:txBody>
+      </p:sp>
+    </p:spTree>
+    <p:extLst>
+      <p:ext uri="{BB962C8B-B14F-4D97-AF65-F5344CB8AC3E}">
+        <p14:creationId xmlns:p14="http://schemas.microsoft.com/office/powerpoint/2010/main" val="2607850202"/>
+      </p:ext>
+    </p:extLst>
+  </p:cSld>
+  <p:clrMapOvr>
+    <a:masterClrMapping/>
+  </p:clrMapOvr>
+</p:sld>
+</file>
+
+<file path=ppt/slides/slide14.xml><?xml version="1.0" encoding="utf-8"?>
+<p:sld xmlns:a="http://schemas.openxmlformats.org/drawingml/2006/main" xmlns:r="http://schemas.openxmlformats.org/officeDocument/2006/relationships" xmlns:p="http://schemas.openxmlformats.org/presentationml/2006/main">
+  <p:cSld>
+    <p:spTree>
+      <p:nvGrpSpPr>
+        <p:cNvPr id="1" name=""/>
+        <p:cNvGrpSpPr/>
+        <p:nvPr/>
+      </p:nvGrpSpPr>
+      <p:grpSpPr>
+        <a:xfrm>
+          <a:off x="0" y="0"/>
+          <a:ext cx="0" cy="0"/>
+          <a:chOff x="0" y="0"/>
+          <a:chExt cx="0" cy="0"/>
+        </a:xfrm>
+      </p:grpSpPr>
+      <p:sp>
+        <p:nvSpPr>
+          <p:cNvPr id="2" name="Content Placeholder 1">
+            <a:extLst>
+              <a:ext uri="{FF2B5EF4-FFF2-40B4-BE49-F238E27FC236}">
+                <a16:creationId xmlns:a16="http://schemas.microsoft.com/office/drawing/2014/main" id="{3469A132-FA9D-4F94-91D3-A36EA0160557}"/>
+              </a:ext>
+            </a:extLst>
+          </p:cNvPr>
+          <p:cNvSpPr>
+            <a:spLocks noGrp="1"/>
+          </p:cNvSpPr>
+          <p:nvPr>
+            <p:ph idx="1"/>
+          </p:nvPr>
+        </p:nvSpPr>
+        <p:spPr/>
+        <p:txBody>
+          <a:bodyPr/>
+          <a:lstStyle/>
+          <a:p>
+            <a:endParaRPr lang="nb-NO"/>
+          </a:p>
+        </p:txBody>
+      </p:sp>
+      <p:sp>
+        <p:nvSpPr>
+          <p:cNvPr id="3" name="Title 2">
+            <a:extLst>
+              <a:ext uri="{FF2B5EF4-FFF2-40B4-BE49-F238E27FC236}">
+                <a16:creationId xmlns:a16="http://schemas.microsoft.com/office/drawing/2014/main" id="{2D6A7BFC-CB66-413C-995D-7797E2E0275A}"/>
+              </a:ext>
+            </a:extLst>
+          </p:cNvPr>
+          <p:cNvSpPr>
+            <a:spLocks noGrp="1"/>
+          </p:cNvSpPr>
+          <p:nvPr>
+            <p:ph type="title"/>
+          </p:nvPr>
+        </p:nvSpPr>
+        <p:spPr/>
+        <p:txBody>
+          <a:bodyPr/>
+          <a:lstStyle/>
+          <a:p>
+            <a:r>
+              <a:rPr lang="nb-NO" dirty="0"/>
+              <a:t>Infrastruktur sikkerhet</a:t>
+            </a:r>
+          </a:p>
+        </p:txBody>
+      </p:sp>
+    </p:spTree>
+    <p:extLst>
+      <p:ext uri="{BB962C8B-B14F-4D97-AF65-F5344CB8AC3E}">
+        <p14:creationId xmlns:p14="http://schemas.microsoft.com/office/powerpoint/2010/main" val="2450348965"/>
+      </p:ext>
+    </p:extLst>
+  </p:cSld>
+  <p:clrMapOvr>
+    <a:masterClrMapping/>
+  </p:clrMapOvr>
+</p:sld>
+</file>
+
+<file path=ppt/slides/slide15.xml><?xml version="1.0" encoding="utf-8"?>
+<p:sld xmlns:a="http://schemas.openxmlformats.org/drawingml/2006/main" xmlns:r="http://schemas.openxmlformats.org/officeDocument/2006/relationships" xmlns:p="http://schemas.openxmlformats.org/presentationml/2006/main">
+  <p:cSld>
+    <p:spTree>
+      <p:nvGrpSpPr>
+        <p:cNvPr id="1" name=""/>
+        <p:cNvGrpSpPr/>
+        <p:nvPr/>
+      </p:nvGrpSpPr>
+      <p:grpSpPr>
+        <a:xfrm>
+          <a:off x="0" y="0"/>
+          <a:ext cx="0" cy="0"/>
+          <a:chOff x="0" y="0"/>
+          <a:chExt cx="0" cy="0"/>
+        </a:xfrm>
+      </p:grpSpPr>
+      <p:sp>
+        <p:nvSpPr>
+          <p:cNvPr id="2" name="Content Placeholder 1">
+            <a:extLst>
+              <a:ext uri="{FF2B5EF4-FFF2-40B4-BE49-F238E27FC236}">
                 <a16:creationId xmlns:a16="http://schemas.microsoft.com/office/drawing/2014/main" id="{DB0223AE-910A-4F0A-8FD5-0DF9471B82DB}"/>
               </a:ext>
             </a:extLst>
@@ -11370,13 +11967,8 @@
           <a:p>
             <a:r>
               <a:rPr lang="nb-NO" dirty="0"/>
-              <a:t>Bonus-leksjon: Sas-token og </a:t>
-            </a:r>
-            <a:r>
-              <a:rPr lang="nb-NO" dirty="0" err="1"/>
-              <a:t>vnet</a:t>
-            </a:r>
-            <a:endParaRPr lang="nb-NO" dirty="0"/>
+              <a:t>Bonus-leksjon: SAS-token og vnet</a:t>
+            </a:r>
           </a:p>
         </p:txBody>
       </p:sp>
@@ -11610,7 +12202,7 @@
           <p:cNvPr id="2" name="Content Placeholder 1">
             <a:extLst>
               <a:ext uri="{FF2B5EF4-FFF2-40B4-BE49-F238E27FC236}">
-                <a16:creationId xmlns:a16="http://schemas.microsoft.com/office/drawing/2014/main" id="{94B98822-8368-4C2D-B1AB-DBC5C478A3C8}"/>
+                <a16:creationId xmlns:a16="http://schemas.microsoft.com/office/drawing/2014/main" id="{6ECCE435-C5D1-40E1-97F2-37D2F5337578}"/>
               </a:ext>
             </a:extLst>
           </p:cNvPr>
@@ -11626,10 +12218,76 @@
           <a:bodyPr/>
           <a:lstStyle/>
           <a:p>
-            <a:pPr marL="0" indent="0">
-              <a:buNone/>
-            </a:pPr>
-            <a:endParaRPr lang="nb-NO" sz="4400" dirty="0"/>
+            <a:r>
+              <a:rPr lang="nb-NO" dirty="0"/>
+              <a:t>Physical Security (Fysisk sikring)</a:t>
+            </a:r>
+          </a:p>
+          <a:p>
+            <a:r>
+              <a:rPr lang="nb-NO" dirty="0"/>
+              <a:t>Identity and Access (identitet og tilgangskontroll)</a:t>
+            </a:r>
+          </a:p>
+          <a:p>
+            <a:pPr lvl="1"/>
+            <a:r>
+              <a:rPr lang="nb-NO" dirty="0"/>
+              <a:t>Azure Active </a:t>
+            </a:r>
+          </a:p>
+          <a:p>
+            <a:r>
+              <a:rPr lang="nb-NO" dirty="0"/>
+              <a:t>Perimeter</a:t>
+            </a:r>
+          </a:p>
+          <a:p>
+            <a:endParaRPr lang="nb-NO" dirty="0"/>
+          </a:p>
+          <a:p>
+            <a:r>
+              <a:rPr lang="nb-NO" dirty="0"/>
+              <a:t>Network</a:t>
+            </a:r>
+          </a:p>
+          <a:p>
+            <a:pPr lvl="1"/>
+            <a:r>
+              <a:rPr lang="nb-NO" dirty="0"/>
+              <a:t>Virtuelle nettverk, </a:t>
+            </a:r>
+          </a:p>
+          <a:p>
+            <a:r>
+              <a:rPr lang="nb-NO" dirty="0"/>
+              <a:t>Compute</a:t>
+            </a:r>
+          </a:p>
+          <a:p>
+            <a:endParaRPr lang="nb-NO" dirty="0"/>
+          </a:p>
+          <a:p>
+            <a:r>
+              <a:rPr lang="nb-NO" dirty="0"/>
+              <a:t>Application</a:t>
+            </a:r>
+          </a:p>
+          <a:p>
+            <a:r>
+              <a:rPr lang="nb-NO" dirty="0"/>
+              <a:t>Data</a:t>
+            </a:r>
+          </a:p>
+          <a:p>
+            <a:pPr lvl="1"/>
+            <a:r>
+              <a:rPr lang="nb-NO" dirty="0"/>
+              <a:t>Encryption</a:t>
+            </a:r>
+          </a:p>
+          <a:p>
+            <a:endParaRPr lang="nb-NO" dirty="0"/>
           </a:p>
         </p:txBody>
       </p:sp>
@@ -11638,7 +12296,7 @@
           <p:cNvPr id="3" name="Title 2">
             <a:extLst>
               <a:ext uri="{FF2B5EF4-FFF2-40B4-BE49-F238E27FC236}">
-                <a16:creationId xmlns:a16="http://schemas.microsoft.com/office/drawing/2014/main" id="{6E551990-3A9C-43DC-8E56-7146D7720E17}"/>
+                <a16:creationId xmlns:a16="http://schemas.microsoft.com/office/drawing/2014/main" id="{523C3B3E-20C9-4888-92A2-6E738103DCEF}"/>
               </a:ext>
             </a:extLst>
           </p:cNvPr>
@@ -11649,19 +12307,14 @@
             <p:ph type="title"/>
           </p:nvPr>
         </p:nvSpPr>
-        <p:spPr>
-          <a:xfrm>
-            <a:off x="1328585" y="376848"/>
-            <a:ext cx="10078991" cy="1325563"/>
-          </a:xfrm>
-        </p:spPr>
+        <p:spPr/>
         <p:txBody>
           <a:bodyPr/>
           <a:lstStyle/>
           <a:p>
             <a:r>
               <a:rPr lang="nb-NO" dirty="0"/>
-              <a:t>Demo og leksjon 1</a:t>
+              <a:t>Lagvis sikkerhet</a:t>
             </a:r>
           </a:p>
         </p:txBody>
@@ -11669,7 +12322,7 @@
     </p:spTree>
     <p:extLst>
       <p:ext uri="{BB962C8B-B14F-4D97-AF65-F5344CB8AC3E}">
-        <p14:creationId xmlns:p14="http://schemas.microsoft.com/office/powerpoint/2010/main" val="2246517485"/>
+        <p14:creationId xmlns:p14="http://schemas.microsoft.com/office/powerpoint/2010/main" val="3441632145"/>
       </p:ext>
     </p:extLst>
   </p:cSld>
@@ -11701,7 +12354,7 @@
           <p:cNvPr id="2" name="Content Placeholder 1">
             <a:extLst>
               <a:ext uri="{FF2B5EF4-FFF2-40B4-BE49-F238E27FC236}">
-                <a16:creationId xmlns:a16="http://schemas.microsoft.com/office/drawing/2014/main" id="{E3CAFEDC-D075-4BF1-8EEC-978810502890}"/>
+                <a16:creationId xmlns:a16="http://schemas.microsoft.com/office/drawing/2014/main" id="{E1327BF1-1A34-4985-A3F0-67A8830BF363}"/>
               </a:ext>
             </a:extLst>
           </p:cNvPr>
@@ -11719,81 +12372,12 @@
           <a:p>
             <a:r>
               <a:rPr lang="nb-NO" dirty="0"/>
-              <a:t>Rollebasert identitetstjeneste </a:t>
-            </a:r>
-          </a:p>
-          <a:p>
-            <a:r>
-              <a:rPr lang="nb-NO" dirty="0"/>
-              <a:t>Active Directory sammen med on-</a:t>
-            </a:r>
-            <a:r>
-              <a:rPr lang="nb-NO" dirty="0" err="1"/>
-              <a:t>prem</a:t>
-            </a:r>
-            <a:endParaRPr lang="nb-NO" dirty="0"/>
-          </a:p>
-          <a:p>
-            <a:r>
-              <a:rPr lang="nb-NO" dirty="0" err="1"/>
-              <a:t>Authentication</a:t>
-            </a:r>
-            <a:endParaRPr lang="nb-NO" dirty="0"/>
-          </a:p>
-          <a:p>
-            <a:pPr lvl="1"/>
-            <a:r>
-              <a:rPr lang="nb-NO" dirty="0" err="1"/>
-              <a:t>Multi-factor</a:t>
-            </a:r>
-            <a:r>
-              <a:rPr lang="nb-NO" dirty="0"/>
-              <a:t> </a:t>
-            </a:r>
-            <a:r>
-              <a:rPr lang="nb-NO" dirty="0" err="1"/>
-              <a:t>Authentication</a:t>
-            </a:r>
-            <a:endParaRPr lang="nb-NO" dirty="0"/>
-          </a:p>
-          <a:p>
-            <a:r>
-              <a:rPr lang="nb-NO" dirty="0"/>
-              <a:t>Støtte for SSO</a:t>
-            </a:r>
-          </a:p>
-          <a:p>
-            <a:r>
-              <a:rPr lang="nb-NO" dirty="0"/>
-              <a:t>Identitet for tjenester</a:t>
-            </a:r>
-          </a:p>
-          <a:p>
-            <a:pPr lvl="1"/>
-            <a:r>
-              <a:rPr lang="en-US" dirty="0"/>
-              <a:t>A </a:t>
-            </a:r>
-            <a:r>
-              <a:rPr lang="en-US" b="1" dirty="0"/>
-              <a:t>service principal</a:t>
-            </a:r>
-            <a:r>
-              <a:rPr lang="en-US" dirty="0"/>
-              <a:t> is an identity that is used by a service or application. And like other identities, it can be assigned roles.</a:t>
-            </a:r>
-          </a:p>
-          <a:p>
-            <a:r>
-              <a:rPr lang="nb-NO" dirty="0"/>
-              <a:t>Role-based access control</a:t>
-            </a:r>
-          </a:p>
-          <a:p>
-            <a:endParaRPr lang="nb-NO" dirty="0"/>
-          </a:p>
-          <a:p>
-            <a:endParaRPr lang="nb-NO" dirty="0"/>
+              <a:t>Microsoft ansvar vs. </a:t>
+            </a:r>
+            <a:r>
+              <a:rPr lang="nb-NO"/>
+              <a:t>Vårt ansvar </a:t>
+            </a:r>
           </a:p>
         </p:txBody>
       </p:sp>
@@ -11802,7 +12386,7 @@
           <p:cNvPr id="3" name="Title 2">
             <a:extLst>
               <a:ext uri="{FF2B5EF4-FFF2-40B4-BE49-F238E27FC236}">
-                <a16:creationId xmlns:a16="http://schemas.microsoft.com/office/drawing/2014/main" id="{5D5C9A2C-D026-47EC-B66D-9D71F9088F91}"/>
+                <a16:creationId xmlns:a16="http://schemas.microsoft.com/office/drawing/2014/main" id="{21D13C0A-69F7-4AD0-95BE-64826CCA89BC}"/>
               </a:ext>
             </a:extLst>
           </p:cNvPr>
@@ -11818,17 +12402,14 @@
           <a:bodyPr/>
           <a:lstStyle/>
           <a:p>
-            <a:r>
-              <a:rPr lang="nb-NO"/>
-              <a:t>Azure AD</a:t>
-            </a:r>
+            <a:endParaRPr lang="nb-NO" dirty="0"/>
           </a:p>
         </p:txBody>
       </p:sp>
     </p:spTree>
     <p:extLst>
       <p:ext uri="{BB962C8B-B14F-4D97-AF65-F5344CB8AC3E}">
-        <p14:creationId xmlns:p14="http://schemas.microsoft.com/office/powerpoint/2010/main" val="1057957658"/>
+        <p14:creationId xmlns:p14="http://schemas.microsoft.com/office/powerpoint/2010/main" val="3824878857"/>
       </p:ext>
     </p:extLst>
   </p:cSld>
@@ -11860,7 +12441,7 @@
           <p:cNvPr id="2" name="Content Placeholder 1">
             <a:extLst>
               <a:ext uri="{FF2B5EF4-FFF2-40B4-BE49-F238E27FC236}">
-                <a16:creationId xmlns:a16="http://schemas.microsoft.com/office/drawing/2014/main" id="{01C6EDC8-A815-4F7B-95FE-5E19DA0863EE}"/>
+                <a16:creationId xmlns:a16="http://schemas.microsoft.com/office/drawing/2014/main" id="{7E0053A4-7AD4-492F-BC64-A947322D867F}"/>
               </a:ext>
             </a:extLst>
           </p:cNvPr>
@@ -11878,13 +12459,25 @@
           <a:p>
             <a:r>
               <a:rPr lang="nb-NO" dirty="0"/>
-              <a:t>Portal</a:t>
-            </a:r>
+              <a:t>Azure Active Directory</a:t>
+            </a:r>
+          </a:p>
+          <a:p>
+            <a:endParaRPr lang="nb-NO" dirty="0"/>
           </a:p>
           <a:p>
             <a:r>
               <a:rPr lang="nb-NO" dirty="0"/>
-              <a:t>Visual Studio</a:t>
+              <a:t>Security Center</a:t>
+            </a:r>
+          </a:p>
+          <a:p>
+            <a:endParaRPr lang="nb-NO" dirty="0"/>
+          </a:p>
+          <a:p>
+            <a:r>
+              <a:rPr lang="nb-NO" dirty="0"/>
+              <a:t>Advanced</a:t>
             </a:r>
           </a:p>
         </p:txBody>
@@ -11894,7 +12487,7 @@
           <p:cNvPr id="3" name="Title 2">
             <a:extLst>
               <a:ext uri="{FF2B5EF4-FFF2-40B4-BE49-F238E27FC236}">
-                <a16:creationId xmlns:a16="http://schemas.microsoft.com/office/drawing/2014/main" id="{9616A1BB-BF26-4AFE-905C-E67197F226A0}"/>
+                <a16:creationId xmlns:a16="http://schemas.microsoft.com/office/drawing/2014/main" id="{588209D4-0181-4A79-95F6-D34F1CB44558}"/>
               </a:ext>
             </a:extLst>
           </p:cNvPr>
@@ -11912,7 +12505,7 @@
           <a:p>
             <a:r>
               <a:rPr lang="nb-NO" dirty="0"/>
-              <a:t>Demo og Leksjon 2.</a:t>
+              <a:t>Sikkerhetstjeneter</a:t>
             </a:r>
           </a:p>
         </p:txBody>
@@ -11920,7 +12513,7 @@
     </p:spTree>
     <p:extLst>
       <p:ext uri="{BB962C8B-B14F-4D97-AF65-F5344CB8AC3E}">
-        <p14:creationId xmlns:p14="http://schemas.microsoft.com/office/powerpoint/2010/main" val="2607850202"/>
+        <p14:creationId xmlns:p14="http://schemas.microsoft.com/office/powerpoint/2010/main" val="1414863137"/>
       </p:ext>
     </p:extLst>
   </p:cSld>
@@ -11952,7 +12545,7 @@
           <p:cNvPr id="2" name="Content Placeholder 1">
             <a:extLst>
               <a:ext uri="{FF2B5EF4-FFF2-40B4-BE49-F238E27FC236}">
-                <a16:creationId xmlns:a16="http://schemas.microsoft.com/office/drawing/2014/main" id="{3469A132-FA9D-4F94-91D3-A36EA0160557}"/>
+                <a16:creationId xmlns:a16="http://schemas.microsoft.com/office/drawing/2014/main" id="{0D2E6551-FB34-4842-B140-5F0475BDB3EF}"/>
               </a:ext>
             </a:extLst>
           </p:cNvPr>
@@ -11968,7 +12561,23 @@
           <a:bodyPr/>
           <a:lstStyle/>
           <a:p>
-            <a:endParaRPr lang="nb-NO"/>
+            <a:r>
+              <a:rPr lang="nb-NO" dirty="0"/>
+              <a:t>Trust Center</a:t>
+            </a:r>
+          </a:p>
+          <a:p>
+            <a:endParaRPr lang="nb-NO" dirty="0"/>
+          </a:p>
+          <a:p>
+            <a:r>
+              <a:rPr lang="nb-NO" dirty="0"/>
+              <a:t>Min side:</a:t>
+            </a:r>
+          </a:p>
+          <a:p>
+            <a:pPr lvl="1"/>
+            <a:endParaRPr lang="nb-NO" dirty="0"/>
           </a:p>
         </p:txBody>
       </p:sp>
@@ -11977,7 +12586,7 @@
           <p:cNvPr id="3" name="Title 2">
             <a:extLst>
               <a:ext uri="{FF2B5EF4-FFF2-40B4-BE49-F238E27FC236}">
-                <a16:creationId xmlns:a16="http://schemas.microsoft.com/office/drawing/2014/main" id="{2D6A7BFC-CB66-413C-995D-7797E2E0275A}"/>
+                <a16:creationId xmlns:a16="http://schemas.microsoft.com/office/drawing/2014/main" id="{0799CBB5-0E2C-4344-96B8-3F135E8ED7F7}"/>
               </a:ext>
             </a:extLst>
           </p:cNvPr>
@@ -11995,7 +12604,7 @@
           <a:p>
             <a:r>
               <a:rPr lang="nb-NO" dirty="0"/>
-              <a:t>Infrastruktur sikkerhet</a:t>
+              <a:t>Nyttige lenker</a:t>
             </a:r>
           </a:p>
         </p:txBody>
@@ -12003,7 +12612,7 @@
     </p:spTree>
     <p:extLst>
       <p:ext uri="{BB962C8B-B14F-4D97-AF65-F5344CB8AC3E}">
-        <p14:creationId xmlns:p14="http://schemas.microsoft.com/office/powerpoint/2010/main" val="2450348965"/>
+        <p14:creationId xmlns:p14="http://schemas.microsoft.com/office/powerpoint/2010/main" val="1163624278"/>
       </p:ext>
     </p:extLst>
   </p:cSld>
@@ -13551,15 +14160,6 @@
 </file>
 
 <file path=customXml/item2.xml><?xml version="1.0" encoding="utf-8"?>
-<?mso-contentType ?>
-<FormTemplates xmlns="http://schemas.microsoft.com/sharepoint/v3/contenttype/forms">
-  <Display>DocumentLibraryForm</Display>
-  <Edit>DocumentLibraryForm</Edit>
-  <New>DocumentLibraryForm</New>
-</FormTemplates>
-</file>
-
-<file path=customXml/item3.xml><?xml version="1.0" encoding="utf-8"?>
 <ct:contentTypeSchema xmlns:ct="http://schemas.microsoft.com/office/2006/metadata/contentType" xmlns:ma="http://schemas.microsoft.com/office/2006/metadata/properties/metaAttributes" ct:_="" ma:_="" ma:contentTypeName="Document" ma:contentTypeID="0x0101005D3CE5A03C88D04F8FE0CC8617320B29" ma:contentTypeVersion="2" ma:contentTypeDescription="Create a new document." ma:contentTypeScope="" ma:versionID="23c508fadb5761cd27fdc7efc393bb78">
   <xsd:schema xmlns:xsd="http://www.w3.org/2001/XMLSchema" xmlns:xs="http://www.w3.org/2001/XMLSchema" xmlns:p="http://schemas.microsoft.com/office/2006/metadata/properties" xmlns:ns2="323bcd62-7d27-4513-9df1-9bc20f03554b" targetNamespace="http://schemas.microsoft.com/office/2006/metadata/properties" ma:root="true" ma:fieldsID="4120a6a9df7c81c23a4d646d2ccf1355" ns2:_="">
     <xsd:import namespace="323bcd62-7d27-4513-9df1-9bc20f03554b"/>
@@ -13691,6 +14291,15 @@
 </ct:contentTypeSchema>
 </file>
 
+<file path=customXml/item3.xml><?xml version="1.0" encoding="utf-8"?>
+<?mso-contentType ?>
+<FormTemplates xmlns="http://schemas.microsoft.com/sharepoint/v3/contenttype/forms">
+  <Display>DocumentLibraryForm</Display>
+  <Edit>DocumentLibraryForm</Edit>
+  <New>DocumentLibraryForm</New>
+</FormTemplates>
+</file>
+
 <file path=customXml/itemProps1.xml><?xml version="1.0" encoding="utf-8"?>
 <ds:datastoreItem xmlns:ds="http://schemas.openxmlformats.org/officeDocument/2006/customXml" ds:itemID="{9D2CB842-18D5-4EEF-9009-B0CAFCE7AC3E}">
   <ds:schemaRefs>
@@ -13709,14 +14318,6 @@
 </file>
 
 <file path=customXml/itemProps2.xml><?xml version="1.0" encoding="utf-8"?>
-<ds:datastoreItem xmlns:ds="http://schemas.openxmlformats.org/officeDocument/2006/customXml" ds:itemID="{BB82CC63-55FC-4D22-9ED3-DB88AF6228E1}">
-  <ds:schemaRefs>
-    <ds:schemaRef ds:uri="http://schemas.microsoft.com/sharepoint/v3/contenttype/forms"/>
-  </ds:schemaRefs>
-</ds:datastoreItem>
-</file>
-
-<file path=customXml/itemProps3.xml><?xml version="1.0" encoding="utf-8"?>
 <ds:datastoreItem xmlns:ds="http://schemas.openxmlformats.org/officeDocument/2006/customXml" ds:itemID="{0377EA4A-9170-43AD-A052-6EABC948F73F}">
   <ds:schemaRefs>
     <ds:schemaRef ds:uri="http://schemas.microsoft.com/office/2006/metadata/contentType"/>
@@ -13732,4 +14333,12 @@
     <ds:schemaRef ds:uri="http://schemas.microsoft.com/internal/obd"/>
   </ds:schemaRefs>
 </ds:datastoreItem>
+</file>
+
+<file path=customXml/itemProps3.xml><?xml version="1.0" encoding="utf-8"?>
+<ds:datastoreItem xmlns:ds="http://schemas.openxmlformats.org/officeDocument/2006/customXml" ds:itemID="{BB82CC63-55FC-4D22-9ED3-DB88AF6228E1}">
+  <ds:schemaRefs>
+    <ds:schemaRef ds:uri="http://schemas.microsoft.com/sharepoint/v3/contenttype/forms"/>
+  </ds:schemaRefs>
+</ds:datastoreItem>
 </file>
</xml_diff>

<commit_message>
Updates etter run 1
</commit_message>
<xml_diff>
--- a/Workshop_3/Presentasjon/Azureskolen-Workshop#3.pptx
+++ b/Workshop_3/Presentasjon/Azureskolen-Workshop#3.pptx
@@ -18,8 +18,8 @@
     <p:sldId id="259" r:id="rId9"/>
     <p:sldId id="260" r:id="rId10"/>
     <p:sldId id="284" r:id="rId11"/>
-    <p:sldId id="294" r:id="rId12"/>
-    <p:sldId id="291" r:id="rId13"/>
+    <p:sldId id="291" r:id="rId12"/>
+    <p:sldId id="294" r:id="rId13"/>
     <p:sldId id="290" r:id="rId14"/>
     <p:sldId id="292" r:id="rId15"/>
     <p:sldId id="275" r:id="rId16"/>
@@ -1626,17 +1626,8 @@
           <a:p>
             <a:r>
               <a:rPr lang="nb-NO" dirty="0"/>
-              <a:t>Microsoft ansvar vs. vårt ansvar </a:t>
-            </a:r>
-          </a:p>
-          <a:p>
-            <a:r>
-              <a:rPr lang="nb-NO" dirty="0"/>
-              <a:t>Selv om Microsoft er en sikker plattform, så er det ikke vanskelig å lage et system i skyen . Det hviler derfor et stort ansvar på oss som  utvikler systemer der.</a:t>
-            </a:r>
-          </a:p>
-          <a:p>
-            <a:endParaRPr lang="nb-NO" dirty="0"/>
+              <a:t>Data de stort sett hackere er ute etter.</a:t>
+            </a:r>
           </a:p>
         </p:txBody>
       </p:sp>
@@ -1666,7 +1657,7 @@
     </p:spTree>
     <p:extLst>
       <p:ext uri="{BB962C8B-B14F-4D97-AF65-F5344CB8AC3E}">
-        <p14:creationId xmlns:p14="http://schemas.microsoft.com/office/powerpoint/2010/main" val="2311225978"/>
+        <p14:creationId xmlns:p14="http://schemas.microsoft.com/office/powerpoint/2010/main" val="995312758"/>
       </p:ext>
     </p:extLst>
   </p:cSld>
@@ -1722,8 +1713,17 @@
           <a:p>
             <a:r>
               <a:rPr lang="nb-NO" dirty="0"/>
-              <a:t>Data de stort sett hackere er ute etter.</a:t>
-            </a:r>
+              <a:t>Microsoft ansvar vs. vårt ansvar </a:t>
+            </a:r>
+          </a:p>
+          <a:p>
+            <a:r>
+              <a:rPr lang="nb-NO" dirty="0"/>
+              <a:t>Selv om Microsoft er en sikker plattform, så er det ikke vanskelig å lage et system i skyen . Det hviler derfor et stort ansvar på oss som  utvikler systemer der.</a:t>
+            </a:r>
+          </a:p>
+          <a:p>
+            <a:endParaRPr lang="nb-NO" dirty="0"/>
           </a:p>
         </p:txBody>
       </p:sp>
@@ -1753,7 +1753,7 @@
     </p:spTree>
     <p:extLst>
       <p:ext uri="{BB962C8B-B14F-4D97-AF65-F5344CB8AC3E}">
-        <p14:creationId xmlns:p14="http://schemas.microsoft.com/office/powerpoint/2010/main" val="995312758"/>
+        <p14:creationId xmlns:p14="http://schemas.microsoft.com/office/powerpoint/2010/main" val="2311225978"/>
       </p:ext>
     </p:extLst>
   </p:cSld>
@@ -1818,15 +1818,7 @@
           <a:p>
             <a:r>
               <a:rPr lang="nb-NO" dirty="0"/>
-              <a:t>Analyserer enorme </a:t>
-            </a:r>
-            <a:r>
-              <a:rPr lang="nb-NO" dirty="0" err="1"/>
-              <a:t>mender</a:t>
-            </a:r>
-            <a:r>
-              <a:rPr lang="nb-NO" dirty="0"/>
-              <a:t> data for </a:t>
+              <a:t>Analyserer enorme mender data/signaler. </a:t>
             </a:r>
           </a:p>
         </p:txBody>
@@ -11689,6 +11681,27 @@
             </a:pPr>
             <a:endParaRPr lang="nb-NO" sz="4400" dirty="0"/>
           </a:p>
+          <a:p>
+            <a:pPr marL="0" indent="0">
+              <a:buNone/>
+            </a:pPr>
+            <a:endParaRPr lang="nb-NO" sz="4400" dirty="0"/>
+          </a:p>
+          <a:p>
+            <a:pPr marL="0" indent="0">
+              <a:buNone/>
+            </a:pPr>
+            <a:endParaRPr lang="nb-NO" sz="4400" dirty="0"/>
+          </a:p>
+          <a:p>
+            <a:pPr marL="0" indent="0">
+              <a:buNone/>
+            </a:pPr>
+            <a:r>
+              <a:rPr lang="nb-NO" sz="4400" dirty="0"/>
+              <a:t>Google: Azureskolen </a:t>
+            </a:r>
+          </a:p>
         </p:txBody>
       </p:sp>
       <p:sp>
@@ -11862,12 +11875,15 @@
           <a:p>
             <a:pPr lvl="1"/>
             <a:r>
-              <a:rPr lang="nb-NO" dirty="0" err="1"/>
-              <a:t>Priviligued</a:t>
-            </a:r>
-            <a:r>
               <a:rPr lang="nb-NO" dirty="0"/>
-              <a:t> Identity Management</a:t>
+              <a:t>Privilgued Identity Management</a:t>
+            </a:r>
+          </a:p>
+          <a:p>
+            <a:pPr lvl="1"/>
+            <a:r>
+              <a:rPr lang="nb-NO" dirty="0"/>
+              <a:t>Identity Protection</a:t>
             </a:r>
           </a:p>
           <a:p>
@@ -12401,9 +12417,9 @@
             </a:r>
           </a:p>
           <a:p>
-            <a:endParaRPr lang="nb-NO" dirty="0"/>
-          </a:p>
-          <a:p>
+            <a:pPr marL="0" indent="0">
+              <a:buNone/>
+            </a:pPr>
             <a:endParaRPr lang="nb-NO" dirty="0"/>
           </a:p>
           <a:p>
@@ -12462,15 +12478,7 @@
           <a:p>
             <a:r>
               <a:rPr lang="nb-NO" dirty="0"/>
-              <a:t>Kan registrere tilganger (</a:t>
-            </a:r>
-            <a:r>
-              <a:rPr lang="nb-NO" dirty="0" err="1"/>
-              <a:t>scopes</a:t>
-            </a:r>
-            <a:r>
-              <a:rPr lang="nb-NO" dirty="0"/>
-              <a:t>) som brukeren aktivt må godkjenne at applikasjonen skal ha tilgang gil.</a:t>
+              <a:t>Kan registrere tilganger (scopes) som brukeren aktivt må godkjenne at applikasjonen skal ha tilgang til.</a:t>
             </a:r>
           </a:p>
           <a:p>
@@ -13290,16 +13298,11 @@
           <a:p>
             <a:r>
               <a:rPr lang="nb-NO" dirty="0"/>
-              <a:t>Leksjon 1: Azure </a:t>
-            </a:r>
-            <a:r>
-              <a:rPr lang="nb-NO" dirty="0" err="1"/>
-              <a:t>DevOps</a:t>
-            </a:r>
-            <a:r>
-              <a:rPr lang="nb-NO" dirty="0"/>
-              <a:t> og Azure Security Center</a:t>
-            </a:r>
+              <a:t>Leksjon 1: Forberedelse, SAS-tokens og Azure Security Center</a:t>
+            </a:r>
+          </a:p>
+          <a:p>
+            <a:endParaRPr lang="nb-NO" dirty="0"/>
           </a:p>
           <a:p>
             <a:r>
@@ -13316,6 +13319,9 @@
               <a:rPr lang="nb-NO" dirty="0"/>
               <a:t>Leksjon 2: Azure AD og autentisering/autorisasjon</a:t>
             </a:r>
+          </a:p>
+          <a:p>
+            <a:endParaRPr lang="nb-NO" dirty="0"/>
           </a:p>
           <a:p>
             <a:r>
@@ -13534,166 +13540,6 @@
 </file>
 
 <file path=ppt/slides/slide6.xml><?xml version="1.0" encoding="utf-8"?>
-<p:sld xmlns:a="http://schemas.openxmlformats.org/drawingml/2006/main" xmlns:r="http://schemas.openxmlformats.org/officeDocument/2006/relationships" xmlns:p="http://schemas.openxmlformats.org/presentationml/2006/main">
-  <p:cSld>
-    <p:spTree>
-      <p:nvGrpSpPr>
-        <p:cNvPr id="1" name=""/>
-        <p:cNvGrpSpPr/>
-        <p:nvPr/>
-      </p:nvGrpSpPr>
-      <p:grpSpPr>
-        <a:xfrm>
-          <a:off x="0" y="0"/>
-          <a:ext cx="0" cy="0"/>
-          <a:chOff x="0" y="0"/>
-          <a:chExt cx="0" cy="0"/>
-        </a:xfrm>
-      </p:grpSpPr>
-      <p:sp>
-        <p:nvSpPr>
-          <p:cNvPr id="3" name="Title 2">
-            <a:extLst>
-              <a:ext uri="{FF2B5EF4-FFF2-40B4-BE49-F238E27FC236}">
-                <a16:creationId xmlns:a16="http://schemas.microsoft.com/office/drawing/2014/main" id="{A186454E-924F-4205-B381-547460A34916}"/>
-              </a:ext>
-            </a:extLst>
-          </p:cNvPr>
-          <p:cNvSpPr>
-            <a:spLocks noGrp="1"/>
-          </p:cNvSpPr>
-          <p:nvPr>
-            <p:ph type="title"/>
-          </p:nvPr>
-        </p:nvSpPr>
-        <p:spPr/>
-        <p:txBody>
-          <a:bodyPr/>
-          <a:lstStyle/>
-          <a:p>
-            <a:r>
-              <a:rPr lang="nb-NO" dirty="0"/>
-              <a:t>Delt ansvar.</a:t>
-            </a:r>
-          </a:p>
-        </p:txBody>
-      </p:sp>
-      <p:pic>
-        <p:nvPicPr>
-          <p:cNvPr id="5" name="Content Placeholder 4" descr="A screenshot of a cell phone&#10;&#10;Description automatically generated">
-            <a:extLst>
-              <a:ext uri="{FF2B5EF4-FFF2-40B4-BE49-F238E27FC236}">
-                <a16:creationId xmlns:a16="http://schemas.microsoft.com/office/drawing/2014/main" id="{DB784447-069E-40B2-A426-53EB360E4C6C}"/>
-              </a:ext>
-            </a:extLst>
-          </p:cNvPr>
-          <p:cNvPicPr>
-            <a:picLocks noGrp="1" noChangeAspect="1"/>
-          </p:cNvPicPr>
-          <p:nvPr>
-            <p:ph idx="1"/>
-          </p:nvPr>
-        </p:nvPicPr>
-        <p:blipFill>
-          <a:blip r:embed="rId3">
-            <a:extLst>
-              <a:ext uri="{28A0092B-C50C-407E-A947-70E740481C1C}">
-                <a14:useLocalDpi xmlns:a14="http://schemas.microsoft.com/office/drawing/2010/main" val="0"/>
-              </a:ext>
-            </a:extLst>
-          </a:blip>
-          <a:stretch>
-            <a:fillRect/>
-          </a:stretch>
-        </p:blipFill>
-        <p:spPr>
-          <a:xfrm>
-            <a:off x="1848138" y="1825625"/>
-            <a:ext cx="3209925" cy="4010025"/>
-          </a:xfrm>
-        </p:spPr>
-      </p:pic>
-      <p:sp>
-        <p:nvSpPr>
-          <p:cNvPr id="2" name="Content Placeholder 1">
-            <a:extLst>
-              <a:ext uri="{FF2B5EF4-FFF2-40B4-BE49-F238E27FC236}">
-                <a16:creationId xmlns:a16="http://schemas.microsoft.com/office/drawing/2014/main" id="{32E9A007-E535-454D-98C0-DB315BCEB216}"/>
-              </a:ext>
-            </a:extLst>
-          </p:cNvPr>
-          <p:cNvSpPr>
-            <a:spLocks noGrp="1"/>
-          </p:cNvSpPr>
-          <p:nvPr>
-            <p:ph idx="13"/>
-          </p:nvPr>
-        </p:nvSpPr>
-        <p:spPr/>
-        <p:txBody>
-          <a:bodyPr/>
-          <a:lstStyle/>
-          <a:p>
-            <a:r>
-              <a:rPr lang="nb-NO" dirty="0"/>
-              <a:t>Microsoft ansvar vs. vårt ansvar </a:t>
-            </a:r>
-          </a:p>
-          <a:p>
-            <a:r>
-              <a:rPr lang="nb-NO" dirty="0"/>
-              <a:t>Selv om Microsoft er en sikker plattform, så er det ikke vanskelig å lage et system i skyen som ikke er sikker.</a:t>
-            </a:r>
-          </a:p>
-          <a:p>
-            <a:r>
-              <a:rPr lang="nb-NO" dirty="0"/>
-              <a:t>Hvis man ønsker å sikre dataene sine, så må man gjøre en jobb uansett om det er </a:t>
-            </a:r>
-            <a:r>
-              <a:rPr lang="nb-NO" dirty="0" err="1"/>
-              <a:t>SaaS</a:t>
-            </a:r>
-            <a:r>
-              <a:rPr lang="nb-NO" dirty="0"/>
-              <a:t>, </a:t>
-            </a:r>
-            <a:r>
-              <a:rPr lang="nb-NO" dirty="0" err="1"/>
-              <a:t>PaaS</a:t>
-            </a:r>
-            <a:r>
-              <a:rPr lang="nb-NO" dirty="0"/>
-              <a:t>, </a:t>
-            </a:r>
-            <a:r>
-              <a:rPr lang="nb-NO" dirty="0" err="1"/>
-              <a:t>IaaS</a:t>
-            </a:r>
-            <a:r>
-              <a:rPr lang="nb-NO" dirty="0"/>
-              <a:t>, men hvor mye kommer an på hvilken løsning man velger</a:t>
-            </a:r>
-          </a:p>
-          <a:p>
-            <a:endParaRPr lang="nb-NO" dirty="0"/>
-          </a:p>
-        </p:txBody>
-      </p:sp>
-    </p:spTree>
-    <p:extLst>
-      <p:ext uri="{BB962C8B-B14F-4D97-AF65-F5344CB8AC3E}">
-        <p14:creationId xmlns:p14="http://schemas.microsoft.com/office/powerpoint/2010/main" val="2892039909"/>
-      </p:ext>
-    </p:extLst>
-  </p:cSld>
-  <p:clrMapOvr>
-    <a:masterClrMapping/>
-  </p:clrMapOvr>
-</p:sld>
-</file>
-
-<file path=ppt/slides/slide7.xml><?xml version="1.0" encoding="utf-8"?>
 <p:sld xmlns:a="http://schemas.openxmlformats.org/drawingml/2006/main" xmlns:r="http://schemas.openxmlformats.org/officeDocument/2006/relationships" xmlns:p="http://schemas.openxmlformats.org/presentationml/2006/main">
   <p:cSld>
     <p:spTree>
@@ -13892,6 +13738,166 @@
 </p:sld>
 </file>
 
+<file path=ppt/slides/slide7.xml><?xml version="1.0" encoding="utf-8"?>
+<p:sld xmlns:a="http://schemas.openxmlformats.org/drawingml/2006/main" xmlns:r="http://schemas.openxmlformats.org/officeDocument/2006/relationships" xmlns:p="http://schemas.openxmlformats.org/presentationml/2006/main">
+  <p:cSld>
+    <p:spTree>
+      <p:nvGrpSpPr>
+        <p:cNvPr id="1" name=""/>
+        <p:cNvGrpSpPr/>
+        <p:nvPr/>
+      </p:nvGrpSpPr>
+      <p:grpSpPr>
+        <a:xfrm>
+          <a:off x="0" y="0"/>
+          <a:ext cx="0" cy="0"/>
+          <a:chOff x="0" y="0"/>
+          <a:chExt cx="0" cy="0"/>
+        </a:xfrm>
+      </p:grpSpPr>
+      <p:sp>
+        <p:nvSpPr>
+          <p:cNvPr id="3" name="Title 2">
+            <a:extLst>
+              <a:ext uri="{FF2B5EF4-FFF2-40B4-BE49-F238E27FC236}">
+                <a16:creationId xmlns:a16="http://schemas.microsoft.com/office/drawing/2014/main" id="{A186454E-924F-4205-B381-547460A34916}"/>
+              </a:ext>
+            </a:extLst>
+          </p:cNvPr>
+          <p:cNvSpPr>
+            <a:spLocks noGrp="1"/>
+          </p:cNvSpPr>
+          <p:nvPr>
+            <p:ph type="title"/>
+          </p:nvPr>
+        </p:nvSpPr>
+        <p:spPr/>
+        <p:txBody>
+          <a:bodyPr/>
+          <a:lstStyle/>
+          <a:p>
+            <a:r>
+              <a:rPr lang="nb-NO" dirty="0"/>
+              <a:t>Delt ansvar.</a:t>
+            </a:r>
+          </a:p>
+        </p:txBody>
+      </p:sp>
+      <p:pic>
+        <p:nvPicPr>
+          <p:cNvPr id="5" name="Content Placeholder 4" descr="A screenshot of a cell phone&#10;&#10;Description automatically generated">
+            <a:extLst>
+              <a:ext uri="{FF2B5EF4-FFF2-40B4-BE49-F238E27FC236}">
+                <a16:creationId xmlns:a16="http://schemas.microsoft.com/office/drawing/2014/main" id="{DB784447-069E-40B2-A426-53EB360E4C6C}"/>
+              </a:ext>
+            </a:extLst>
+          </p:cNvPr>
+          <p:cNvPicPr>
+            <a:picLocks noGrp="1" noChangeAspect="1"/>
+          </p:cNvPicPr>
+          <p:nvPr>
+            <p:ph idx="1"/>
+          </p:nvPr>
+        </p:nvPicPr>
+        <p:blipFill>
+          <a:blip r:embed="rId3">
+            <a:extLst>
+              <a:ext uri="{28A0092B-C50C-407E-A947-70E740481C1C}">
+                <a14:useLocalDpi xmlns:a14="http://schemas.microsoft.com/office/drawing/2010/main" val="0"/>
+              </a:ext>
+            </a:extLst>
+          </a:blip>
+          <a:stretch>
+            <a:fillRect/>
+          </a:stretch>
+        </p:blipFill>
+        <p:spPr>
+          <a:xfrm>
+            <a:off x="1848138" y="1825625"/>
+            <a:ext cx="3209925" cy="4010025"/>
+          </a:xfrm>
+        </p:spPr>
+      </p:pic>
+      <p:sp>
+        <p:nvSpPr>
+          <p:cNvPr id="2" name="Content Placeholder 1">
+            <a:extLst>
+              <a:ext uri="{FF2B5EF4-FFF2-40B4-BE49-F238E27FC236}">
+                <a16:creationId xmlns:a16="http://schemas.microsoft.com/office/drawing/2014/main" id="{32E9A007-E535-454D-98C0-DB315BCEB216}"/>
+              </a:ext>
+            </a:extLst>
+          </p:cNvPr>
+          <p:cNvSpPr>
+            <a:spLocks noGrp="1"/>
+          </p:cNvSpPr>
+          <p:nvPr>
+            <p:ph idx="13"/>
+          </p:nvPr>
+        </p:nvSpPr>
+        <p:spPr/>
+        <p:txBody>
+          <a:bodyPr/>
+          <a:lstStyle/>
+          <a:p>
+            <a:r>
+              <a:rPr lang="nb-NO" dirty="0"/>
+              <a:t>Microsoft ansvar vs. vårt ansvar </a:t>
+            </a:r>
+          </a:p>
+          <a:p>
+            <a:r>
+              <a:rPr lang="nb-NO" dirty="0"/>
+              <a:t>Selv om Microsoft er en sikker plattform, så er det ikke vanskelig å lage et system i skyen som ikke er sikker.</a:t>
+            </a:r>
+          </a:p>
+          <a:p>
+            <a:r>
+              <a:rPr lang="nb-NO" dirty="0"/>
+              <a:t>Hvis man ønsker å sikre dataene sine, så må man gjøre en jobb uansett om det er </a:t>
+            </a:r>
+            <a:r>
+              <a:rPr lang="nb-NO" dirty="0" err="1"/>
+              <a:t>SaaS</a:t>
+            </a:r>
+            <a:r>
+              <a:rPr lang="nb-NO" dirty="0"/>
+              <a:t>, </a:t>
+            </a:r>
+            <a:r>
+              <a:rPr lang="nb-NO" dirty="0" err="1"/>
+              <a:t>PaaS</a:t>
+            </a:r>
+            <a:r>
+              <a:rPr lang="nb-NO" dirty="0"/>
+              <a:t>, </a:t>
+            </a:r>
+            <a:r>
+              <a:rPr lang="nb-NO" dirty="0" err="1"/>
+              <a:t>IaaS</a:t>
+            </a:r>
+            <a:r>
+              <a:rPr lang="nb-NO" dirty="0"/>
+              <a:t>, men hvor mye kommer an på hvilken løsning man velger</a:t>
+            </a:r>
+          </a:p>
+          <a:p>
+            <a:endParaRPr lang="nb-NO" dirty="0"/>
+          </a:p>
+        </p:txBody>
+      </p:sp>
+    </p:spTree>
+    <p:extLst>
+      <p:ext uri="{BB962C8B-B14F-4D97-AF65-F5344CB8AC3E}">
+        <p14:creationId xmlns:p14="http://schemas.microsoft.com/office/powerpoint/2010/main" val="2892039909"/>
+      </p:ext>
+    </p:extLst>
+  </p:cSld>
+  <p:clrMapOvr>
+    <a:masterClrMapping/>
+  </p:clrMapOvr>
+</p:sld>
+</file>
+
 <file path=ppt/slides/slide8.xml><?xml version="1.0" encoding="utf-8"?>
 <p:sld xmlns:a="http://schemas.openxmlformats.org/drawingml/2006/main" xmlns:r="http://schemas.openxmlformats.org/officeDocument/2006/relationships" xmlns:p="http://schemas.openxmlformats.org/presentationml/2006/main">
   <p:cSld>
@@ -13945,19 +13951,8 @@
           <a:p>
             <a:r>
               <a:rPr lang="nb-NO" dirty="0"/>
-              <a:t>Anbefalinger: </a:t>
-            </a:r>
-            <a:r>
-              <a:rPr lang="nb-NO" dirty="0" err="1"/>
-              <a:t>scanner</a:t>
-            </a:r>
-            <a:r>
-              <a:rPr lang="nb-NO" dirty="0"/>
-              <a:t> tjenester for å finne usikker konfigurasjon </a:t>
-            </a:r>
-          </a:p>
-          <a:p>
-            <a:endParaRPr lang="nb-NO" dirty="0"/>
+              <a:t>Anbefalinger: scanner tjenester for å finne usikker konfigurasjon </a:t>
+            </a:r>
           </a:p>
           <a:p>
             <a:r>
@@ -13966,7 +13961,10 @@
             </a:r>
           </a:p>
           <a:p>
-            <a:endParaRPr lang="nb-NO" dirty="0"/>
+            <a:r>
+              <a:rPr lang="nb-NO" dirty="0"/>
+              <a:t>Sikkerhetsscore og compliance</a:t>
+            </a:r>
           </a:p>
           <a:p>
             <a:r>
@@ -15741,6 +15739,12 @@
 </file>
 
 <file path=customXml/item1.xml><?xml version="1.0" encoding="utf-8"?>
+<p:properties xmlns:p="http://schemas.microsoft.com/office/2006/metadata/properties" xmlns:xsi="http://www.w3.org/2001/XMLSchema-instance" xmlns:pc="http://schemas.microsoft.com/office/infopath/2007/PartnerControls">
+  <documentManagement/>
+</p:properties>
+</file>
+
+<file path=customXml/item2.xml><?xml version="1.0" encoding="utf-8"?>
 <ct:contentTypeSchema xmlns:ct="http://schemas.microsoft.com/office/2006/metadata/contentType" xmlns:ma="http://schemas.microsoft.com/office/2006/metadata/properties/metaAttributes" ct:_="" ma:_="" ma:contentTypeName="Document" ma:contentTypeID="0x0101005D3CE5A03C88D04F8FE0CC8617320B29" ma:contentTypeVersion="2" ma:contentTypeDescription="Create a new document." ma:contentTypeScope="" ma:versionID="23c508fadb5761cd27fdc7efc393bb78">
   <xsd:schema xmlns:xsd="http://www.w3.org/2001/XMLSchema" xmlns:xs="http://www.w3.org/2001/XMLSchema" xmlns:p="http://schemas.microsoft.com/office/2006/metadata/properties" xmlns:ns2="323bcd62-7d27-4513-9df1-9bc20f03554b" targetNamespace="http://schemas.microsoft.com/office/2006/metadata/properties" ma:root="true" ma:fieldsID="4120a6a9df7c81c23a4d646d2ccf1355" ns2:_="">
     <xsd:import namespace="323bcd62-7d27-4513-9df1-9bc20f03554b"/>
@@ -15872,12 +15876,6 @@
 </ct:contentTypeSchema>
 </file>
 
-<file path=customXml/item2.xml><?xml version="1.0" encoding="utf-8"?>
-<p:properties xmlns:p="http://schemas.microsoft.com/office/2006/metadata/properties" xmlns:xsi="http://www.w3.org/2001/XMLSchema-instance" xmlns:pc="http://schemas.microsoft.com/office/infopath/2007/PartnerControls">
-  <documentManagement/>
-</p:properties>
-</file>
-
 <file path=customXml/item3.xml><?xml version="1.0" encoding="utf-8"?>
 <?mso-contentType ?>
 <FormTemplates xmlns="http://schemas.microsoft.com/sharepoint/v3/contenttype/forms">
@@ -15888,6 +15886,23 @@
 </file>
 
 <file path=customXml/itemProps1.xml><?xml version="1.0" encoding="utf-8"?>
+<ds:datastoreItem xmlns:ds="http://schemas.openxmlformats.org/officeDocument/2006/customXml" ds:itemID="{9D2CB842-18D5-4EEF-9009-B0CAFCE7AC3E}">
+  <ds:schemaRefs>
+    <ds:schemaRef ds:uri="http://schemas.microsoft.com/office/2006/documentManagement/types"/>
+    <ds:schemaRef ds:uri="http://schemas.microsoft.com/office/infopath/2007/PartnerControls"/>
+    <ds:schemaRef ds:uri="cd7095a3-97f1-4663-a71f-a762e9d8a5de"/>
+    <ds:schemaRef ds:uri="http://purl.org/dc/elements/1.1/"/>
+    <ds:schemaRef ds:uri="http://schemas.microsoft.com/office/2006/metadata/properties"/>
+    <ds:schemaRef ds:uri="http://schemas.microsoft.com/sharepoint/v3"/>
+    <ds:schemaRef ds:uri="http://purl.org/dc/terms/"/>
+    <ds:schemaRef ds:uri="http://schemas.openxmlformats.org/package/2006/metadata/core-properties"/>
+    <ds:schemaRef ds:uri="http://www.w3.org/XML/1998/namespace"/>
+    <ds:schemaRef ds:uri="http://purl.org/dc/dcmitype/"/>
+  </ds:schemaRefs>
+</ds:datastoreItem>
+</file>
+
+<file path=customXml/itemProps2.xml><?xml version="1.0" encoding="utf-8"?>
 <ds:datastoreItem xmlns:ds="http://schemas.openxmlformats.org/officeDocument/2006/customXml" ds:itemID="{0377EA4A-9170-43AD-A052-6EABC948F73F}">
   <ds:schemaRefs>
     <ds:schemaRef ds:uri="http://schemas.microsoft.com/office/2006/metadata/contentType"/>
@@ -15905,23 +15920,6 @@
 </ds:datastoreItem>
 </file>
 
-<file path=customXml/itemProps2.xml><?xml version="1.0" encoding="utf-8"?>
-<ds:datastoreItem xmlns:ds="http://schemas.openxmlformats.org/officeDocument/2006/customXml" ds:itemID="{9D2CB842-18D5-4EEF-9009-B0CAFCE7AC3E}">
-  <ds:schemaRefs>
-    <ds:schemaRef ds:uri="http://schemas.microsoft.com/office/2006/documentManagement/types"/>
-    <ds:schemaRef ds:uri="http://schemas.microsoft.com/office/infopath/2007/PartnerControls"/>
-    <ds:schemaRef ds:uri="cd7095a3-97f1-4663-a71f-a762e9d8a5de"/>
-    <ds:schemaRef ds:uri="http://purl.org/dc/elements/1.1/"/>
-    <ds:schemaRef ds:uri="http://schemas.microsoft.com/office/2006/metadata/properties"/>
-    <ds:schemaRef ds:uri="http://schemas.microsoft.com/sharepoint/v3"/>
-    <ds:schemaRef ds:uri="http://purl.org/dc/terms/"/>
-    <ds:schemaRef ds:uri="http://schemas.openxmlformats.org/package/2006/metadata/core-properties"/>
-    <ds:schemaRef ds:uri="http://www.w3.org/XML/1998/namespace"/>
-    <ds:schemaRef ds:uri="http://purl.org/dc/dcmitype/"/>
-  </ds:schemaRefs>
-</ds:datastoreItem>
-</file>
-
 <file path=customXml/itemProps3.xml><?xml version="1.0" encoding="utf-8"?>
 <ds:datastoreItem xmlns:ds="http://schemas.openxmlformats.org/officeDocument/2006/customXml" ds:itemID="{BB82CC63-55FC-4D22-9ED3-DB88AF6228E1}">
   <ds:schemaRefs>

</xml_diff>

<commit_message>
Proofreeding and updated presentation
</commit_message>
<xml_diff>
--- a/Workshop_3/Presentasjon/Azureskolen-Workshop#3.pptx
+++ b/Workshop_3/Presentasjon/Azureskolen-Workshop#3.pptx
@@ -7,29 +7,36 @@
     <p:sldMasterId id="2147483705" r:id="rId6"/>
   </p:sldMasterIdLst>
   <p:notesMasterIdLst>
-    <p:notesMasterId r:id="rId24"/>
+    <p:notesMasterId r:id="rId31"/>
   </p:notesMasterIdLst>
   <p:handoutMasterIdLst>
-    <p:handoutMasterId r:id="rId25"/>
+    <p:handoutMasterId r:id="rId32"/>
   </p:handoutMasterIdLst>
   <p:sldIdLst>
     <p:sldId id="256" r:id="rId7"/>
     <p:sldId id="257" r:id="rId8"/>
     <p:sldId id="259" r:id="rId9"/>
     <p:sldId id="260" r:id="rId10"/>
-    <p:sldId id="284" r:id="rId11"/>
-    <p:sldId id="291" r:id="rId12"/>
-    <p:sldId id="294" r:id="rId13"/>
-    <p:sldId id="290" r:id="rId14"/>
-    <p:sldId id="292" r:id="rId15"/>
-    <p:sldId id="275" r:id="rId16"/>
-    <p:sldId id="288" r:id="rId17"/>
-    <p:sldId id="297" r:id="rId18"/>
-    <p:sldId id="296" r:id="rId19"/>
-    <p:sldId id="295" r:id="rId20"/>
-    <p:sldId id="280" r:id="rId21"/>
-    <p:sldId id="287" r:id="rId22"/>
-    <p:sldId id="286" r:id="rId23"/>
+    <p:sldId id="292" r:id="rId11"/>
+    <p:sldId id="284" r:id="rId12"/>
+    <p:sldId id="291" r:id="rId13"/>
+    <p:sldId id="294" r:id="rId14"/>
+    <p:sldId id="306" r:id="rId15"/>
+    <p:sldId id="290" r:id="rId16"/>
+    <p:sldId id="302" r:id="rId17"/>
+    <p:sldId id="303" r:id="rId18"/>
+    <p:sldId id="304" r:id="rId19"/>
+    <p:sldId id="305" r:id="rId20"/>
+    <p:sldId id="275" r:id="rId21"/>
+    <p:sldId id="288" r:id="rId22"/>
+    <p:sldId id="297" r:id="rId23"/>
+    <p:sldId id="296" r:id="rId24"/>
+    <p:sldId id="295" r:id="rId25"/>
+    <p:sldId id="298" r:id="rId26"/>
+    <p:sldId id="280" r:id="rId27"/>
+    <p:sldId id="287" r:id="rId28"/>
+    <p:sldId id="307" r:id="rId29"/>
+    <p:sldId id="286" r:id="rId30"/>
   </p:sldIdLst>
   <p:sldSz cx="12192000" cy="6858000"/>
   <p:notesSz cx="6858000" cy="9144000"/>
@@ -592,7 +599,7 @@
           <a:p>
             <a:fld id="{54C52192-B826-4AE0-9CD6-BEA9467D12B3}" type="datetimeFigureOut">
               <a:rPr lang="nb-NO" smtClean="0"/>
-              <a:t>21.01.2020</a:t>
+              <a:t>18.02.2020</a:t>
             </a:fld>
             <a:endParaRPr lang="nb-NO"/>
           </a:p>
@@ -757,7 +764,7 @@
           <a:p>
             <a:fld id="{2696BCB2-2760-41B1-A1BE-7886EF110FCB}" type="datetimeFigureOut">
               <a:rPr lang="nb-NO" smtClean="0"/>
-              <a:t>21.01.2020</a:t>
+              <a:t>18.02.2020</a:t>
             </a:fld>
             <a:endParaRPr lang="nb-NO"/>
           </a:p>
@@ -1158,13 +1165,119 @@
           <a:p>
             <a:r>
               <a:rPr lang="nb-NO" dirty="0"/>
-              <a:t>Vise Azure AD i portalen:</a:t>
-            </a:r>
-          </a:p>
-          <a:p>
-            <a:r>
-              <a:rPr lang="nb-NO" dirty="0"/>
-              <a:t>- </a:t>
+              <a:t>MFA:</a:t>
+            </a:r>
+          </a:p>
+          <a:p>
+            <a:r>
+              <a:rPr lang="en-US" sz="1200" b="0" i="1" kern="1200" dirty="0">
+                <a:solidFill>
+                  <a:schemeClr val="tx1"/>
+                </a:solidFill>
+                <a:effectLst/>
+                <a:latin typeface="+mn-lt"/>
+                <a:ea typeface="+mn-ea"/>
+                <a:cs typeface="+mn-cs"/>
+              </a:rPr>
+              <a:t>Something you know</a:t>
+            </a:r>
+            <a:endParaRPr lang="en-US" sz="1200" b="0" i="0" kern="1200" dirty="0">
+              <a:solidFill>
+                <a:schemeClr val="tx1"/>
+              </a:solidFill>
+              <a:effectLst/>
+              <a:latin typeface="+mn-lt"/>
+              <a:ea typeface="+mn-ea"/>
+              <a:cs typeface="+mn-cs"/>
+            </a:endParaRPr>
+          </a:p>
+          <a:p>
+            <a:r>
+              <a:rPr lang="en-US" sz="1200" b="0" i="1" kern="1200" dirty="0">
+                <a:solidFill>
+                  <a:schemeClr val="tx1"/>
+                </a:solidFill>
+                <a:effectLst/>
+                <a:latin typeface="+mn-lt"/>
+                <a:ea typeface="+mn-ea"/>
+                <a:cs typeface="+mn-cs"/>
+              </a:rPr>
+              <a:t>Something you possess</a:t>
+            </a:r>
+            <a:endParaRPr lang="en-US" sz="1200" b="0" i="0" kern="1200" dirty="0">
+              <a:solidFill>
+                <a:schemeClr val="tx1"/>
+              </a:solidFill>
+              <a:effectLst/>
+              <a:latin typeface="+mn-lt"/>
+              <a:ea typeface="+mn-ea"/>
+              <a:cs typeface="+mn-cs"/>
+            </a:endParaRPr>
+          </a:p>
+          <a:p>
+            <a:r>
+              <a:rPr lang="en-US" sz="1200" b="0" i="1" kern="1200" dirty="0">
+                <a:solidFill>
+                  <a:schemeClr val="tx1"/>
+                </a:solidFill>
+                <a:effectLst/>
+                <a:latin typeface="+mn-lt"/>
+                <a:ea typeface="+mn-ea"/>
+                <a:cs typeface="+mn-cs"/>
+              </a:rPr>
+              <a:t>Something you are</a:t>
+            </a:r>
+            <a:endParaRPr lang="en-US" sz="1200" b="0" i="0" kern="1200" dirty="0">
+              <a:solidFill>
+                <a:schemeClr val="tx1"/>
+              </a:solidFill>
+              <a:effectLst/>
+              <a:latin typeface="+mn-lt"/>
+              <a:ea typeface="+mn-ea"/>
+              <a:cs typeface="+mn-cs"/>
+            </a:endParaRPr>
+          </a:p>
+          <a:p>
+            <a:endParaRPr lang="nb-NO" dirty="0"/>
+          </a:p>
+          <a:p>
+            <a:r>
+              <a:rPr lang="en-US" sz="1200" b="0" i="0" kern="1200" dirty="0">
+                <a:solidFill>
+                  <a:schemeClr val="tx1"/>
+                </a:solidFill>
+                <a:effectLst/>
+                <a:latin typeface="+mn-lt"/>
+                <a:ea typeface="+mn-ea"/>
+                <a:cs typeface="+mn-cs"/>
+              </a:rPr>
+              <a:t>By leveraging Azure AD for SSO you'll also have the ability to combine multiple data sources into an intelligent security graph</a:t>
+            </a:r>
+          </a:p>
+          <a:p>
+            <a:endParaRPr lang="en-US" sz="1200" b="0" i="0" kern="1200" dirty="0">
+              <a:solidFill>
+                <a:schemeClr val="tx1"/>
+              </a:solidFill>
+              <a:effectLst/>
+              <a:latin typeface="+mn-lt"/>
+              <a:ea typeface="+mn-ea"/>
+              <a:cs typeface="+mn-cs"/>
+            </a:endParaRPr>
+          </a:p>
+          <a:p>
+            <a:r>
+              <a:rPr lang="nb-NO" dirty="0">
+                <a:hlinkClick r:id="rId3"/>
+              </a:rPr>
+              <a:t>https://docs.microsoft.com/nb-no/learn/modules/intro-to-security-in-azure/3-identity-and-access</a:t>
+            </a:r>
+            <a:endParaRPr lang="nb-NO" dirty="0"/>
+          </a:p>
+          <a:p>
+            <a:r>
+              <a:rPr lang="nb-NO" dirty="0"/>
+              <a:t>Tig</a:t>
             </a:r>
           </a:p>
         </p:txBody>
@@ -1186,7 +1299,7 @@
           <a:p>
             <a:fld id="{180377DB-C4B0-49B2-8838-0F01BA83B7C4}" type="slidenum">
               <a:rPr lang="nb-NO" smtClean="0"/>
-              <a:t>15</a:t>
+              <a:t>16</a:t>
             </a:fld>
             <a:endParaRPr lang="nb-NO"/>
           </a:p>
@@ -1195,7 +1308,7 @@
     </p:spTree>
     <p:extLst>
       <p:ext uri="{BB962C8B-B14F-4D97-AF65-F5344CB8AC3E}">
-        <p14:creationId xmlns:p14="http://schemas.microsoft.com/office/powerpoint/2010/main" val="2906306431"/>
+        <p14:creationId xmlns:p14="http://schemas.microsoft.com/office/powerpoint/2010/main" val="1334592713"/>
       </p:ext>
     </p:extLst>
   </p:cSld>
@@ -1250,46 +1363,9 @@
           <a:lstStyle/>
           <a:p>
             <a:r>
-              <a:rPr lang="nb-NO" dirty="0">
-                <a:hlinkClick r:id="rId3"/>
-              </a:rPr>
-              <a:t>https://docs.microsoft.com/nb-no/learn/modules/intro-to-security-in-azure/5-network-security</a:t>
-            </a:r>
-            <a:endParaRPr lang="nb-NO" dirty="0"/>
-          </a:p>
-          <a:p>
-            <a:endParaRPr lang="nb-NO" dirty="0"/>
-          </a:p>
-          <a:p>
-            <a:r>
-              <a:rPr lang="en-US" sz="1200" b="0" i="0" kern="1200" dirty="0">
-                <a:solidFill>
-                  <a:schemeClr val="tx1"/>
-                </a:solidFill>
-                <a:effectLst/>
-                <a:latin typeface="+mn-lt"/>
-                <a:ea typeface="+mn-ea"/>
-                <a:cs typeface="+mn-cs"/>
-              </a:rPr>
-              <a:t>A layered approach to network security helps reduce your risk of exposure through network-based attacks. Azure provides several services and capabilities to secure your internet-facing resource, internal resources, and communication between on-premises networks. These features make it possible to create secure solutions on Azure.</a:t>
-            </a:r>
-          </a:p>
-          <a:p>
-            <a:r>
-              <a:rPr lang="en-US" sz="1200" b="0" i="0" kern="1200" dirty="0">
-                <a:solidFill>
-                  <a:schemeClr val="tx1"/>
-                </a:solidFill>
-                <a:effectLst/>
-                <a:latin typeface="+mn-lt"/>
-                <a:ea typeface="+mn-ea"/>
-                <a:cs typeface="+mn-cs"/>
-              </a:rPr>
-              <a:t>You can also combine multiple Azure networking and security services to manage your network security and provide increased layered protection. For example, you can use Azure Firewall to protect inbound and outbound traffic to the Internet, and Network Security Groups to limit traffic to resources inside your virtual networks.</a:t>
-            </a:r>
-          </a:p>
-          <a:p>
-            <a:endParaRPr lang="nb-NO" dirty="0"/>
+              <a:rPr lang="nb-NO" dirty="0"/>
+              <a:t>Vi skal ikke gå inn på Service Prinsipals eller Managed Identity i denne leksjonen.</a:t>
+            </a:r>
           </a:p>
         </p:txBody>
       </p:sp>
@@ -1310,7 +1386,7 @@
           <a:p>
             <a:fld id="{180377DB-C4B0-49B2-8838-0F01BA83B7C4}" type="slidenum">
               <a:rPr lang="nb-NO" smtClean="0"/>
-              <a:t>16</a:t>
+              <a:t>17</a:t>
             </a:fld>
             <a:endParaRPr lang="nb-NO"/>
           </a:p>
@@ -1319,7 +1395,7 @@
     </p:spTree>
     <p:extLst>
       <p:ext uri="{BB962C8B-B14F-4D97-AF65-F5344CB8AC3E}">
-        <p14:creationId xmlns:p14="http://schemas.microsoft.com/office/powerpoint/2010/main" val="3298195449"/>
+        <p14:creationId xmlns:p14="http://schemas.microsoft.com/office/powerpoint/2010/main" val="3738408422"/>
       </p:ext>
     </p:extLst>
   </p:cSld>
@@ -1373,7 +1449,10 @@
           <a:bodyPr/>
           <a:lstStyle/>
           <a:p>
-            <a:endParaRPr lang="nb-NO" dirty="0"/>
+            <a:r>
+              <a:rPr lang="nb-NO" dirty="0"/>
+              <a:t>Vis</a:t>
+            </a:r>
           </a:p>
         </p:txBody>
       </p:sp>
@@ -1394,7 +1473,308 @@
           <a:p>
             <a:fld id="{180377DB-C4B0-49B2-8838-0F01BA83B7C4}" type="slidenum">
               <a:rPr lang="nb-NO" smtClean="0"/>
-              <a:t>17</a:t>
+              <a:t>19</a:t>
+            </a:fld>
+            <a:endParaRPr lang="nb-NO"/>
+          </a:p>
+        </p:txBody>
+      </p:sp>
+    </p:spTree>
+    <p:extLst>
+      <p:ext uri="{BB962C8B-B14F-4D97-AF65-F5344CB8AC3E}">
+        <p14:creationId xmlns:p14="http://schemas.microsoft.com/office/powerpoint/2010/main" val="1111845549"/>
+      </p:ext>
+    </p:extLst>
+  </p:cSld>
+  <p:clrMapOvr>
+    <a:masterClrMapping/>
+  </p:clrMapOvr>
+</p:notes>
+</file>
+
+<file path=ppt/notesSlides/notesSlide13.xml><?xml version="1.0" encoding="utf-8"?>
+<p:notes xmlns:a="http://schemas.openxmlformats.org/drawingml/2006/main" xmlns:r="http://schemas.openxmlformats.org/officeDocument/2006/relationships" xmlns:p="http://schemas.openxmlformats.org/presentationml/2006/main">
+  <p:cSld>
+    <p:spTree>
+      <p:nvGrpSpPr>
+        <p:cNvPr id="1" name=""/>
+        <p:cNvGrpSpPr/>
+        <p:nvPr/>
+      </p:nvGrpSpPr>
+      <p:grpSpPr>
+        <a:xfrm>
+          <a:off x="0" y="0"/>
+          <a:ext cx="0" cy="0"/>
+          <a:chOff x="0" y="0"/>
+          <a:chExt cx="0" cy="0"/>
+        </a:xfrm>
+      </p:grpSpPr>
+      <p:sp>
+        <p:nvSpPr>
+          <p:cNvPr id="2" name="Slide Image Placeholder 1"/>
+          <p:cNvSpPr>
+            <a:spLocks noGrp="1" noRot="1" noChangeAspect="1"/>
+          </p:cNvSpPr>
+          <p:nvPr>
+            <p:ph type="sldImg"/>
+          </p:nvPr>
+        </p:nvSpPr>
+        <p:spPr/>
+      </p:sp>
+      <p:sp>
+        <p:nvSpPr>
+          <p:cNvPr id="3" name="Notes Placeholder 2"/>
+          <p:cNvSpPr>
+            <a:spLocks noGrp="1"/>
+          </p:cNvSpPr>
+          <p:nvPr>
+            <p:ph type="body" idx="1"/>
+          </p:nvPr>
+        </p:nvSpPr>
+        <p:spPr/>
+        <p:txBody>
+          <a:bodyPr/>
+          <a:lstStyle/>
+          <a:p>
+            <a:r>
+              <a:rPr lang="nb-NO" dirty="0"/>
+              <a:t>Vise Azure AD i portalen:</a:t>
+            </a:r>
+          </a:p>
+          <a:p>
+            <a:r>
+              <a:rPr lang="nb-NO" dirty="0"/>
+              <a:t>- </a:t>
+            </a:r>
+          </a:p>
+        </p:txBody>
+      </p:sp>
+      <p:sp>
+        <p:nvSpPr>
+          <p:cNvPr id="4" name="Slide Number Placeholder 3"/>
+          <p:cNvSpPr>
+            <a:spLocks noGrp="1"/>
+          </p:cNvSpPr>
+          <p:nvPr>
+            <p:ph type="sldNum" sz="quarter" idx="5"/>
+          </p:nvPr>
+        </p:nvSpPr>
+        <p:spPr/>
+        <p:txBody>
+          <a:bodyPr/>
+          <a:lstStyle/>
+          <a:p>
+            <a:fld id="{180377DB-C4B0-49B2-8838-0F01BA83B7C4}" type="slidenum">
+              <a:rPr lang="nb-NO" smtClean="0"/>
+              <a:t>21</a:t>
+            </a:fld>
+            <a:endParaRPr lang="nb-NO"/>
+          </a:p>
+        </p:txBody>
+      </p:sp>
+    </p:spTree>
+    <p:extLst>
+      <p:ext uri="{BB962C8B-B14F-4D97-AF65-F5344CB8AC3E}">
+        <p14:creationId xmlns:p14="http://schemas.microsoft.com/office/powerpoint/2010/main" val="2906306431"/>
+      </p:ext>
+    </p:extLst>
+  </p:cSld>
+  <p:clrMapOvr>
+    <a:masterClrMapping/>
+  </p:clrMapOvr>
+</p:notes>
+</file>
+
+<file path=ppt/notesSlides/notesSlide14.xml><?xml version="1.0" encoding="utf-8"?>
+<p:notes xmlns:a="http://schemas.openxmlformats.org/drawingml/2006/main" xmlns:r="http://schemas.openxmlformats.org/officeDocument/2006/relationships" xmlns:p="http://schemas.openxmlformats.org/presentationml/2006/main">
+  <p:cSld>
+    <p:spTree>
+      <p:nvGrpSpPr>
+        <p:cNvPr id="1" name=""/>
+        <p:cNvGrpSpPr/>
+        <p:nvPr/>
+      </p:nvGrpSpPr>
+      <p:grpSpPr>
+        <a:xfrm>
+          <a:off x="0" y="0"/>
+          <a:ext cx="0" cy="0"/>
+          <a:chOff x="0" y="0"/>
+          <a:chExt cx="0" cy="0"/>
+        </a:xfrm>
+      </p:grpSpPr>
+      <p:sp>
+        <p:nvSpPr>
+          <p:cNvPr id="2" name="Slide Image Placeholder 1"/>
+          <p:cNvSpPr>
+            <a:spLocks noGrp="1" noRot="1" noChangeAspect="1"/>
+          </p:cNvSpPr>
+          <p:nvPr>
+            <p:ph type="sldImg"/>
+          </p:nvPr>
+        </p:nvSpPr>
+        <p:spPr/>
+      </p:sp>
+      <p:sp>
+        <p:nvSpPr>
+          <p:cNvPr id="3" name="Notes Placeholder 2"/>
+          <p:cNvSpPr>
+            <a:spLocks noGrp="1"/>
+          </p:cNvSpPr>
+          <p:nvPr>
+            <p:ph type="body" idx="1"/>
+          </p:nvPr>
+        </p:nvSpPr>
+        <p:spPr/>
+        <p:txBody>
+          <a:bodyPr/>
+          <a:lstStyle/>
+          <a:p>
+            <a:r>
+              <a:rPr lang="nb-NO" dirty="0">
+                <a:hlinkClick r:id="rId3"/>
+              </a:rPr>
+              <a:t>https://docs.microsoft.com/nb-no/learn/modules/intro-to-security-in-azure/5-network-security</a:t>
+            </a:r>
+            <a:endParaRPr lang="nb-NO" dirty="0"/>
+          </a:p>
+          <a:p>
+            <a:endParaRPr lang="nb-NO" dirty="0"/>
+          </a:p>
+          <a:p>
+            <a:r>
+              <a:rPr lang="en-US" sz="1200" b="0" i="0" kern="1200" dirty="0">
+                <a:solidFill>
+                  <a:schemeClr val="tx1"/>
+                </a:solidFill>
+                <a:effectLst/>
+                <a:latin typeface="+mn-lt"/>
+                <a:ea typeface="+mn-ea"/>
+                <a:cs typeface="+mn-cs"/>
+              </a:rPr>
+              <a:t>A layered approach to network security helps reduce your risk of exposure through network-based attacks. Azure provides several services and capabilities to secure your internet-facing resource, internal resources, and communication between on-premises networks. These features make it possible to create secure solutions on Azure.</a:t>
+            </a:r>
+          </a:p>
+          <a:p>
+            <a:r>
+              <a:rPr lang="en-US" sz="1200" b="0" i="0" kern="1200" dirty="0">
+                <a:solidFill>
+                  <a:schemeClr val="tx1"/>
+                </a:solidFill>
+                <a:effectLst/>
+                <a:latin typeface="+mn-lt"/>
+                <a:ea typeface="+mn-ea"/>
+                <a:cs typeface="+mn-cs"/>
+              </a:rPr>
+              <a:t>You can also combine multiple Azure networking and security services to manage your network security and provide increased layered protection. For example, you can use Azure Firewall to protect inbound and outbound traffic to the Internet, and Network Security Groups to limit traffic to resources inside your virtual networks.</a:t>
+            </a:r>
+          </a:p>
+          <a:p>
+            <a:endParaRPr lang="nb-NO" dirty="0"/>
+          </a:p>
+        </p:txBody>
+      </p:sp>
+      <p:sp>
+        <p:nvSpPr>
+          <p:cNvPr id="4" name="Slide Number Placeholder 3"/>
+          <p:cNvSpPr>
+            <a:spLocks noGrp="1"/>
+          </p:cNvSpPr>
+          <p:nvPr>
+            <p:ph type="sldNum" sz="quarter" idx="5"/>
+          </p:nvPr>
+        </p:nvSpPr>
+        <p:spPr/>
+        <p:txBody>
+          <a:bodyPr/>
+          <a:lstStyle/>
+          <a:p>
+            <a:fld id="{180377DB-C4B0-49B2-8838-0F01BA83B7C4}" type="slidenum">
+              <a:rPr lang="nb-NO" smtClean="0"/>
+              <a:t>22</a:t>
+            </a:fld>
+            <a:endParaRPr lang="nb-NO"/>
+          </a:p>
+        </p:txBody>
+      </p:sp>
+    </p:spTree>
+    <p:extLst>
+      <p:ext uri="{BB962C8B-B14F-4D97-AF65-F5344CB8AC3E}">
+        <p14:creationId xmlns:p14="http://schemas.microsoft.com/office/powerpoint/2010/main" val="3298195449"/>
+      </p:ext>
+    </p:extLst>
+  </p:cSld>
+  <p:clrMapOvr>
+    <a:masterClrMapping/>
+  </p:clrMapOvr>
+</p:notes>
+</file>
+
+<file path=ppt/notesSlides/notesSlide15.xml><?xml version="1.0" encoding="utf-8"?>
+<p:notes xmlns:a="http://schemas.openxmlformats.org/drawingml/2006/main" xmlns:r="http://schemas.openxmlformats.org/officeDocument/2006/relationships" xmlns:p="http://schemas.openxmlformats.org/presentationml/2006/main">
+  <p:cSld>
+    <p:spTree>
+      <p:nvGrpSpPr>
+        <p:cNvPr id="1" name=""/>
+        <p:cNvGrpSpPr/>
+        <p:nvPr/>
+      </p:nvGrpSpPr>
+      <p:grpSpPr>
+        <a:xfrm>
+          <a:off x="0" y="0"/>
+          <a:ext cx="0" cy="0"/>
+          <a:chOff x="0" y="0"/>
+          <a:chExt cx="0" cy="0"/>
+        </a:xfrm>
+      </p:grpSpPr>
+      <p:sp>
+        <p:nvSpPr>
+          <p:cNvPr id="2" name="Slide Image Placeholder 1"/>
+          <p:cNvSpPr>
+            <a:spLocks noGrp="1" noRot="1" noChangeAspect="1"/>
+          </p:cNvSpPr>
+          <p:nvPr>
+            <p:ph type="sldImg"/>
+          </p:nvPr>
+        </p:nvSpPr>
+        <p:spPr/>
+      </p:sp>
+      <p:sp>
+        <p:nvSpPr>
+          <p:cNvPr id="3" name="Notes Placeholder 2"/>
+          <p:cNvSpPr>
+            <a:spLocks noGrp="1"/>
+          </p:cNvSpPr>
+          <p:nvPr>
+            <p:ph type="body" idx="1"/>
+          </p:nvPr>
+        </p:nvSpPr>
+        <p:spPr/>
+        <p:txBody>
+          <a:bodyPr/>
+          <a:lstStyle/>
+          <a:p>
+            <a:endParaRPr lang="nb-NO" dirty="0"/>
+          </a:p>
+        </p:txBody>
+      </p:sp>
+      <p:sp>
+        <p:nvSpPr>
+          <p:cNvPr id="4" name="Slide Number Placeholder 3"/>
+          <p:cNvSpPr>
+            <a:spLocks noGrp="1"/>
+          </p:cNvSpPr>
+          <p:nvPr>
+            <p:ph type="sldNum" sz="quarter" idx="5"/>
+          </p:nvPr>
+        </p:nvSpPr>
+        <p:spPr/>
+        <p:txBody>
+          <a:bodyPr/>
+          <a:lstStyle/>
+          <a:p>
+            <a:fld id="{180377DB-C4B0-49B2-8838-0F01BA83B7C4}" type="slidenum">
+              <a:rPr lang="nb-NO" smtClean="0"/>
+              <a:t>24</a:t>
             </a:fld>
             <a:endParaRPr lang="nb-NO"/>
           </a:p>
@@ -1561,7 +1941,7 @@
           <a:p>
             <a:fld id="{180377DB-C4B0-49B2-8838-0F01BA83B7C4}" type="slidenum">
               <a:rPr lang="nb-NO" smtClean="0"/>
-              <a:t>5</a:t>
+              <a:t>6</a:t>
             </a:fld>
             <a:endParaRPr lang="nb-NO"/>
           </a:p>
@@ -1648,7 +2028,7 @@
           <a:p>
             <a:fld id="{180377DB-C4B0-49B2-8838-0F01BA83B7C4}" type="slidenum">
               <a:rPr lang="nb-NO" smtClean="0"/>
-              <a:t>6</a:t>
+              <a:t>7</a:t>
             </a:fld>
             <a:endParaRPr lang="nb-NO"/>
           </a:p>
@@ -1725,6 +2105,38 @@
           <a:p>
             <a:endParaRPr lang="nb-NO" dirty="0"/>
           </a:p>
+          <a:p>
+            <a:r>
+              <a:rPr lang="nb-NO" dirty="0"/>
+              <a:t>Eksempler på ditt ansvar er:</a:t>
+            </a:r>
+          </a:p>
+          <a:p>
+            <a:r>
+              <a:rPr lang="nb-NO" dirty="0"/>
+              <a:t>- </a:t>
+            </a:r>
+          </a:p>
+          <a:p>
+            <a:pPr marL="171450" indent="-171450">
+              <a:buFontTx/>
+              <a:buChar char="-"/>
+            </a:pPr>
+            <a:r>
+              <a:rPr lang="nb-NO" dirty="0"/>
+              <a:t>Ikke gi flere tilganger til brukere enn strengt tatt </a:t>
+            </a:r>
+          </a:p>
+          <a:p>
+            <a:pPr marL="171450" indent="-171450">
+              <a:buFontTx/>
+              <a:buChar char="-"/>
+            </a:pPr>
+            <a:endParaRPr lang="nb-NO" dirty="0"/>
+          </a:p>
+          <a:p>
+            <a:endParaRPr lang="nb-NO" dirty="0"/>
+          </a:p>
         </p:txBody>
       </p:sp>
       <p:sp>
@@ -1744,7 +2156,7 @@
           <a:p>
             <a:fld id="{180377DB-C4B0-49B2-8838-0F01BA83B7C4}" type="slidenum">
               <a:rPr lang="nb-NO" smtClean="0"/>
-              <a:t>7</a:t>
+              <a:t>8</a:t>
             </a:fld>
             <a:endParaRPr lang="nb-NO"/>
           </a:p>
@@ -1809,16 +2221,7 @@
           <a:p>
             <a:r>
               <a:rPr lang="nb-NO" dirty="0"/>
-              <a:t>Vis litt i Azure Security Center i Portalen.</a:t>
-            </a:r>
-          </a:p>
-          <a:p>
-            <a:endParaRPr lang="nb-NO" dirty="0"/>
-          </a:p>
-          <a:p>
-            <a:r>
-              <a:rPr lang="nb-NO" dirty="0"/>
-              <a:t>Analyserer enorme mender data/signaler. </a:t>
+              <a:t>Listen er eksempler, men ikke utømmende.</a:t>
             </a:r>
           </a:p>
         </p:txBody>
@@ -1840,7 +2243,7 @@
           <a:p>
             <a:fld id="{180377DB-C4B0-49B2-8838-0F01BA83B7C4}" type="slidenum">
               <a:rPr lang="nb-NO" smtClean="0"/>
-              <a:t>8</a:t>
+              <a:t>9</a:t>
             </a:fld>
             <a:endParaRPr lang="nb-NO"/>
           </a:p>
@@ -1849,7 +2252,7 @@
     </p:spTree>
     <p:extLst>
       <p:ext uri="{BB962C8B-B14F-4D97-AF65-F5344CB8AC3E}">
-        <p14:creationId xmlns:p14="http://schemas.microsoft.com/office/powerpoint/2010/main" val="3744992784"/>
+        <p14:creationId xmlns:p14="http://schemas.microsoft.com/office/powerpoint/2010/main" val="335899500"/>
       </p:ext>
     </p:extLst>
   </p:cSld>
@@ -1905,13 +2308,25 @@
           <a:p>
             <a:r>
               <a:rPr lang="nb-NO" dirty="0"/>
-              <a:t>Demo:</a:t>
-            </a:r>
-          </a:p>
-          <a:p>
-            <a:r>
-              <a:rPr lang="nb-NO" dirty="0"/>
-              <a:t>- Vis litt om YAML.</a:t>
+              <a:t>Litt hjelp </a:t>
+            </a:r>
+          </a:p>
+          <a:p>
+            <a:endParaRPr lang="nb-NO" dirty="0"/>
+          </a:p>
+          <a:p>
+            <a:r>
+              <a:rPr lang="nb-NO" dirty="0"/>
+              <a:t>Vis litt i Azure Security Center i Portalen.</a:t>
+            </a:r>
+          </a:p>
+          <a:p>
+            <a:endParaRPr lang="nb-NO" dirty="0"/>
+          </a:p>
+          <a:p>
+            <a:r>
+              <a:rPr lang="nb-NO" dirty="0"/>
+              <a:t>Analyserer enorme mender data/signaler. </a:t>
             </a:r>
           </a:p>
         </p:txBody>
@@ -1942,7 +2357,7 @@
     </p:spTree>
     <p:extLst>
       <p:ext uri="{BB962C8B-B14F-4D97-AF65-F5344CB8AC3E}">
-        <p14:creationId xmlns:p14="http://schemas.microsoft.com/office/powerpoint/2010/main" val="518123724"/>
+        <p14:creationId xmlns:p14="http://schemas.microsoft.com/office/powerpoint/2010/main" val="3744992784"/>
       </p:ext>
     </p:extLst>
   </p:cSld>
@@ -1998,119 +2413,7 @@
           <a:p>
             <a:r>
               <a:rPr lang="nb-NO" dirty="0"/>
-              <a:t>MFA:</a:t>
-            </a:r>
-          </a:p>
-          <a:p>
-            <a:r>
-              <a:rPr lang="en-US" sz="1200" b="0" i="1" kern="1200" dirty="0">
-                <a:solidFill>
-                  <a:schemeClr val="tx1"/>
-                </a:solidFill>
-                <a:effectLst/>
-                <a:latin typeface="+mn-lt"/>
-                <a:ea typeface="+mn-ea"/>
-                <a:cs typeface="+mn-cs"/>
-              </a:rPr>
-              <a:t>Something you know</a:t>
-            </a:r>
-            <a:endParaRPr lang="en-US" sz="1200" b="0" i="0" kern="1200" dirty="0">
-              <a:solidFill>
-                <a:schemeClr val="tx1"/>
-              </a:solidFill>
-              <a:effectLst/>
-              <a:latin typeface="+mn-lt"/>
-              <a:ea typeface="+mn-ea"/>
-              <a:cs typeface="+mn-cs"/>
-            </a:endParaRPr>
-          </a:p>
-          <a:p>
-            <a:r>
-              <a:rPr lang="en-US" sz="1200" b="0" i="1" kern="1200" dirty="0">
-                <a:solidFill>
-                  <a:schemeClr val="tx1"/>
-                </a:solidFill>
-                <a:effectLst/>
-                <a:latin typeface="+mn-lt"/>
-                <a:ea typeface="+mn-ea"/>
-                <a:cs typeface="+mn-cs"/>
-              </a:rPr>
-              <a:t>Something you possess</a:t>
-            </a:r>
-            <a:endParaRPr lang="en-US" sz="1200" b="0" i="0" kern="1200" dirty="0">
-              <a:solidFill>
-                <a:schemeClr val="tx1"/>
-              </a:solidFill>
-              <a:effectLst/>
-              <a:latin typeface="+mn-lt"/>
-              <a:ea typeface="+mn-ea"/>
-              <a:cs typeface="+mn-cs"/>
-            </a:endParaRPr>
-          </a:p>
-          <a:p>
-            <a:r>
-              <a:rPr lang="en-US" sz="1200" b="0" i="1" kern="1200" dirty="0">
-                <a:solidFill>
-                  <a:schemeClr val="tx1"/>
-                </a:solidFill>
-                <a:effectLst/>
-                <a:latin typeface="+mn-lt"/>
-                <a:ea typeface="+mn-ea"/>
-                <a:cs typeface="+mn-cs"/>
-              </a:rPr>
-              <a:t>Something you are</a:t>
-            </a:r>
-            <a:endParaRPr lang="en-US" sz="1200" b="0" i="0" kern="1200" dirty="0">
-              <a:solidFill>
-                <a:schemeClr val="tx1"/>
-              </a:solidFill>
-              <a:effectLst/>
-              <a:latin typeface="+mn-lt"/>
-              <a:ea typeface="+mn-ea"/>
-              <a:cs typeface="+mn-cs"/>
-            </a:endParaRPr>
-          </a:p>
-          <a:p>
-            <a:endParaRPr lang="nb-NO" dirty="0"/>
-          </a:p>
-          <a:p>
-            <a:r>
-              <a:rPr lang="en-US" sz="1200" b="0" i="0" kern="1200" dirty="0">
-                <a:solidFill>
-                  <a:schemeClr val="tx1"/>
-                </a:solidFill>
-                <a:effectLst/>
-                <a:latin typeface="+mn-lt"/>
-                <a:ea typeface="+mn-ea"/>
-                <a:cs typeface="+mn-cs"/>
-              </a:rPr>
-              <a:t>By leveraging Azure AD for SSO you'll also have the ability to combine multiple data sources into an intelligent security graph</a:t>
-            </a:r>
-          </a:p>
-          <a:p>
-            <a:endParaRPr lang="en-US" sz="1200" b="0" i="0" kern="1200" dirty="0">
-              <a:solidFill>
-                <a:schemeClr val="tx1"/>
-              </a:solidFill>
-              <a:effectLst/>
-              <a:latin typeface="+mn-lt"/>
-              <a:ea typeface="+mn-ea"/>
-              <a:cs typeface="+mn-cs"/>
-            </a:endParaRPr>
-          </a:p>
-          <a:p>
-            <a:r>
-              <a:rPr lang="nb-NO" dirty="0">
-                <a:hlinkClick r:id="rId3"/>
-              </a:rPr>
-              <a:t>https://docs.microsoft.com/nb-no/learn/modules/intro-to-security-in-azure/3-identity-and-access</a:t>
-            </a:r>
-            <a:endParaRPr lang="nb-NO" dirty="0"/>
-          </a:p>
-          <a:p>
-            <a:r>
-              <a:rPr lang="nb-NO" dirty="0"/>
-              <a:t>Tig</a:t>
+              <a:t>I Azure Security Center så får man</a:t>
             </a:r>
           </a:p>
         </p:txBody>
@@ -2141,7 +2444,7 @@
     </p:spTree>
     <p:extLst>
       <p:ext uri="{BB962C8B-B14F-4D97-AF65-F5344CB8AC3E}">
-        <p14:creationId xmlns:p14="http://schemas.microsoft.com/office/powerpoint/2010/main" val="1334592713"/>
+        <p14:creationId xmlns:p14="http://schemas.microsoft.com/office/powerpoint/2010/main" val="2697255589"/>
       </p:ext>
     </p:extLst>
   </p:cSld>
@@ -2197,7 +2500,16 @@
           <a:p>
             <a:r>
               <a:rPr lang="nb-NO" dirty="0"/>
-              <a:t>Vi skal ikke gå inn på Service Prinsipals i denne leksjonen.</a:t>
+              <a:t>Dersom man trykker inn på f.eks. Compute vil man se hvilke sårbarheter som er.</a:t>
+            </a:r>
+          </a:p>
+          <a:p>
+            <a:endParaRPr lang="nb-NO" dirty="0"/>
+          </a:p>
+          <a:p>
+            <a:r>
+              <a:rPr lang="nb-NO" dirty="0"/>
+              <a:t>Quick fix man kan trykke på – NB, dersom man gjør </a:t>
             </a:r>
           </a:p>
         </p:txBody>
@@ -2228,7 +2540,7 @@
     </p:spTree>
     <p:extLst>
       <p:ext uri="{BB962C8B-B14F-4D97-AF65-F5344CB8AC3E}">
-        <p14:creationId xmlns:p14="http://schemas.microsoft.com/office/powerpoint/2010/main" val="3738408422"/>
+        <p14:creationId xmlns:p14="http://schemas.microsoft.com/office/powerpoint/2010/main" val="2364579541"/>
       </p:ext>
     </p:extLst>
   </p:cSld>
@@ -2284,7 +2596,13 @@
           <a:p>
             <a:r>
               <a:rPr lang="nb-NO" dirty="0"/>
-              <a:t>Vis</a:t>
+              <a:t>Demo:</a:t>
+            </a:r>
+          </a:p>
+          <a:p>
+            <a:r>
+              <a:rPr lang="nb-NO" dirty="0"/>
+              <a:t>- Vis litt om YAML.</a:t>
             </a:r>
           </a:p>
         </p:txBody>
@@ -2306,7 +2624,7 @@
           <a:p>
             <a:fld id="{180377DB-C4B0-49B2-8838-0F01BA83B7C4}" type="slidenum">
               <a:rPr lang="nb-NO" smtClean="0"/>
-              <a:t>14</a:t>
+              <a:t>15</a:t>
             </a:fld>
             <a:endParaRPr lang="nb-NO"/>
           </a:p>
@@ -2315,7 +2633,7 @@
     </p:spTree>
     <p:extLst>
       <p:ext uri="{BB962C8B-B14F-4D97-AF65-F5344CB8AC3E}">
-        <p14:creationId xmlns:p14="http://schemas.microsoft.com/office/powerpoint/2010/main" val="1111845549"/>
+        <p14:creationId xmlns:p14="http://schemas.microsoft.com/office/powerpoint/2010/main" val="518123724"/>
       </p:ext>
     </p:extLst>
   </p:cSld>
@@ -11660,7 +11978,7 @@
           <p:cNvPr id="2" name="Content Placeholder 1">
             <a:extLst>
               <a:ext uri="{FF2B5EF4-FFF2-40B4-BE49-F238E27FC236}">
-                <a16:creationId xmlns:a16="http://schemas.microsoft.com/office/drawing/2014/main" id="{94B98822-8368-4C2D-B1AB-DBC5C478A3C8}"/>
+                <a16:creationId xmlns:a16="http://schemas.microsoft.com/office/drawing/2014/main" id="{7E0053A4-7AD4-492F-BC64-A947322D867F}"/>
               </a:ext>
             </a:extLst>
           </p:cNvPr>
@@ -11676,31 +11994,71 @@
           <a:bodyPr/>
           <a:lstStyle/>
           <a:p>
+            <a:r>
+              <a:rPr lang="nb-NO" dirty="0" err="1"/>
+              <a:t>Monitoring</a:t>
+            </a:r>
+            <a:r>
+              <a:rPr lang="nb-NO" dirty="0"/>
+              <a:t> service for sikkerhet</a:t>
+            </a:r>
+          </a:p>
+          <a:p>
+            <a:endParaRPr lang="nb-NO" dirty="0"/>
+          </a:p>
+          <a:p>
+            <a:r>
+              <a:rPr lang="nb-NO" dirty="0"/>
+              <a:t>Anbefalinger: scanner tjenester for å finne usikker konfigurasjon </a:t>
+            </a:r>
+          </a:p>
+          <a:p>
+            <a:r>
+              <a:rPr lang="nb-NO" dirty="0"/>
+              <a:t>Sikkerhetsscore og compliance</a:t>
+            </a:r>
+          </a:p>
+          <a:p>
+            <a:r>
+              <a:rPr lang="nb-NO" dirty="0"/>
+              <a:t>Overvåking av tjenester (Standard)</a:t>
+            </a:r>
+          </a:p>
+          <a:p>
+            <a:r>
+              <a:rPr lang="nb-NO" dirty="0"/>
+              <a:t>To prisnivåer</a:t>
+            </a:r>
+          </a:p>
+          <a:p>
+            <a:pPr lvl="1"/>
+            <a:r>
+              <a:rPr lang="nb-NO" dirty="0" err="1"/>
+              <a:t>Free</a:t>
+            </a:r>
+            <a:r>
+              <a:rPr lang="nb-NO" dirty="0"/>
+              <a:t> tier: Tilbyr anbefalinger </a:t>
+            </a:r>
+          </a:p>
+          <a:p>
+            <a:pPr lvl="1"/>
+            <a:r>
+              <a:rPr lang="nb-NO" dirty="0"/>
+              <a:t>Standard tier: Tilbyr alle tjenester som overvåkning av tjenester</a:t>
+            </a:r>
+          </a:p>
+          <a:p>
+            <a:endParaRPr lang="nb-NO" dirty="0"/>
+          </a:p>
+          <a:p>
             <a:pPr marL="0" indent="0">
               <a:buNone/>
             </a:pPr>
-            <a:endParaRPr lang="nb-NO" sz="4400" dirty="0"/>
-          </a:p>
-          <a:p>
-            <a:pPr marL="0" indent="0">
-              <a:buNone/>
-            </a:pPr>
-            <a:endParaRPr lang="nb-NO" sz="4400" dirty="0"/>
-          </a:p>
-          <a:p>
-            <a:pPr marL="0" indent="0">
-              <a:buNone/>
-            </a:pPr>
-            <a:endParaRPr lang="nb-NO" sz="4400" dirty="0"/>
-          </a:p>
-          <a:p>
-            <a:pPr marL="0" indent="0">
-              <a:buNone/>
-            </a:pPr>
-            <a:r>
-              <a:rPr lang="nb-NO" sz="4400" dirty="0"/>
-              <a:t>Google: Azureskolen </a:t>
-            </a:r>
+            <a:endParaRPr lang="nb-NO" dirty="0"/>
+          </a:p>
+          <a:p>
+            <a:endParaRPr lang="nb-NO" dirty="0"/>
           </a:p>
         </p:txBody>
       </p:sp>
@@ -11709,7 +12067,7 @@
           <p:cNvPr id="3" name="Title 2">
             <a:extLst>
               <a:ext uri="{FF2B5EF4-FFF2-40B4-BE49-F238E27FC236}">
-                <a16:creationId xmlns:a16="http://schemas.microsoft.com/office/drawing/2014/main" id="{6E551990-3A9C-43DC-8E56-7146D7720E17}"/>
+                <a16:creationId xmlns:a16="http://schemas.microsoft.com/office/drawing/2014/main" id="{588209D4-0181-4A79-95F6-D34F1CB44558}"/>
               </a:ext>
             </a:extLst>
           </p:cNvPr>
@@ -11720,27 +12078,69 @@
             <p:ph type="title"/>
           </p:nvPr>
         </p:nvSpPr>
-        <p:spPr>
-          <a:xfrm>
-            <a:off x="1328585" y="376848"/>
-            <a:ext cx="10078991" cy="1325563"/>
-          </a:xfrm>
-        </p:spPr>
+        <p:spPr/>
         <p:txBody>
           <a:bodyPr/>
           <a:lstStyle/>
           <a:p>
             <a:r>
               <a:rPr lang="nb-NO" dirty="0"/>
-              <a:t>Demo og leksjon 1</a:t>
-            </a:r>
-          </a:p>
-        </p:txBody>
-      </p:sp>
+              <a:t>Azure Security Center</a:t>
+            </a:r>
+          </a:p>
+        </p:txBody>
+      </p:sp>
+      <p:pic>
+        <p:nvPicPr>
+          <p:cNvPr id="2050" name="Picture 2" descr="Bilderesultat for azure security center">
+            <a:extLst>
+              <a:ext uri="{FF2B5EF4-FFF2-40B4-BE49-F238E27FC236}">
+                <a16:creationId xmlns:a16="http://schemas.microsoft.com/office/drawing/2014/main" id="{78200B77-F882-4721-B5FB-EE76BBDDEFCF}"/>
+              </a:ext>
+            </a:extLst>
+          </p:cNvPr>
+          <p:cNvPicPr>
+            <a:picLocks noChangeAspect="1" noChangeArrowheads="1"/>
+          </p:cNvPicPr>
+          <p:nvPr/>
+        </p:nvPicPr>
+        <p:blipFill>
+          <a:blip r:embed="rId3">
+            <a:extLst>
+              <a:ext uri="{28A0092B-C50C-407E-A947-70E740481C1C}">
+                <a14:useLocalDpi xmlns:a14="http://schemas.microsoft.com/office/drawing/2010/main" val="0"/>
+              </a:ext>
+            </a:extLst>
+          </a:blip>
+          <a:srcRect/>
+          <a:stretch>
+            <a:fillRect/>
+          </a:stretch>
+        </p:blipFill>
+        <p:spPr bwMode="auto">
+          <a:xfrm>
+            <a:off x="8978921" y="2357437"/>
+            <a:ext cx="2143125" cy="2143125"/>
+          </a:xfrm>
+          <a:prstGeom prst="rect">
+            <a:avLst/>
+          </a:prstGeom>
+          <a:noFill/>
+          <a:extLst>
+            <a:ext uri="{909E8E84-426E-40DD-AFC4-6F175D3DCCD1}">
+              <a14:hiddenFill xmlns:a14="http://schemas.microsoft.com/office/drawing/2010/main">
+                <a:solidFill>
+                  <a:srgbClr val="FFFFFF"/>
+                </a:solidFill>
+              </a14:hiddenFill>
+            </a:ext>
+          </a:extLst>
+        </p:spPr>
+      </p:pic>
     </p:spTree>
     <p:extLst>
       <p:ext uri="{BB962C8B-B14F-4D97-AF65-F5344CB8AC3E}">
-        <p14:creationId xmlns:p14="http://schemas.microsoft.com/office/powerpoint/2010/main" val="2246517485"/>
+        <p14:creationId xmlns:p14="http://schemas.microsoft.com/office/powerpoint/2010/main" val="1414863137"/>
       </p:ext>
     </p:extLst>
   </p:cSld>
@@ -11769,6 +12169,932 @@
       </p:grpSpPr>
       <p:sp>
         <p:nvSpPr>
+          <p:cNvPr id="3" name="Title 2">
+            <a:extLst>
+              <a:ext uri="{FF2B5EF4-FFF2-40B4-BE49-F238E27FC236}">
+                <a16:creationId xmlns:a16="http://schemas.microsoft.com/office/drawing/2014/main" id="{3976DEF7-B070-49C8-96B9-DCF0578EB128}"/>
+              </a:ext>
+            </a:extLst>
+          </p:cNvPr>
+          <p:cNvSpPr>
+            <a:spLocks noGrp="1"/>
+          </p:cNvSpPr>
+          <p:nvPr>
+            <p:ph type="title"/>
+          </p:nvPr>
+        </p:nvSpPr>
+        <p:spPr>
+          <a:xfrm>
+            <a:off x="1234800" y="365126"/>
+            <a:ext cx="10078991" cy="1119982"/>
+          </a:xfrm>
+        </p:spPr>
+        <p:txBody>
+          <a:bodyPr/>
+          <a:lstStyle/>
+          <a:p>
+            <a:r>
+              <a:rPr lang="nb-NO" dirty="0"/>
+              <a:t>Azure Security Center</a:t>
+            </a:r>
+          </a:p>
+        </p:txBody>
+      </p:sp>
+      <p:pic>
+        <p:nvPicPr>
+          <p:cNvPr id="4" name="Picture 3">
+            <a:extLst>
+              <a:ext uri="{FF2B5EF4-FFF2-40B4-BE49-F238E27FC236}">
+                <a16:creationId xmlns:a16="http://schemas.microsoft.com/office/drawing/2014/main" id="{F04E0A26-8C88-4AB3-9EEE-DDD88D616CD9}"/>
+              </a:ext>
+            </a:extLst>
+          </p:cNvPr>
+          <p:cNvPicPr>
+            <a:picLocks noChangeAspect="1"/>
+          </p:cNvPicPr>
+          <p:nvPr/>
+        </p:nvPicPr>
+        <p:blipFill>
+          <a:blip r:embed="rId3"/>
+          <a:stretch>
+            <a:fillRect/>
+          </a:stretch>
+        </p:blipFill>
+        <p:spPr>
+          <a:xfrm>
+            <a:off x="1234800" y="1485107"/>
+            <a:ext cx="7158656" cy="5032374"/>
+          </a:xfrm>
+          <a:prstGeom prst="rect">
+            <a:avLst/>
+          </a:prstGeom>
+        </p:spPr>
+      </p:pic>
+    </p:spTree>
+    <p:extLst>
+      <p:ext uri="{BB962C8B-B14F-4D97-AF65-F5344CB8AC3E}">
+        <p14:creationId xmlns:p14="http://schemas.microsoft.com/office/powerpoint/2010/main" val="3928993231"/>
+      </p:ext>
+    </p:extLst>
+  </p:cSld>
+  <p:clrMapOvr>
+    <a:masterClrMapping/>
+  </p:clrMapOvr>
+</p:sld>
+</file>
+
+<file path=ppt/slides/slide12.xml><?xml version="1.0" encoding="utf-8"?>
+<p:sld xmlns:a="http://schemas.openxmlformats.org/drawingml/2006/main" xmlns:r="http://schemas.openxmlformats.org/officeDocument/2006/relationships" xmlns:p="http://schemas.openxmlformats.org/presentationml/2006/main">
+  <p:cSld>
+    <p:spTree>
+      <p:nvGrpSpPr>
+        <p:cNvPr id="1" name=""/>
+        <p:cNvGrpSpPr/>
+        <p:nvPr/>
+      </p:nvGrpSpPr>
+      <p:grpSpPr>
+        <a:xfrm>
+          <a:off x="0" y="0"/>
+          <a:ext cx="0" cy="0"/>
+          <a:chOff x="0" y="0"/>
+          <a:chExt cx="0" cy="0"/>
+        </a:xfrm>
+      </p:grpSpPr>
+      <p:pic>
+        <p:nvPicPr>
+          <p:cNvPr id="4" name="Content Placeholder 3">
+            <a:extLst>
+              <a:ext uri="{FF2B5EF4-FFF2-40B4-BE49-F238E27FC236}">
+                <a16:creationId xmlns:a16="http://schemas.microsoft.com/office/drawing/2014/main" id="{9D9A3B32-F5A6-403A-BD67-91A3DF434CFB}"/>
+              </a:ext>
+            </a:extLst>
+          </p:cNvPr>
+          <p:cNvPicPr>
+            <a:picLocks noGrp="1" noChangeAspect="1"/>
+          </p:cNvPicPr>
+          <p:nvPr>
+            <p:ph idx="1"/>
+          </p:nvPr>
+        </p:nvPicPr>
+        <p:blipFill>
+          <a:blip r:embed="rId3"/>
+          <a:stretch>
+            <a:fillRect/>
+          </a:stretch>
+        </p:blipFill>
+        <p:spPr>
+          <a:xfrm>
+            <a:off x="1235075" y="1923621"/>
+            <a:ext cx="8382000" cy="4155345"/>
+          </a:xfrm>
+          <a:prstGeom prst="rect">
+            <a:avLst/>
+          </a:prstGeom>
+        </p:spPr>
+      </p:pic>
+      <p:sp>
+        <p:nvSpPr>
+          <p:cNvPr id="3" name="Title 2">
+            <a:extLst>
+              <a:ext uri="{FF2B5EF4-FFF2-40B4-BE49-F238E27FC236}">
+                <a16:creationId xmlns:a16="http://schemas.microsoft.com/office/drawing/2014/main" id="{ADD3268A-655D-4820-8D79-0D25EF247E34}"/>
+              </a:ext>
+            </a:extLst>
+          </p:cNvPr>
+          <p:cNvSpPr>
+            <a:spLocks noGrp="1"/>
+          </p:cNvSpPr>
+          <p:nvPr>
+            <p:ph type="title"/>
+          </p:nvPr>
+        </p:nvSpPr>
+        <p:spPr/>
+        <p:txBody>
+          <a:bodyPr/>
+          <a:lstStyle/>
+          <a:p>
+            <a:r>
+              <a:rPr lang="nb-NO" dirty="0"/>
+              <a:t>Azure Security Center</a:t>
+            </a:r>
+          </a:p>
+        </p:txBody>
+      </p:sp>
+    </p:spTree>
+    <p:extLst>
+      <p:ext uri="{BB962C8B-B14F-4D97-AF65-F5344CB8AC3E}">
+        <p14:creationId xmlns:p14="http://schemas.microsoft.com/office/powerpoint/2010/main" val="1837565089"/>
+      </p:ext>
+    </p:extLst>
+  </p:cSld>
+  <p:clrMapOvr>
+    <a:masterClrMapping/>
+  </p:clrMapOvr>
+</p:sld>
+</file>
+
+<file path=ppt/slides/slide13.xml><?xml version="1.0" encoding="utf-8"?>
+<p:sld xmlns:a="http://schemas.openxmlformats.org/drawingml/2006/main" xmlns:r="http://schemas.openxmlformats.org/officeDocument/2006/relationships" xmlns:p="http://schemas.openxmlformats.org/presentationml/2006/main">
+  <p:cSld>
+    <p:spTree>
+      <p:nvGrpSpPr>
+        <p:cNvPr id="1" name=""/>
+        <p:cNvGrpSpPr/>
+        <p:nvPr/>
+      </p:nvGrpSpPr>
+      <p:grpSpPr>
+        <a:xfrm>
+          <a:off x="0" y="0"/>
+          <a:ext cx="0" cy="0"/>
+          <a:chOff x="0" y="0"/>
+          <a:chExt cx="0" cy="0"/>
+        </a:xfrm>
+      </p:grpSpPr>
+      <p:sp>
+        <p:nvSpPr>
+          <p:cNvPr id="2" name="Content Placeholder 1">
+            <a:extLst>
+              <a:ext uri="{FF2B5EF4-FFF2-40B4-BE49-F238E27FC236}">
+                <a16:creationId xmlns:a16="http://schemas.microsoft.com/office/drawing/2014/main" id="{F05B8E5A-8E72-405C-895A-A01DE7EFEC97}"/>
+              </a:ext>
+            </a:extLst>
+          </p:cNvPr>
+          <p:cNvSpPr>
+            <a:spLocks noGrp="1"/>
+          </p:cNvSpPr>
+          <p:nvPr>
+            <p:ph idx="1"/>
+          </p:nvPr>
+        </p:nvSpPr>
+        <p:spPr/>
+        <p:txBody>
+          <a:bodyPr/>
+          <a:lstStyle/>
+          <a:p>
+            <a:endParaRPr lang="nb-NO" dirty="0"/>
+          </a:p>
+        </p:txBody>
+      </p:sp>
+      <p:sp>
+        <p:nvSpPr>
+          <p:cNvPr id="3" name="Title 2">
+            <a:extLst>
+              <a:ext uri="{FF2B5EF4-FFF2-40B4-BE49-F238E27FC236}">
+                <a16:creationId xmlns:a16="http://schemas.microsoft.com/office/drawing/2014/main" id="{86E35D39-2591-47A9-8520-8892ECEB37A5}"/>
+              </a:ext>
+            </a:extLst>
+          </p:cNvPr>
+          <p:cNvSpPr>
+            <a:spLocks noGrp="1"/>
+          </p:cNvSpPr>
+          <p:nvPr>
+            <p:ph type="title"/>
+          </p:nvPr>
+        </p:nvSpPr>
+        <p:spPr/>
+        <p:txBody>
+          <a:bodyPr/>
+          <a:lstStyle/>
+          <a:p>
+            <a:r>
+              <a:rPr lang="nb-NO" dirty="0"/>
+              <a:t>Bilde-applikasjonen </a:t>
+            </a:r>
+          </a:p>
+        </p:txBody>
+      </p:sp>
+      <p:pic>
+        <p:nvPicPr>
+          <p:cNvPr id="4" name="Picture 3">
+            <a:extLst>
+              <a:ext uri="{FF2B5EF4-FFF2-40B4-BE49-F238E27FC236}">
+                <a16:creationId xmlns:a16="http://schemas.microsoft.com/office/drawing/2014/main" id="{9E555A9B-7745-4BC2-9F47-EB95DBCC63CA}"/>
+              </a:ext>
+            </a:extLst>
+          </p:cNvPr>
+          <p:cNvPicPr>
+            <a:picLocks noChangeAspect="1"/>
+          </p:cNvPicPr>
+          <p:nvPr/>
+        </p:nvPicPr>
+        <p:blipFill>
+          <a:blip r:embed="rId2"/>
+          <a:stretch>
+            <a:fillRect/>
+          </a:stretch>
+        </p:blipFill>
+        <p:spPr>
+          <a:xfrm>
+            <a:off x="1425287" y="1738313"/>
+            <a:ext cx="8953500" cy="4438650"/>
+          </a:xfrm>
+          <a:prstGeom prst="rect">
+            <a:avLst/>
+          </a:prstGeom>
+        </p:spPr>
+      </p:pic>
+    </p:spTree>
+    <p:extLst>
+      <p:ext uri="{BB962C8B-B14F-4D97-AF65-F5344CB8AC3E}">
+        <p14:creationId xmlns:p14="http://schemas.microsoft.com/office/powerpoint/2010/main" val="3465018780"/>
+      </p:ext>
+    </p:extLst>
+  </p:cSld>
+  <p:clrMapOvr>
+    <a:masterClrMapping/>
+  </p:clrMapOvr>
+</p:sld>
+</file>
+
+<file path=ppt/slides/slide14.xml><?xml version="1.0" encoding="utf-8"?>
+<p:sld xmlns:a="http://schemas.openxmlformats.org/drawingml/2006/main" xmlns:r="http://schemas.openxmlformats.org/officeDocument/2006/relationships" xmlns:p="http://schemas.openxmlformats.org/presentationml/2006/main">
+  <p:cSld>
+    <p:spTree>
+      <p:nvGrpSpPr>
+        <p:cNvPr id="1" name=""/>
+        <p:cNvGrpSpPr/>
+        <p:nvPr/>
+      </p:nvGrpSpPr>
+      <p:grpSpPr>
+        <a:xfrm>
+          <a:off x="0" y="0"/>
+          <a:ext cx="0" cy="0"/>
+          <a:chOff x="0" y="0"/>
+          <a:chExt cx="0" cy="0"/>
+        </a:xfrm>
+      </p:grpSpPr>
+      <p:sp>
+        <p:nvSpPr>
+          <p:cNvPr id="3" name="Title 2">
+            <a:extLst>
+              <a:ext uri="{FF2B5EF4-FFF2-40B4-BE49-F238E27FC236}">
+                <a16:creationId xmlns:a16="http://schemas.microsoft.com/office/drawing/2014/main" id="{C74560E7-01E9-479F-BF97-248DDDFF9AFF}"/>
+              </a:ext>
+            </a:extLst>
+          </p:cNvPr>
+          <p:cNvSpPr>
+            <a:spLocks noGrp="1"/>
+          </p:cNvSpPr>
+          <p:nvPr>
+            <p:ph type="title"/>
+          </p:nvPr>
+        </p:nvSpPr>
+        <p:spPr/>
+        <p:txBody>
+          <a:bodyPr/>
+          <a:lstStyle/>
+          <a:p>
+            <a:r>
+              <a:rPr lang="nb-NO" dirty="0"/>
+              <a:t>Bildeapplikasjonen</a:t>
+            </a:r>
+          </a:p>
+        </p:txBody>
+      </p:sp>
+      <p:pic>
+        <p:nvPicPr>
+          <p:cNvPr id="7" name="Graphic 6">
+            <a:extLst>
+              <a:ext uri="{FF2B5EF4-FFF2-40B4-BE49-F238E27FC236}">
+                <a16:creationId xmlns:a16="http://schemas.microsoft.com/office/drawing/2014/main" id="{62CD84CB-7BD7-4D24-8C3C-DCBD32A65322}"/>
+              </a:ext>
+            </a:extLst>
+          </p:cNvPr>
+          <p:cNvPicPr>
+            <a:picLocks noChangeAspect="1"/>
+          </p:cNvPicPr>
+          <p:nvPr/>
+        </p:nvPicPr>
+        <p:blipFill>
+          <a:blip r:embed="rId2">
+            <a:extLst>
+              <a:ext uri="{28A0092B-C50C-407E-A947-70E740481C1C}">
+                <a14:useLocalDpi xmlns:a14="http://schemas.microsoft.com/office/drawing/2010/main" val="0"/>
+              </a:ext>
+              <a:ext uri="{96DAC541-7B7A-43D3-8B79-37D633B846F1}">
+                <asvg:svgBlip xmlns:asvg="http://schemas.microsoft.com/office/drawing/2016/SVG/main" r:embed="rId3"/>
+              </a:ext>
+            </a:extLst>
+          </a:blip>
+          <a:stretch>
+            <a:fillRect/>
+          </a:stretch>
+        </p:blipFill>
+        <p:spPr>
+          <a:xfrm>
+            <a:off x="5254341" y="3648898"/>
+            <a:ext cx="476250" cy="476250"/>
+          </a:xfrm>
+          <a:prstGeom prst="rect">
+            <a:avLst/>
+          </a:prstGeom>
+        </p:spPr>
+      </p:pic>
+      <p:pic>
+        <p:nvPicPr>
+          <p:cNvPr id="9" name="Graphic 8">
+            <a:extLst>
+              <a:ext uri="{FF2B5EF4-FFF2-40B4-BE49-F238E27FC236}">
+                <a16:creationId xmlns:a16="http://schemas.microsoft.com/office/drawing/2014/main" id="{EF8A9E25-C6F9-4F60-A9BD-34CE1498C034}"/>
+              </a:ext>
+            </a:extLst>
+          </p:cNvPr>
+          <p:cNvPicPr>
+            <a:picLocks noChangeAspect="1"/>
+          </p:cNvPicPr>
+          <p:nvPr/>
+        </p:nvPicPr>
+        <p:blipFill>
+          <a:blip r:embed="rId4">
+            <a:extLst>
+              <a:ext uri="{28A0092B-C50C-407E-A947-70E740481C1C}">
+                <a14:useLocalDpi xmlns:a14="http://schemas.microsoft.com/office/drawing/2010/main" val="0"/>
+              </a:ext>
+              <a:ext uri="{96DAC541-7B7A-43D3-8B79-37D633B846F1}">
+                <asvg:svgBlip xmlns:asvg="http://schemas.microsoft.com/office/drawing/2016/SVG/main" r:embed="rId5"/>
+              </a:ext>
+            </a:extLst>
+          </a:blip>
+          <a:stretch>
+            <a:fillRect/>
+          </a:stretch>
+        </p:blipFill>
+        <p:spPr>
+          <a:xfrm>
+            <a:off x="4283157" y="3091075"/>
+            <a:ext cx="476250" cy="476250"/>
+          </a:xfrm>
+          <a:prstGeom prst="rect">
+            <a:avLst/>
+          </a:prstGeom>
+        </p:spPr>
+      </p:pic>
+      <p:pic>
+        <p:nvPicPr>
+          <p:cNvPr id="15" name="Graphic 14">
+            <a:extLst>
+              <a:ext uri="{FF2B5EF4-FFF2-40B4-BE49-F238E27FC236}">
+                <a16:creationId xmlns:a16="http://schemas.microsoft.com/office/drawing/2014/main" id="{3BCD6373-9D61-4DED-AA59-2718E0625701}"/>
+              </a:ext>
+            </a:extLst>
+          </p:cNvPr>
+          <p:cNvPicPr>
+            <a:picLocks noChangeAspect="1"/>
+          </p:cNvPicPr>
+          <p:nvPr/>
+        </p:nvPicPr>
+        <p:blipFill>
+          <a:blip r:embed="rId6">
+            <a:extLst>
+              <a:ext uri="{28A0092B-C50C-407E-A947-70E740481C1C}">
+                <a14:useLocalDpi xmlns:a14="http://schemas.microsoft.com/office/drawing/2010/main" val="0"/>
+              </a:ext>
+              <a:ext uri="{96DAC541-7B7A-43D3-8B79-37D633B846F1}">
+                <asvg:svgBlip xmlns:asvg="http://schemas.microsoft.com/office/drawing/2016/SVG/main" r:embed="rId7"/>
+              </a:ext>
+            </a:extLst>
+          </a:blip>
+          <a:stretch>
+            <a:fillRect/>
+          </a:stretch>
+        </p:blipFill>
+        <p:spPr>
+          <a:xfrm>
+            <a:off x="2082574" y="3351434"/>
+            <a:ext cx="476250" cy="476250"/>
+          </a:xfrm>
+          <a:prstGeom prst="rect">
+            <a:avLst/>
+          </a:prstGeom>
+        </p:spPr>
+      </p:pic>
+      <p:sp>
+        <p:nvSpPr>
+          <p:cNvPr id="16" name="TextBox 15">
+            <a:extLst>
+              <a:ext uri="{FF2B5EF4-FFF2-40B4-BE49-F238E27FC236}">
+                <a16:creationId xmlns:a16="http://schemas.microsoft.com/office/drawing/2014/main" id="{A48DE509-D24C-4D77-9DC1-34856841ECA5}"/>
+              </a:ext>
+            </a:extLst>
+          </p:cNvPr>
+          <p:cNvSpPr txBox="1"/>
+          <p:nvPr/>
+        </p:nvSpPr>
+        <p:spPr>
+          <a:xfrm>
+            <a:off x="1771220" y="3829980"/>
+            <a:ext cx="1444480" cy="400110"/>
+          </a:xfrm>
+          <a:prstGeom prst="rect">
+            <a:avLst/>
+          </a:prstGeom>
+          <a:noFill/>
+        </p:spPr>
+        <p:txBody>
+          <a:bodyPr wrap="square" rtlCol="0">
+            <a:spAutoFit/>
+          </a:bodyPr>
+          <a:lstStyle/>
+          <a:p>
+            <a:r>
+              <a:rPr lang="nb-NO" sz="1000" dirty="0"/>
+              <a:t>Logging / Monitorering</a:t>
+            </a:r>
+          </a:p>
+          <a:p>
+            <a:r>
+              <a:rPr lang="nb-NO" sz="1000" dirty="0"/>
+              <a:t>(Application Insights )</a:t>
+            </a:r>
+          </a:p>
+        </p:txBody>
+      </p:sp>
+      <p:cxnSp>
+        <p:nvCxnSpPr>
+          <p:cNvPr id="18" name="Straight Connector 17">
+            <a:extLst>
+              <a:ext uri="{FF2B5EF4-FFF2-40B4-BE49-F238E27FC236}">
+                <a16:creationId xmlns:a16="http://schemas.microsoft.com/office/drawing/2014/main" id="{6D28B413-EA3B-4223-80AF-A0DDC5332C0D}"/>
+              </a:ext>
+            </a:extLst>
+          </p:cNvPr>
+          <p:cNvCxnSpPr>
+            <a:cxnSpLocks/>
+            <a:stCxn id="9" idx="3"/>
+            <a:endCxn id="7" idx="0"/>
+          </p:cNvCxnSpPr>
+          <p:nvPr/>
+        </p:nvCxnSpPr>
+        <p:spPr>
+          <a:xfrm>
+            <a:off x="4759407" y="3329200"/>
+            <a:ext cx="733059" cy="319698"/>
+          </a:xfrm>
+          <a:prstGeom prst="line">
+            <a:avLst/>
+          </a:prstGeom>
+          <a:ln w="9525" cap="flat" cmpd="sng" algn="ctr">
+            <a:solidFill>
+              <a:schemeClr val="dk1"/>
+            </a:solidFill>
+            <a:prstDash val="dash"/>
+            <a:round/>
+            <a:headEnd type="none" w="med" len="med"/>
+            <a:tailEnd type="none" w="med" len="med"/>
+          </a:ln>
+        </p:spPr>
+        <p:style>
+          <a:lnRef idx="0">
+            <a:scrgbClr r="0" g="0" b="0"/>
+          </a:lnRef>
+          <a:fillRef idx="0">
+            <a:scrgbClr r="0" g="0" b="0"/>
+          </a:fillRef>
+          <a:effectRef idx="0">
+            <a:scrgbClr r="0" g="0" b="0"/>
+          </a:effectRef>
+          <a:fontRef idx="minor">
+            <a:schemeClr val="tx1"/>
+          </a:fontRef>
+        </p:style>
+      </p:cxnSp>
+      <p:sp>
+        <p:nvSpPr>
+          <p:cNvPr id="23" name="TextBox 22">
+            <a:extLst>
+              <a:ext uri="{FF2B5EF4-FFF2-40B4-BE49-F238E27FC236}">
+                <a16:creationId xmlns:a16="http://schemas.microsoft.com/office/drawing/2014/main" id="{3FFC4637-22D2-4EB8-BE3C-CA5952F015BC}"/>
+              </a:ext>
+            </a:extLst>
+          </p:cNvPr>
+          <p:cNvSpPr txBox="1"/>
+          <p:nvPr/>
+        </p:nvSpPr>
+        <p:spPr>
+          <a:xfrm>
+            <a:off x="4949716" y="4169803"/>
+            <a:ext cx="1561749" cy="246221"/>
+          </a:xfrm>
+          <a:prstGeom prst="rect">
+            <a:avLst/>
+          </a:prstGeom>
+          <a:noFill/>
+        </p:spPr>
+        <p:txBody>
+          <a:bodyPr wrap="square" rtlCol="0">
+            <a:spAutoFit/>
+          </a:bodyPr>
+          <a:lstStyle/>
+          <a:p>
+            <a:r>
+              <a:rPr lang="nb-NO" sz="1000" dirty="0"/>
+              <a:t>«VM» (App Service Plan)</a:t>
+            </a:r>
+          </a:p>
+        </p:txBody>
+      </p:sp>
+      <p:sp>
+        <p:nvSpPr>
+          <p:cNvPr id="24" name="TextBox 23">
+            <a:extLst>
+              <a:ext uri="{FF2B5EF4-FFF2-40B4-BE49-F238E27FC236}">
+                <a16:creationId xmlns:a16="http://schemas.microsoft.com/office/drawing/2014/main" id="{9756BD30-3A79-4230-BEAA-0AB7339FF892}"/>
+              </a:ext>
+            </a:extLst>
+          </p:cNvPr>
+          <p:cNvSpPr txBox="1"/>
+          <p:nvPr/>
+        </p:nvSpPr>
+        <p:spPr>
+          <a:xfrm>
+            <a:off x="3668267" y="2704449"/>
+            <a:ext cx="1892120" cy="246221"/>
+          </a:xfrm>
+          <a:prstGeom prst="rect">
+            <a:avLst/>
+          </a:prstGeom>
+          <a:noFill/>
+        </p:spPr>
+        <p:txBody>
+          <a:bodyPr wrap="square" rtlCol="0">
+            <a:spAutoFit/>
+          </a:bodyPr>
+          <a:lstStyle/>
+          <a:p>
+            <a:r>
+              <a:rPr lang="nb-NO" sz="1000" dirty="0"/>
+              <a:t>Bildeapplikasjon (Web App)</a:t>
+            </a:r>
+          </a:p>
+        </p:txBody>
+      </p:sp>
+      <p:pic>
+        <p:nvPicPr>
+          <p:cNvPr id="27" name="Graphic 26">
+            <a:extLst>
+              <a:ext uri="{FF2B5EF4-FFF2-40B4-BE49-F238E27FC236}">
+                <a16:creationId xmlns:a16="http://schemas.microsoft.com/office/drawing/2014/main" id="{65F5B066-E9D1-4991-90C3-554017864565}"/>
+              </a:ext>
+            </a:extLst>
+          </p:cNvPr>
+          <p:cNvPicPr>
+            <a:picLocks noChangeAspect="1"/>
+          </p:cNvPicPr>
+          <p:nvPr/>
+        </p:nvPicPr>
+        <p:blipFill>
+          <a:blip r:embed="rId8">
+            <a:extLst>
+              <a:ext uri="{28A0092B-C50C-407E-A947-70E740481C1C}">
+                <a14:useLocalDpi xmlns:a14="http://schemas.microsoft.com/office/drawing/2010/main" val="0"/>
+              </a:ext>
+              <a:ext uri="{96DAC541-7B7A-43D3-8B79-37D633B846F1}">
+                <asvg:svgBlip xmlns:asvg="http://schemas.microsoft.com/office/drawing/2016/SVG/main" r:embed="rId9"/>
+              </a:ext>
+            </a:extLst>
+          </a:blip>
+          <a:stretch>
+            <a:fillRect/>
+          </a:stretch>
+        </p:blipFill>
+        <p:spPr>
+          <a:xfrm>
+            <a:off x="4283157" y="5130980"/>
+            <a:ext cx="476250" cy="476250"/>
+          </a:xfrm>
+          <a:prstGeom prst="rect">
+            <a:avLst/>
+          </a:prstGeom>
+        </p:spPr>
+      </p:pic>
+      <p:cxnSp>
+        <p:nvCxnSpPr>
+          <p:cNvPr id="29" name="Straight Arrow Connector 28">
+            <a:extLst>
+              <a:ext uri="{FF2B5EF4-FFF2-40B4-BE49-F238E27FC236}">
+                <a16:creationId xmlns:a16="http://schemas.microsoft.com/office/drawing/2014/main" id="{DF6D1749-2AE6-4DAA-807A-13CEA5ED31BA}"/>
+              </a:ext>
+            </a:extLst>
+          </p:cNvPr>
+          <p:cNvCxnSpPr>
+            <a:cxnSpLocks/>
+            <a:stCxn id="9" idx="2"/>
+            <a:endCxn id="27" idx="0"/>
+          </p:cNvCxnSpPr>
+          <p:nvPr/>
+        </p:nvCxnSpPr>
+        <p:spPr>
+          <a:xfrm>
+            <a:off x="4521282" y="3567325"/>
+            <a:ext cx="0" cy="1563655"/>
+          </a:xfrm>
+          <a:prstGeom prst="straightConnector1">
+            <a:avLst/>
+          </a:prstGeom>
+          <a:ln w="9525" cap="flat" cmpd="sng" algn="ctr">
+            <a:solidFill>
+              <a:schemeClr val="dk1"/>
+            </a:solidFill>
+            <a:prstDash val="solid"/>
+            <a:round/>
+            <a:headEnd type="arrow" w="med" len="med"/>
+            <a:tailEnd type="arrow" w="med" len="med"/>
+          </a:ln>
+        </p:spPr>
+        <p:style>
+          <a:lnRef idx="0">
+            <a:scrgbClr r="0" g="0" b="0"/>
+          </a:lnRef>
+          <a:fillRef idx="0">
+            <a:scrgbClr r="0" g="0" b="0"/>
+          </a:fillRef>
+          <a:effectRef idx="0">
+            <a:scrgbClr r="0" g="0" b="0"/>
+          </a:effectRef>
+          <a:fontRef idx="minor">
+            <a:schemeClr val="tx1"/>
+          </a:fontRef>
+        </p:style>
+      </p:cxnSp>
+      <p:cxnSp>
+        <p:nvCxnSpPr>
+          <p:cNvPr id="6" name="Straight Arrow Connector 5">
+            <a:extLst>
+              <a:ext uri="{FF2B5EF4-FFF2-40B4-BE49-F238E27FC236}">
+                <a16:creationId xmlns:a16="http://schemas.microsoft.com/office/drawing/2014/main" id="{D74733CE-52BB-4025-95CF-83360D9993C8}"/>
+              </a:ext>
+            </a:extLst>
+          </p:cNvPr>
+          <p:cNvCxnSpPr>
+            <a:stCxn id="9" idx="1"/>
+            <a:endCxn id="15" idx="0"/>
+          </p:cNvCxnSpPr>
+          <p:nvPr/>
+        </p:nvCxnSpPr>
+        <p:spPr>
+          <a:xfrm flipH="1">
+            <a:off x="2320699" y="3329200"/>
+            <a:ext cx="1962458" cy="22234"/>
+          </a:xfrm>
+          <a:prstGeom prst="straightConnector1">
+            <a:avLst/>
+          </a:prstGeom>
+          <a:ln>
+            <a:tailEnd type="triangle"/>
+          </a:ln>
+        </p:spPr>
+        <p:style>
+          <a:lnRef idx="1">
+            <a:schemeClr val="dk1"/>
+          </a:lnRef>
+          <a:fillRef idx="0">
+            <a:schemeClr val="dk1"/>
+          </a:fillRef>
+          <a:effectRef idx="0">
+            <a:schemeClr val="dk1"/>
+          </a:effectRef>
+          <a:fontRef idx="minor">
+            <a:schemeClr val="tx1"/>
+          </a:fontRef>
+        </p:style>
+      </p:cxnSp>
+      <p:sp>
+        <p:nvSpPr>
+          <p:cNvPr id="40" name="TextBox 39">
+            <a:extLst>
+              <a:ext uri="{FF2B5EF4-FFF2-40B4-BE49-F238E27FC236}">
+                <a16:creationId xmlns:a16="http://schemas.microsoft.com/office/drawing/2014/main" id="{4087FB33-82E1-4492-A226-F1EE0C13829B}"/>
+              </a:ext>
+            </a:extLst>
+          </p:cNvPr>
+          <p:cNvSpPr txBox="1"/>
+          <p:nvPr/>
+        </p:nvSpPr>
+        <p:spPr>
+          <a:xfrm>
+            <a:off x="3892087" y="5683248"/>
+            <a:ext cx="1444480" cy="400110"/>
+          </a:xfrm>
+          <a:prstGeom prst="rect">
+            <a:avLst/>
+          </a:prstGeom>
+          <a:noFill/>
+        </p:spPr>
+        <p:txBody>
+          <a:bodyPr wrap="square" rtlCol="0">
+            <a:spAutoFit/>
+          </a:bodyPr>
+          <a:lstStyle/>
+          <a:p>
+            <a:r>
+              <a:rPr lang="nb-NO" sz="1000" dirty="0"/>
+              <a:t>Bilder</a:t>
+            </a:r>
+          </a:p>
+          <a:p>
+            <a:r>
+              <a:rPr lang="nb-NO" sz="1000" dirty="0"/>
+              <a:t>(Blob Storage )</a:t>
+            </a:r>
+          </a:p>
+        </p:txBody>
+      </p:sp>
+    </p:spTree>
+    <p:extLst>
+      <p:ext uri="{BB962C8B-B14F-4D97-AF65-F5344CB8AC3E}">
+        <p14:creationId xmlns:p14="http://schemas.microsoft.com/office/powerpoint/2010/main" val="1676921153"/>
+      </p:ext>
+    </p:extLst>
+  </p:cSld>
+  <p:clrMapOvr>
+    <a:masterClrMapping/>
+  </p:clrMapOvr>
+</p:sld>
+</file>
+
+<file path=ppt/slides/slide15.xml><?xml version="1.0" encoding="utf-8"?>
+<p:sld xmlns:a="http://schemas.openxmlformats.org/drawingml/2006/main" xmlns:r="http://schemas.openxmlformats.org/officeDocument/2006/relationships" xmlns:p="http://schemas.openxmlformats.org/presentationml/2006/main">
+  <p:cSld>
+    <p:spTree>
+      <p:nvGrpSpPr>
+        <p:cNvPr id="1" name=""/>
+        <p:cNvGrpSpPr/>
+        <p:nvPr/>
+      </p:nvGrpSpPr>
+      <p:grpSpPr>
+        <a:xfrm>
+          <a:off x="0" y="0"/>
+          <a:ext cx="0" cy="0"/>
+          <a:chOff x="0" y="0"/>
+          <a:chExt cx="0" cy="0"/>
+        </a:xfrm>
+      </p:grpSpPr>
+      <p:sp>
+        <p:nvSpPr>
+          <p:cNvPr id="2" name="Content Placeholder 1">
+            <a:extLst>
+              <a:ext uri="{FF2B5EF4-FFF2-40B4-BE49-F238E27FC236}">
+                <a16:creationId xmlns:a16="http://schemas.microsoft.com/office/drawing/2014/main" id="{94B98822-8368-4C2D-B1AB-DBC5C478A3C8}"/>
+              </a:ext>
+            </a:extLst>
+          </p:cNvPr>
+          <p:cNvSpPr>
+            <a:spLocks noGrp="1"/>
+          </p:cNvSpPr>
+          <p:nvPr>
+            <p:ph idx="1"/>
+          </p:nvPr>
+        </p:nvSpPr>
+        <p:spPr/>
+        <p:txBody>
+          <a:bodyPr/>
+          <a:lstStyle/>
+          <a:p>
+            <a:pPr marL="0" indent="0">
+              <a:buNone/>
+            </a:pPr>
+            <a:endParaRPr lang="nb-NO" sz="4400" dirty="0"/>
+          </a:p>
+          <a:p>
+            <a:pPr marL="0" indent="0">
+              <a:buNone/>
+            </a:pPr>
+            <a:endParaRPr lang="nb-NO" sz="4400" dirty="0"/>
+          </a:p>
+          <a:p>
+            <a:pPr marL="0" indent="0">
+              <a:buNone/>
+            </a:pPr>
+            <a:endParaRPr lang="nb-NO" sz="4400" dirty="0"/>
+          </a:p>
+          <a:p>
+            <a:pPr marL="0" indent="0">
+              <a:buNone/>
+            </a:pPr>
+            <a:endParaRPr lang="nb-NO" sz="4400" dirty="0"/>
+          </a:p>
+          <a:p>
+            <a:pPr marL="0" indent="0">
+              <a:buNone/>
+            </a:pPr>
+            <a:endParaRPr lang="nb-NO" sz="4400" dirty="0"/>
+          </a:p>
+          <a:p>
+            <a:pPr marL="0" indent="0">
+              <a:buNone/>
+            </a:pPr>
+            <a:r>
+              <a:rPr lang="nb-NO" sz="4400" dirty="0"/>
+              <a:t>Google: Azureskolen </a:t>
+            </a:r>
+          </a:p>
+        </p:txBody>
+      </p:sp>
+      <p:sp>
+        <p:nvSpPr>
+          <p:cNvPr id="3" name="Title 2">
+            <a:extLst>
+              <a:ext uri="{FF2B5EF4-FFF2-40B4-BE49-F238E27FC236}">
+                <a16:creationId xmlns:a16="http://schemas.microsoft.com/office/drawing/2014/main" id="{6E551990-3A9C-43DC-8E56-7146D7720E17}"/>
+              </a:ext>
+            </a:extLst>
+          </p:cNvPr>
+          <p:cNvSpPr>
+            <a:spLocks noGrp="1"/>
+          </p:cNvSpPr>
+          <p:nvPr>
+            <p:ph type="title"/>
+          </p:nvPr>
+        </p:nvSpPr>
+        <p:spPr>
+          <a:xfrm>
+            <a:off x="1328585" y="376848"/>
+            <a:ext cx="10078991" cy="1325563"/>
+          </a:xfrm>
+        </p:spPr>
+        <p:txBody>
+          <a:bodyPr/>
+          <a:lstStyle/>
+          <a:p>
+            <a:r>
+              <a:rPr lang="nb-NO" dirty="0"/>
+              <a:t>Demo og leksjon 1</a:t>
+            </a:r>
+          </a:p>
+        </p:txBody>
+      </p:sp>
+    </p:spTree>
+    <p:extLst>
+      <p:ext uri="{BB962C8B-B14F-4D97-AF65-F5344CB8AC3E}">
+        <p14:creationId xmlns:p14="http://schemas.microsoft.com/office/powerpoint/2010/main" val="2246517485"/>
+      </p:ext>
+    </p:extLst>
+  </p:cSld>
+  <p:clrMapOvr>
+    <a:masterClrMapping/>
+  </p:clrMapOvr>
+</p:sld>
+</file>
+
+<file path=ppt/slides/slide16.xml><?xml version="1.0" encoding="utf-8"?>
+<p:sld xmlns:a="http://schemas.openxmlformats.org/drawingml/2006/main" xmlns:r="http://schemas.openxmlformats.org/officeDocument/2006/relationships" xmlns:p="http://schemas.openxmlformats.org/presentationml/2006/main">
+  <p:cSld>
+    <p:spTree>
+      <p:nvGrpSpPr>
+        <p:cNvPr id="1" name=""/>
+        <p:cNvGrpSpPr/>
+        <p:nvPr/>
+      </p:nvGrpSpPr>
+      <p:grpSpPr>
+        <a:xfrm>
+          <a:off x="0" y="0"/>
+          <a:ext cx="0" cy="0"/>
+          <a:chOff x="0" y="0"/>
+          <a:chExt cx="0" cy="0"/>
+        </a:xfrm>
+      </p:grpSpPr>
+      <p:sp>
+        <p:nvSpPr>
           <p:cNvPr id="2" name="Content Placeholder 1">
             <a:extLst>
               <a:ext uri="{FF2B5EF4-FFF2-40B4-BE49-F238E27FC236}">
@@ -11876,7 +13202,7 @@
             <a:pPr lvl="1"/>
             <a:r>
               <a:rPr lang="nb-NO" dirty="0"/>
-              <a:t>Privilgued Identity Management</a:t>
+              <a:t>Priviligued Identity Management</a:t>
             </a:r>
           </a:p>
           <a:p>
@@ -11982,7 +13308,7 @@
 </p:sld>
 </file>
 
-<file path=ppt/slides/slide12.xml><?xml version="1.0" encoding="utf-8"?>
+<file path=ppt/slides/slide17.xml><?xml version="1.0" encoding="utf-8"?>
 <p:sld xmlns:a="http://schemas.openxmlformats.org/drawingml/2006/main" xmlns:r="http://schemas.openxmlformats.org/officeDocument/2006/relationships" xmlns:p="http://schemas.openxmlformats.org/presentationml/2006/main">
   <p:cSld>
     <p:spTree>
@@ -12081,6 +13407,17 @@
           <a:p>
             <a:pPr lvl="1"/>
             <a:r>
+              <a:rPr lang="nb-NO" b="1" dirty="0"/>
+              <a:t>User principal </a:t>
+            </a:r>
+            <a:r>
+              <a:rPr lang="nb-NO" dirty="0"/>
+              <a:t>– vanlige brukere</a:t>
+            </a:r>
+          </a:p>
+          <a:p>
+            <a:pPr lvl="1"/>
+            <a:r>
               <a:rPr lang="en-US" dirty="0"/>
               <a:t>A </a:t>
             </a:r>
@@ -12096,8 +13433,60 @@
           <a:p>
             <a:pPr lvl="1"/>
             <a:r>
+              <a:rPr lang="en-US" b="1" dirty="0"/>
+              <a:t>Managed Identity Service</a:t>
+            </a:r>
+            <a:r>
               <a:rPr lang="en-US" dirty="0"/>
-              <a:t>Managed Identity Service (MSI)</a:t>
+              <a:t> (MSI) – </a:t>
+            </a:r>
+            <a:r>
+              <a:rPr lang="en-US" dirty="0" err="1"/>
+              <a:t>automatisk</a:t>
+            </a:r>
+            <a:r>
+              <a:rPr lang="en-US" dirty="0"/>
+              <a:t> </a:t>
+            </a:r>
+            <a:r>
+              <a:rPr lang="en-US" dirty="0" err="1"/>
+              <a:t>opprettede</a:t>
+            </a:r>
+            <a:r>
+              <a:rPr lang="en-US" dirty="0"/>
+              <a:t> </a:t>
+            </a:r>
+            <a:r>
+              <a:rPr lang="en-US" dirty="0" err="1"/>
+              <a:t>bruker</a:t>
+            </a:r>
+            <a:r>
+              <a:rPr lang="en-US" dirty="0"/>
+              <a:t> </a:t>
+            </a:r>
+            <a:r>
+              <a:rPr lang="en-US" dirty="0" err="1"/>
+              <a:t>mellom</a:t>
+            </a:r>
+            <a:r>
+              <a:rPr lang="en-US" dirty="0"/>
+              <a:t> </a:t>
+            </a:r>
+            <a:r>
+              <a:rPr lang="en-US" dirty="0" err="1"/>
+              <a:t>tjenester</a:t>
+            </a:r>
+            <a:r>
+              <a:rPr lang="en-US" dirty="0"/>
+              <a:t> </a:t>
+            </a:r>
+            <a:r>
+              <a:rPr lang="en-US" dirty="0" err="1"/>
+              <a:t>i</a:t>
+            </a:r>
+            <a:r>
+              <a:rPr lang="en-US" dirty="0"/>
+              <a:t> Azure.</a:t>
             </a:r>
           </a:p>
           <a:p>
@@ -12226,7 +13615,7 @@
 </p:sld>
 </file>
 
-<file path=ppt/slides/slide13.xml><?xml version="1.0" encoding="utf-8"?>
+<file path=ppt/slides/slide18.xml><?xml version="1.0" encoding="utf-8"?>
 <p:sld xmlns:a="http://schemas.openxmlformats.org/drawingml/2006/main" xmlns:r="http://schemas.openxmlformats.org/officeDocument/2006/relationships" xmlns:p="http://schemas.openxmlformats.org/presentationml/2006/main">
   <p:cSld>
     <p:spTree>
@@ -12298,17 +13687,20 @@
             <a:pPr lvl="1"/>
             <a:r>
               <a:rPr lang="nb-NO" dirty="0"/>
-              <a:t>Open ID Connect</a:t>
+              <a:t>Open ID Connect  (påbygg for identity på OAuth2)</a:t>
             </a:r>
           </a:p>
           <a:p>
             <a:pPr lvl="1"/>
-            <a:endParaRPr lang="nb-NO" dirty="0"/>
-          </a:p>
-          <a:p>
-            <a:r>
-              <a:rPr lang="nb-NO" dirty="0"/>
-              <a:t>Kan hente ut Token for å aksessere andre tjenester.</a:t>
+            <a:r>
+              <a:rPr lang="nb-NO" dirty="0"/>
+              <a:t>SAML</a:t>
+            </a:r>
+          </a:p>
+          <a:p>
+            <a:r>
+              <a:rPr lang="nb-NO" dirty="0"/>
+              <a:t>Kan hente ut Access Token for å aksessere andre tjenester.</a:t>
             </a:r>
           </a:p>
           <a:p>
@@ -12373,7 +13765,7 @@
 </p:sld>
 </file>
 
-<file path=ppt/slides/slide14.xml><?xml version="1.0" encoding="utf-8"?>
+<file path=ppt/slides/slide19.xml><?xml version="1.0" encoding="utf-8"?>
 <p:sld xmlns:a="http://schemas.openxmlformats.org/drawingml/2006/main" xmlns:r="http://schemas.openxmlformats.org/officeDocument/2006/relationships" xmlns:p="http://schemas.openxmlformats.org/presentationml/2006/main">
   <p:cSld>
     <p:spTree>
@@ -12411,9 +13803,12 @@
           <a:bodyPr/>
           <a:lstStyle/>
           <a:p>
-            <a:r>
-              <a:rPr lang="nb-NO" dirty="0"/>
-              <a:t>For å kunne autentisere mot en applikasjon, må den være registrert i AD.</a:t>
+            <a:endParaRPr lang="nb-NO" dirty="0"/>
+          </a:p>
+          <a:p>
+            <a:r>
+              <a:rPr lang="nb-NO" dirty="0"/>
+              <a:t>For å kunne autentisere mot en applikasjon (webside app etc), må den være registrert i AD.</a:t>
             </a:r>
           </a:p>
           <a:p>
@@ -12527,7 +13922,7 @@
 </p:sld>
 </file>
 
-<file path=ppt/slides/slide15.xml><?xml version="1.0" encoding="utf-8"?>
+<file path=ppt/slides/slide2.xml><?xml version="1.0" encoding="utf-8"?>
 <p:sld xmlns:a="http://schemas.openxmlformats.org/drawingml/2006/main" xmlns:r="http://schemas.openxmlformats.org/officeDocument/2006/relationships" xmlns:p="http://schemas.openxmlformats.org/presentationml/2006/main">
   <p:cSld>
     <p:spTree>
@@ -12546,18 +13941,12 @@
       </p:grpSpPr>
       <p:sp>
         <p:nvSpPr>
-          <p:cNvPr id="2" name="Content Placeholder 1">
-            <a:extLst>
-              <a:ext uri="{FF2B5EF4-FFF2-40B4-BE49-F238E27FC236}">
-                <a16:creationId xmlns:a16="http://schemas.microsoft.com/office/drawing/2014/main" id="{01C6EDC8-A815-4F7B-95FE-5E19DA0863EE}"/>
-              </a:ext>
-            </a:extLst>
-          </p:cNvPr>
+          <p:cNvPr id="4" name="Title 3"/>
           <p:cNvSpPr>
             <a:spLocks noGrp="1"/>
           </p:cNvSpPr>
           <p:nvPr>
-            <p:ph idx="1"/>
+            <p:ph type="ctrTitle"/>
           </p:nvPr>
         </p:nvSpPr>
         <p:spPr/>
@@ -12565,24 +13954,21 @@
           <a:bodyPr/>
           <a:lstStyle/>
           <a:p>
-            <a:endParaRPr lang="nb-NO" dirty="0"/>
-          </a:p>
-        </p:txBody>
-      </p:sp>
-      <p:sp>
-        <p:nvSpPr>
-          <p:cNvPr id="3" name="Title 2">
-            <a:extLst>
-              <a:ext uri="{FF2B5EF4-FFF2-40B4-BE49-F238E27FC236}">
-                <a16:creationId xmlns:a16="http://schemas.microsoft.com/office/drawing/2014/main" id="{9616A1BB-BF26-4AFE-905C-E67197F226A0}"/>
-              </a:ext>
-            </a:extLst>
-          </p:cNvPr>
+            <a:r>
+              <a:rPr lang="nb-NO" dirty="0"/>
+              <a:t>Azureskolen – Workshop #3</a:t>
+            </a:r>
+          </a:p>
+        </p:txBody>
+      </p:sp>
+      <p:sp>
+        <p:nvSpPr>
+          <p:cNvPr id="5" name="Subtitle 4"/>
           <p:cNvSpPr>
             <a:spLocks noGrp="1"/>
           </p:cNvSpPr>
           <p:nvPr>
-            <p:ph type="title"/>
+            <p:ph type="subTitle" idx="1"/>
           </p:nvPr>
         </p:nvSpPr>
         <p:spPr/>
@@ -12592,7 +13978,7 @@
           <a:p>
             <a:r>
               <a:rPr lang="nb-NO" dirty="0"/>
-              <a:t>Demo og Leksjon 2.</a:t>
+              <a:t>Sikkerhet</a:t>
             </a:r>
           </a:p>
         </p:txBody>
@@ -12600,7 +13986,7 @@
     </p:spTree>
     <p:extLst>
       <p:ext uri="{BB962C8B-B14F-4D97-AF65-F5344CB8AC3E}">
-        <p14:creationId xmlns:p14="http://schemas.microsoft.com/office/powerpoint/2010/main" val="2607850202"/>
+        <p14:creationId xmlns:p14="http://schemas.microsoft.com/office/powerpoint/2010/main" val="402582954"/>
       </p:ext>
     </p:extLst>
   </p:cSld>
@@ -12610,7 +13996,7 @@
 </p:sld>
 </file>
 
-<file path=ppt/slides/slide16.xml><?xml version="1.0" encoding="utf-8"?>
+<file path=ppt/slides/slide20.xml><?xml version="1.0" encoding="utf-8"?>
 <p:sld xmlns:a="http://schemas.openxmlformats.org/drawingml/2006/main" xmlns:r="http://schemas.openxmlformats.org/officeDocument/2006/relationships" xmlns:p="http://schemas.openxmlformats.org/presentationml/2006/main">
   <p:cSld>
     <p:spTree>
@@ -12632,6 +14018,236 @@
           <p:cNvPr id="2" name="Content Placeholder 1">
             <a:extLst>
               <a:ext uri="{FF2B5EF4-FFF2-40B4-BE49-F238E27FC236}">
+                <a16:creationId xmlns:a16="http://schemas.microsoft.com/office/drawing/2014/main" id="{AEF1988F-5C5A-4303-B139-34CB15C079E7}"/>
+              </a:ext>
+            </a:extLst>
+          </p:cNvPr>
+          <p:cNvSpPr>
+            <a:spLocks noGrp="1"/>
+          </p:cNvSpPr>
+          <p:nvPr>
+            <p:ph idx="1"/>
+          </p:nvPr>
+        </p:nvSpPr>
+        <p:spPr/>
+        <p:txBody>
+          <a:bodyPr/>
+          <a:lstStyle/>
+          <a:p>
+            <a:endParaRPr lang="nb-NO" dirty="0"/>
+          </a:p>
+          <a:p>
+            <a:r>
+              <a:rPr lang="nb-NO" dirty="0"/>
+              <a:t>Kan gi tilgang til brukere registrert:</a:t>
+            </a:r>
+          </a:p>
+          <a:p>
+            <a:pPr lvl="1"/>
+            <a:r>
+              <a:rPr lang="nb-NO" dirty="0"/>
+              <a:t>Som er I egen tenant (single-tenant)</a:t>
+            </a:r>
+          </a:p>
+          <a:p>
+            <a:pPr lvl="1"/>
+            <a:r>
+              <a:rPr lang="nb-NO" dirty="0"/>
+              <a:t>I andre tenants (multi-tenant)</a:t>
+            </a:r>
+          </a:p>
+          <a:p>
+            <a:pPr lvl="1"/>
+            <a:endParaRPr lang="nb-NO" dirty="0"/>
+          </a:p>
+          <a:p>
+            <a:endParaRPr lang="nb-NO" dirty="0"/>
+          </a:p>
+          <a:p>
+            <a:endParaRPr lang="nb-NO" dirty="0"/>
+          </a:p>
+          <a:p>
+            <a:r>
+              <a:rPr lang="nb-NO" dirty="0"/>
+              <a:t>Dersom du ønsker at eksterne brukere skal ha tilgang må du bruke Azure AD B2C.</a:t>
+            </a:r>
+          </a:p>
+          <a:p>
+            <a:pPr lvl="1"/>
+            <a:r>
+              <a:rPr lang="nb-NO" dirty="0"/>
+              <a:t>CIAM (customer identity access management)</a:t>
+            </a:r>
+          </a:p>
+          <a:p>
+            <a:pPr lvl="1"/>
+            <a:r>
+              <a:rPr lang="nb-NO" dirty="0"/>
+              <a:t>Støtter mange identity providers:</a:t>
+            </a:r>
+          </a:p>
+          <a:p>
+            <a:pPr lvl="2"/>
+            <a:r>
+              <a:rPr lang="nb-NO" dirty="0"/>
+              <a:t>Facebook</a:t>
+            </a:r>
+          </a:p>
+          <a:p>
+            <a:pPr lvl="2"/>
+            <a:r>
+              <a:rPr lang="nb-NO" dirty="0"/>
+              <a:t>Google</a:t>
+            </a:r>
+          </a:p>
+        </p:txBody>
+      </p:sp>
+      <p:sp>
+        <p:nvSpPr>
+          <p:cNvPr id="3" name="Title 2">
+            <a:extLst>
+              <a:ext uri="{FF2B5EF4-FFF2-40B4-BE49-F238E27FC236}">
+                <a16:creationId xmlns:a16="http://schemas.microsoft.com/office/drawing/2014/main" id="{509EF17A-0D6D-45E3-B951-B540A11D860D}"/>
+              </a:ext>
+            </a:extLst>
+          </p:cNvPr>
+          <p:cNvSpPr>
+            <a:spLocks noGrp="1"/>
+          </p:cNvSpPr>
+          <p:nvPr>
+            <p:ph type="title"/>
+          </p:nvPr>
+        </p:nvSpPr>
+        <p:spPr/>
+        <p:txBody>
+          <a:bodyPr/>
+          <a:lstStyle/>
+          <a:p>
+            <a:r>
+              <a:rPr lang="nb-NO" dirty="0"/>
+              <a:t>Azure AD - Applikasjoner</a:t>
+            </a:r>
+          </a:p>
+        </p:txBody>
+      </p:sp>
+    </p:spTree>
+    <p:extLst>
+      <p:ext uri="{BB962C8B-B14F-4D97-AF65-F5344CB8AC3E}">
+        <p14:creationId xmlns:p14="http://schemas.microsoft.com/office/powerpoint/2010/main" val="2101231031"/>
+      </p:ext>
+    </p:extLst>
+  </p:cSld>
+  <p:clrMapOvr>
+    <a:masterClrMapping/>
+  </p:clrMapOvr>
+</p:sld>
+</file>
+
+<file path=ppt/slides/slide21.xml><?xml version="1.0" encoding="utf-8"?>
+<p:sld xmlns:a="http://schemas.openxmlformats.org/drawingml/2006/main" xmlns:r="http://schemas.openxmlformats.org/officeDocument/2006/relationships" xmlns:p="http://schemas.openxmlformats.org/presentationml/2006/main">
+  <p:cSld>
+    <p:spTree>
+      <p:nvGrpSpPr>
+        <p:cNvPr id="1" name=""/>
+        <p:cNvGrpSpPr/>
+        <p:nvPr/>
+      </p:nvGrpSpPr>
+      <p:grpSpPr>
+        <a:xfrm>
+          <a:off x="0" y="0"/>
+          <a:ext cx="0" cy="0"/>
+          <a:chOff x="0" y="0"/>
+          <a:chExt cx="0" cy="0"/>
+        </a:xfrm>
+      </p:grpSpPr>
+      <p:sp>
+        <p:nvSpPr>
+          <p:cNvPr id="2" name="Content Placeholder 1">
+            <a:extLst>
+              <a:ext uri="{FF2B5EF4-FFF2-40B4-BE49-F238E27FC236}">
+                <a16:creationId xmlns:a16="http://schemas.microsoft.com/office/drawing/2014/main" id="{01C6EDC8-A815-4F7B-95FE-5E19DA0863EE}"/>
+              </a:ext>
+            </a:extLst>
+          </p:cNvPr>
+          <p:cNvSpPr>
+            <a:spLocks noGrp="1"/>
+          </p:cNvSpPr>
+          <p:nvPr>
+            <p:ph idx="1"/>
+          </p:nvPr>
+        </p:nvSpPr>
+        <p:spPr/>
+        <p:txBody>
+          <a:bodyPr/>
+          <a:lstStyle/>
+          <a:p>
+            <a:endParaRPr lang="nb-NO" dirty="0"/>
+          </a:p>
+        </p:txBody>
+      </p:sp>
+      <p:sp>
+        <p:nvSpPr>
+          <p:cNvPr id="3" name="Title 2">
+            <a:extLst>
+              <a:ext uri="{FF2B5EF4-FFF2-40B4-BE49-F238E27FC236}">
+                <a16:creationId xmlns:a16="http://schemas.microsoft.com/office/drawing/2014/main" id="{9616A1BB-BF26-4AFE-905C-E67197F226A0}"/>
+              </a:ext>
+            </a:extLst>
+          </p:cNvPr>
+          <p:cNvSpPr>
+            <a:spLocks noGrp="1"/>
+          </p:cNvSpPr>
+          <p:nvPr>
+            <p:ph type="title"/>
+          </p:nvPr>
+        </p:nvSpPr>
+        <p:spPr/>
+        <p:txBody>
+          <a:bodyPr/>
+          <a:lstStyle/>
+          <a:p>
+            <a:r>
+              <a:rPr lang="nb-NO" dirty="0"/>
+              <a:t>Demo og Leksjon 2.</a:t>
+            </a:r>
+          </a:p>
+        </p:txBody>
+      </p:sp>
+    </p:spTree>
+    <p:extLst>
+      <p:ext uri="{BB962C8B-B14F-4D97-AF65-F5344CB8AC3E}">
+        <p14:creationId xmlns:p14="http://schemas.microsoft.com/office/powerpoint/2010/main" val="2607850202"/>
+      </p:ext>
+    </p:extLst>
+  </p:cSld>
+  <p:clrMapOvr>
+    <a:masterClrMapping/>
+  </p:clrMapOvr>
+</p:sld>
+</file>
+
+<file path=ppt/slides/slide22.xml><?xml version="1.0" encoding="utf-8"?>
+<p:sld xmlns:a="http://schemas.openxmlformats.org/drawingml/2006/main" xmlns:r="http://schemas.openxmlformats.org/officeDocument/2006/relationships" xmlns:p="http://schemas.openxmlformats.org/presentationml/2006/main">
+  <p:cSld>
+    <p:spTree>
+      <p:nvGrpSpPr>
+        <p:cNvPr id="1" name=""/>
+        <p:cNvGrpSpPr/>
+        <p:nvPr/>
+      </p:nvGrpSpPr>
+      <p:grpSpPr>
+        <a:xfrm>
+          <a:off x="0" y="0"/>
+          <a:ext cx="0" cy="0"/>
+          <a:chOff x="0" y="0"/>
+          <a:chExt cx="0" cy="0"/>
+        </a:xfrm>
+      </p:grpSpPr>
+      <p:sp>
+        <p:nvSpPr>
+          <p:cNvPr id="2" name="Content Placeholder 1">
+            <a:extLst>
+              <a:ext uri="{FF2B5EF4-FFF2-40B4-BE49-F238E27FC236}">
                 <a16:creationId xmlns:a16="http://schemas.microsoft.com/office/drawing/2014/main" id="{3469A132-FA9D-4F94-91D3-A36EA0160557}"/>
               </a:ext>
             </a:extLst>
@@ -12665,36 +14281,53 @@
             <a:endParaRPr lang="nb-NO" dirty="0"/>
           </a:p>
           <a:p>
+            <a:r>
+              <a:rPr lang="nb-NO" dirty="0"/>
+              <a:t>NSG (Network Security Group)</a:t>
+            </a:r>
+          </a:p>
+          <a:p>
+            <a:pPr lvl="1"/>
+            <a:r>
+              <a:rPr lang="nb-NO" dirty="0"/>
+              <a:t>Brukes til å sette </a:t>
+            </a:r>
+            <a:r>
+              <a:rPr lang="nb-NO" dirty="0" err="1"/>
+              <a:t>policies</a:t>
+            </a:r>
+            <a:r>
+              <a:rPr lang="nb-NO" dirty="0"/>
+              <a:t> for virtuelle nettverk eller applikasjoner/virtuelle maskiner.</a:t>
+            </a:r>
+          </a:p>
+          <a:p>
+            <a:pPr lvl="1"/>
+            <a:r>
+              <a:rPr lang="nb-NO" dirty="0"/>
+              <a:t>Kan hindre tilganger til tjenester man ikke ønsker at skal være tilgjengelig over internett.</a:t>
+            </a:r>
+          </a:p>
+          <a:p>
             <a:pPr lvl="1"/>
             <a:endParaRPr lang="nb-NO" dirty="0"/>
           </a:p>
           <a:p>
             <a:r>
               <a:rPr lang="nb-NO" dirty="0"/>
-              <a:t>NSG (Network Security Group)</a:t>
+              <a:t>Service Endpoints</a:t>
             </a:r>
           </a:p>
           <a:p>
             <a:pPr lvl="1"/>
             <a:r>
               <a:rPr lang="nb-NO" dirty="0"/>
-              <a:t>Brukes til å sette </a:t>
-            </a:r>
-            <a:r>
-              <a:rPr lang="nb-NO" dirty="0" err="1"/>
-              <a:t>policies</a:t>
-            </a:r>
-            <a:r>
-              <a:rPr lang="nb-NO" dirty="0"/>
-              <a:t> for virtuelle nettverk eller applikasjoner/virtuelle maskiner.</a:t>
+              <a:t>Kan gjøre Azure PaaS-tjenester (eks. storage account) kun tilgjengelig for et VNet</a:t>
             </a:r>
           </a:p>
           <a:p>
             <a:pPr lvl="1"/>
-            <a:r>
-              <a:rPr lang="nb-NO" dirty="0"/>
-              <a:t>Kan hindre tilganger til tjenester man ikke ønsker at skal være tilgjengelig over internett.</a:t>
-            </a:r>
+            <a:endParaRPr lang="nb-NO" dirty="0"/>
           </a:p>
         </p:txBody>
       </p:sp>
@@ -12811,7 +14444,7 @@
 </p:sld>
 </file>
 
-<file path=ppt/slides/slide17.xml><?xml version="1.0" encoding="utf-8"?>
+<file path=ppt/slides/slide23.xml><?xml version="1.0" encoding="utf-8"?>
 <p:sld xmlns:a="http://schemas.openxmlformats.org/drawingml/2006/main" xmlns:r="http://schemas.openxmlformats.org/officeDocument/2006/relationships" xmlns:p="http://schemas.openxmlformats.org/presentationml/2006/main">
   <p:cSld>
     <p:spTree>
@@ -12830,25 +14463,47 @@
       </p:grpSpPr>
       <p:sp>
         <p:nvSpPr>
-          <p:cNvPr id="2" name="Content Placeholder 1">
+          <p:cNvPr id="4" name="Rectangle: Rounded Corners 3">
             <a:extLst>
               <a:ext uri="{FF2B5EF4-FFF2-40B4-BE49-F238E27FC236}">
-                <a16:creationId xmlns:a16="http://schemas.microsoft.com/office/drawing/2014/main" id="{DB0223AE-910A-4F0A-8FD5-0DF9471B82DB}"/>
+                <a16:creationId xmlns:a16="http://schemas.microsoft.com/office/drawing/2014/main" id="{B8FC131D-CFC1-4CAE-9147-4A22FBFFEC81}"/>
               </a:ext>
             </a:extLst>
           </p:cNvPr>
-          <p:cNvSpPr>
-            <a:spLocks noGrp="1"/>
-          </p:cNvSpPr>
-          <p:nvPr>
-            <p:ph idx="1"/>
-          </p:nvPr>
-        </p:nvSpPr>
-        <p:spPr/>
-        <p:txBody>
-          <a:bodyPr/>
+          <p:cNvSpPr/>
+          <p:nvPr/>
+        </p:nvSpPr>
+        <p:spPr>
+          <a:xfrm>
+            <a:off x="3163536" y="4671370"/>
+            <a:ext cx="2715491" cy="1871475"/>
+          </a:xfrm>
+          <a:prstGeom prst="roundRect">
+            <a:avLst/>
+          </a:prstGeom>
+          <a:ln>
+            <a:prstDash val="sysDot"/>
+          </a:ln>
+        </p:spPr>
+        <p:style>
+          <a:lnRef idx="2">
+            <a:schemeClr val="dk1"/>
+          </a:lnRef>
+          <a:fillRef idx="1">
+            <a:schemeClr val="lt1"/>
+          </a:fillRef>
+          <a:effectRef idx="0">
+            <a:schemeClr val="dk1"/>
+          </a:effectRef>
+          <a:fontRef idx="minor">
+            <a:schemeClr val="dk1"/>
+          </a:fontRef>
+        </p:style>
+        <p:txBody>
+          <a:bodyPr rtlCol="0" anchor="ctr"/>
           <a:lstStyle/>
           <a:p>
+            <a:pPr algn="ctr"/>
             <a:endParaRPr lang="nb-NO"/>
           </a:p>
         </p:txBody>
@@ -12858,7 +14513,7 @@
           <p:cNvPr id="3" name="Title 2">
             <a:extLst>
               <a:ext uri="{FF2B5EF4-FFF2-40B4-BE49-F238E27FC236}">
-                <a16:creationId xmlns:a16="http://schemas.microsoft.com/office/drawing/2014/main" id="{1830904A-EAB2-4AB5-8816-AAC477CD96E8}"/>
+                <a16:creationId xmlns:a16="http://schemas.microsoft.com/office/drawing/2014/main" id="{C74560E7-01E9-479F-BF97-248DDDFF9AFF}"/>
               </a:ext>
             </a:extLst>
           </p:cNvPr>
@@ -12876,15 +14531,541 @@
           <a:p>
             <a:r>
               <a:rPr lang="nb-NO" dirty="0"/>
-              <a:t>Demo og Bonusleksjon</a:t>
-            </a:r>
-          </a:p>
-        </p:txBody>
-      </p:sp>
+              <a:t>Bildeapplikasjonen med VNET/NSG</a:t>
+            </a:r>
+          </a:p>
+        </p:txBody>
+      </p:sp>
+      <p:pic>
+        <p:nvPicPr>
+          <p:cNvPr id="7" name="Graphic 6">
+            <a:extLst>
+              <a:ext uri="{FF2B5EF4-FFF2-40B4-BE49-F238E27FC236}">
+                <a16:creationId xmlns:a16="http://schemas.microsoft.com/office/drawing/2014/main" id="{62CD84CB-7BD7-4D24-8C3C-DCBD32A65322}"/>
+              </a:ext>
+            </a:extLst>
+          </p:cNvPr>
+          <p:cNvPicPr>
+            <a:picLocks noChangeAspect="1"/>
+          </p:cNvPicPr>
+          <p:nvPr/>
+        </p:nvPicPr>
+        <p:blipFill>
+          <a:blip r:embed="rId2">
+            <a:extLst>
+              <a:ext uri="{28A0092B-C50C-407E-A947-70E740481C1C}">
+                <a14:useLocalDpi xmlns:a14="http://schemas.microsoft.com/office/drawing/2010/main" val="0"/>
+              </a:ext>
+              <a:ext uri="{96DAC541-7B7A-43D3-8B79-37D633B846F1}">
+                <asvg:svgBlip xmlns:asvg="http://schemas.microsoft.com/office/drawing/2016/SVG/main" r:embed="rId3"/>
+              </a:ext>
+            </a:extLst>
+          </a:blip>
+          <a:stretch>
+            <a:fillRect/>
+          </a:stretch>
+        </p:blipFill>
+        <p:spPr>
+          <a:xfrm>
+            <a:off x="5254341" y="3648898"/>
+            <a:ext cx="476250" cy="476250"/>
+          </a:xfrm>
+          <a:prstGeom prst="rect">
+            <a:avLst/>
+          </a:prstGeom>
+        </p:spPr>
+      </p:pic>
+      <p:pic>
+        <p:nvPicPr>
+          <p:cNvPr id="9" name="Graphic 8">
+            <a:extLst>
+              <a:ext uri="{FF2B5EF4-FFF2-40B4-BE49-F238E27FC236}">
+                <a16:creationId xmlns:a16="http://schemas.microsoft.com/office/drawing/2014/main" id="{EF8A9E25-C6F9-4F60-A9BD-34CE1498C034}"/>
+              </a:ext>
+            </a:extLst>
+          </p:cNvPr>
+          <p:cNvPicPr>
+            <a:picLocks noChangeAspect="1"/>
+          </p:cNvPicPr>
+          <p:nvPr/>
+        </p:nvPicPr>
+        <p:blipFill>
+          <a:blip r:embed="rId4">
+            <a:extLst>
+              <a:ext uri="{28A0092B-C50C-407E-A947-70E740481C1C}">
+                <a14:useLocalDpi xmlns:a14="http://schemas.microsoft.com/office/drawing/2010/main" val="0"/>
+              </a:ext>
+              <a:ext uri="{96DAC541-7B7A-43D3-8B79-37D633B846F1}">
+                <asvg:svgBlip xmlns:asvg="http://schemas.microsoft.com/office/drawing/2016/SVG/main" r:embed="rId5"/>
+              </a:ext>
+            </a:extLst>
+          </a:blip>
+          <a:stretch>
+            <a:fillRect/>
+          </a:stretch>
+        </p:blipFill>
+        <p:spPr>
+          <a:xfrm>
+            <a:off x="4283157" y="3091075"/>
+            <a:ext cx="476250" cy="476250"/>
+          </a:xfrm>
+          <a:prstGeom prst="rect">
+            <a:avLst/>
+          </a:prstGeom>
+        </p:spPr>
+      </p:pic>
+      <p:pic>
+        <p:nvPicPr>
+          <p:cNvPr id="15" name="Graphic 14">
+            <a:extLst>
+              <a:ext uri="{FF2B5EF4-FFF2-40B4-BE49-F238E27FC236}">
+                <a16:creationId xmlns:a16="http://schemas.microsoft.com/office/drawing/2014/main" id="{3BCD6373-9D61-4DED-AA59-2718E0625701}"/>
+              </a:ext>
+            </a:extLst>
+          </p:cNvPr>
+          <p:cNvPicPr>
+            <a:picLocks noChangeAspect="1"/>
+          </p:cNvPicPr>
+          <p:nvPr/>
+        </p:nvPicPr>
+        <p:blipFill>
+          <a:blip r:embed="rId6">
+            <a:extLst>
+              <a:ext uri="{28A0092B-C50C-407E-A947-70E740481C1C}">
+                <a14:useLocalDpi xmlns:a14="http://schemas.microsoft.com/office/drawing/2010/main" val="0"/>
+              </a:ext>
+              <a:ext uri="{96DAC541-7B7A-43D3-8B79-37D633B846F1}">
+                <asvg:svgBlip xmlns:asvg="http://schemas.microsoft.com/office/drawing/2016/SVG/main" r:embed="rId7"/>
+              </a:ext>
+            </a:extLst>
+          </a:blip>
+          <a:stretch>
+            <a:fillRect/>
+          </a:stretch>
+        </p:blipFill>
+        <p:spPr>
+          <a:xfrm>
+            <a:off x="2082574" y="3351434"/>
+            <a:ext cx="476250" cy="476250"/>
+          </a:xfrm>
+          <a:prstGeom prst="rect">
+            <a:avLst/>
+          </a:prstGeom>
+        </p:spPr>
+      </p:pic>
+      <p:sp>
+        <p:nvSpPr>
+          <p:cNvPr id="16" name="TextBox 15">
+            <a:extLst>
+              <a:ext uri="{FF2B5EF4-FFF2-40B4-BE49-F238E27FC236}">
+                <a16:creationId xmlns:a16="http://schemas.microsoft.com/office/drawing/2014/main" id="{A48DE509-D24C-4D77-9DC1-34856841ECA5}"/>
+              </a:ext>
+            </a:extLst>
+          </p:cNvPr>
+          <p:cNvSpPr txBox="1"/>
+          <p:nvPr/>
+        </p:nvSpPr>
+        <p:spPr>
+          <a:xfrm>
+            <a:off x="1771220" y="3829980"/>
+            <a:ext cx="1444480" cy="400110"/>
+          </a:xfrm>
+          <a:prstGeom prst="rect">
+            <a:avLst/>
+          </a:prstGeom>
+          <a:noFill/>
+        </p:spPr>
+        <p:txBody>
+          <a:bodyPr wrap="square" rtlCol="0">
+            <a:spAutoFit/>
+          </a:bodyPr>
+          <a:lstStyle/>
+          <a:p>
+            <a:r>
+              <a:rPr lang="nb-NO" sz="1000" dirty="0"/>
+              <a:t>Logging / Monitorering</a:t>
+            </a:r>
+          </a:p>
+          <a:p>
+            <a:r>
+              <a:rPr lang="nb-NO" sz="1000" dirty="0"/>
+              <a:t>(Application Insights )</a:t>
+            </a:r>
+          </a:p>
+        </p:txBody>
+      </p:sp>
+      <p:cxnSp>
+        <p:nvCxnSpPr>
+          <p:cNvPr id="18" name="Straight Connector 17">
+            <a:extLst>
+              <a:ext uri="{FF2B5EF4-FFF2-40B4-BE49-F238E27FC236}">
+                <a16:creationId xmlns:a16="http://schemas.microsoft.com/office/drawing/2014/main" id="{6D28B413-EA3B-4223-80AF-A0DDC5332C0D}"/>
+              </a:ext>
+            </a:extLst>
+          </p:cNvPr>
+          <p:cNvCxnSpPr>
+            <a:cxnSpLocks/>
+            <a:stCxn id="9" idx="3"/>
+            <a:endCxn id="7" idx="0"/>
+          </p:cNvCxnSpPr>
+          <p:nvPr/>
+        </p:nvCxnSpPr>
+        <p:spPr>
+          <a:xfrm>
+            <a:off x="4759407" y="3329200"/>
+            <a:ext cx="733059" cy="319698"/>
+          </a:xfrm>
+          <a:prstGeom prst="line">
+            <a:avLst/>
+          </a:prstGeom>
+          <a:ln w="9525" cap="flat" cmpd="sng" algn="ctr">
+            <a:solidFill>
+              <a:schemeClr val="dk1"/>
+            </a:solidFill>
+            <a:prstDash val="dash"/>
+            <a:round/>
+            <a:headEnd type="none" w="med" len="med"/>
+            <a:tailEnd type="none" w="med" len="med"/>
+          </a:ln>
+        </p:spPr>
+        <p:style>
+          <a:lnRef idx="0">
+            <a:scrgbClr r="0" g="0" b="0"/>
+          </a:lnRef>
+          <a:fillRef idx="0">
+            <a:scrgbClr r="0" g="0" b="0"/>
+          </a:fillRef>
+          <a:effectRef idx="0">
+            <a:scrgbClr r="0" g="0" b="0"/>
+          </a:effectRef>
+          <a:fontRef idx="minor">
+            <a:schemeClr val="tx1"/>
+          </a:fontRef>
+        </p:style>
+      </p:cxnSp>
+      <p:sp>
+        <p:nvSpPr>
+          <p:cNvPr id="23" name="TextBox 22">
+            <a:extLst>
+              <a:ext uri="{FF2B5EF4-FFF2-40B4-BE49-F238E27FC236}">
+                <a16:creationId xmlns:a16="http://schemas.microsoft.com/office/drawing/2014/main" id="{3FFC4637-22D2-4EB8-BE3C-CA5952F015BC}"/>
+              </a:ext>
+            </a:extLst>
+          </p:cNvPr>
+          <p:cNvSpPr txBox="1"/>
+          <p:nvPr/>
+        </p:nvSpPr>
+        <p:spPr>
+          <a:xfrm>
+            <a:off x="4949716" y="4169803"/>
+            <a:ext cx="1561749" cy="246221"/>
+          </a:xfrm>
+          <a:prstGeom prst="rect">
+            <a:avLst/>
+          </a:prstGeom>
+          <a:noFill/>
+        </p:spPr>
+        <p:txBody>
+          <a:bodyPr wrap="square" rtlCol="0">
+            <a:spAutoFit/>
+          </a:bodyPr>
+          <a:lstStyle/>
+          <a:p>
+            <a:r>
+              <a:rPr lang="nb-NO" sz="1000" dirty="0"/>
+              <a:t>«VM» (App Service Plan)</a:t>
+            </a:r>
+          </a:p>
+        </p:txBody>
+      </p:sp>
+      <p:sp>
+        <p:nvSpPr>
+          <p:cNvPr id="24" name="TextBox 23">
+            <a:extLst>
+              <a:ext uri="{FF2B5EF4-FFF2-40B4-BE49-F238E27FC236}">
+                <a16:creationId xmlns:a16="http://schemas.microsoft.com/office/drawing/2014/main" id="{9756BD30-3A79-4230-BEAA-0AB7339FF892}"/>
+              </a:ext>
+            </a:extLst>
+          </p:cNvPr>
+          <p:cNvSpPr txBox="1"/>
+          <p:nvPr/>
+        </p:nvSpPr>
+        <p:spPr>
+          <a:xfrm>
+            <a:off x="3668267" y="2704449"/>
+            <a:ext cx="1892120" cy="246221"/>
+          </a:xfrm>
+          <a:prstGeom prst="rect">
+            <a:avLst/>
+          </a:prstGeom>
+          <a:noFill/>
+        </p:spPr>
+        <p:txBody>
+          <a:bodyPr wrap="square" rtlCol="0">
+            <a:spAutoFit/>
+          </a:bodyPr>
+          <a:lstStyle/>
+          <a:p>
+            <a:r>
+              <a:rPr lang="nb-NO" sz="1000" dirty="0"/>
+              <a:t>Bildeapplikasjon (Web App)</a:t>
+            </a:r>
+          </a:p>
+        </p:txBody>
+      </p:sp>
+      <p:pic>
+        <p:nvPicPr>
+          <p:cNvPr id="27" name="Graphic 26">
+            <a:extLst>
+              <a:ext uri="{FF2B5EF4-FFF2-40B4-BE49-F238E27FC236}">
+                <a16:creationId xmlns:a16="http://schemas.microsoft.com/office/drawing/2014/main" id="{65F5B066-E9D1-4991-90C3-554017864565}"/>
+              </a:ext>
+            </a:extLst>
+          </p:cNvPr>
+          <p:cNvPicPr>
+            <a:picLocks noChangeAspect="1"/>
+          </p:cNvPicPr>
+          <p:nvPr/>
+        </p:nvPicPr>
+        <p:blipFill>
+          <a:blip r:embed="rId8">
+            <a:extLst>
+              <a:ext uri="{28A0092B-C50C-407E-A947-70E740481C1C}">
+                <a14:useLocalDpi xmlns:a14="http://schemas.microsoft.com/office/drawing/2010/main" val="0"/>
+              </a:ext>
+              <a:ext uri="{96DAC541-7B7A-43D3-8B79-37D633B846F1}">
+                <asvg:svgBlip xmlns:asvg="http://schemas.microsoft.com/office/drawing/2016/SVG/main" r:embed="rId9"/>
+              </a:ext>
+            </a:extLst>
+          </a:blip>
+          <a:stretch>
+            <a:fillRect/>
+          </a:stretch>
+        </p:blipFill>
+        <p:spPr>
+          <a:xfrm>
+            <a:off x="4283157" y="5130980"/>
+            <a:ext cx="476250" cy="476250"/>
+          </a:xfrm>
+          <a:prstGeom prst="rect">
+            <a:avLst/>
+          </a:prstGeom>
+        </p:spPr>
+      </p:pic>
+      <p:cxnSp>
+        <p:nvCxnSpPr>
+          <p:cNvPr id="29" name="Straight Arrow Connector 28">
+            <a:extLst>
+              <a:ext uri="{FF2B5EF4-FFF2-40B4-BE49-F238E27FC236}">
+                <a16:creationId xmlns:a16="http://schemas.microsoft.com/office/drawing/2014/main" id="{DF6D1749-2AE6-4DAA-807A-13CEA5ED31BA}"/>
+              </a:ext>
+            </a:extLst>
+          </p:cNvPr>
+          <p:cNvCxnSpPr>
+            <a:cxnSpLocks/>
+            <a:stCxn id="9" idx="2"/>
+            <a:endCxn id="27" idx="0"/>
+          </p:cNvCxnSpPr>
+          <p:nvPr/>
+        </p:nvCxnSpPr>
+        <p:spPr>
+          <a:xfrm>
+            <a:off x="4521282" y="3567325"/>
+            <a:ext cx="0" cy="1563655"/>
+          </a:xfrm>
+          <a:prstGeom prst="straightConnector1">
+            <a:avLst/>
+          </a:prstGeom>
+          <a:ln w="9525" cap="flat" cmpd="sng" algn="ctr">
+            <a:solidFill>
+              <a:schemeClr val="dk1"/>
+            </a:solidFill>
+            <a:prstDash val="solid"/>
+            <a:round/>
+            <a:headEnd type="arrow" w="med" len="med"/>
+            <a:tailEnd type="arrow" w="med" len="med"/>
+          </a:ln>
+        </p:spPr>
+        <p:style>
+          <a:lnRef idx="0">
+            <a:scrgbClr r="0" g="0" b="0"/>
+          </a:lnRef>
+          <a:fillRef idx="0">
+            <a:scrgbClr r="0" g="0" b="0"/>
+          </a:fillRef>
+          <a:effectRef idx="0">
+            <a:scrgbClr r="0" g="0" b="0"/>
+          </a:effectRef>
+          <a:fontRef idx="minor">
+            <a:schemeClr val="tx1"/>
+          </a:fontRef>
+        </p:style>
+      </p:cxnSp>
+      <p:cxnSp>
+        <p:nvCxnSpPr>
+          <p:cNvPr id="6" name="Straight Arrow Connector 5">
+            <a:extLst>
+              <a:ext uri="{FF2B5EF4-FFF2-40B4-BE49-F238E27FC236}">
+                <a16:creationId xmlns:a16="http://schemas.microsoft.com/office/drawing/2014/main" id="{D74733CE-52BB-4025-95CF-83360D9993C8}"/>
+              </a:ext>
+            </a:extLst>
+          </p:cNvPr>
+          <p:cNvCxnSpPr>
+            <a:stCxn id="9" idx="1"/>
+            <a:endCxn id="15" idx="0"/>
+          </p:cNvCxnSpPr>
+          <p:nvPr/>
+        </p:nvCxnSpPr>
+        <p:spPr>
+          <a:xfrm flipH="1">
+            <a:off x="2320699" y="3329200"/>
+            <a:ext cx="1962458" cy="22234"/>
+          </a:xfrm>
+          <a:prstGeom prst="straightConnector1">
+            <a:avLst/>
+          </a:prstGeom>
+          <a:ln>
+            <a:tailEnd type="triangle"/>
+          </a:ln>
+        </p:spPr>
+        <p:style>
+          <a:lnRef idx="1">
+            <a:schemeClr val="dk1"/>
+          </a:lnRef>
+          <a:fillRef idx="0">
+            <a:schemeClr val="dk1"/>
+          </a:fillRef>
+          <a:effectRef idx="0">
+            <a:schemeClr val="dk1"/>
+          </a:effectRef>
+          <a:fontRef idx="minor">
+            <a:schemeClr val="tx1"/>
+          </a:fontRef>
+        </p:style>
+      </p:cxnSp>
+      <p:sp>
+        <p:nvSpPr>
+          <p:cNvPr id="40" name="TextBox 39">
+            <a:extLst>
+              <a:ext uri="{FF2B5EF4-FFF2-40B4-BE49-F238E27FC236}">
+                <a16:creationId xmlns:a16="http://schemas.microsoft.com/office/drawing/2014/main" id="{4087FB33-82E1-4492-A226-F1EE0C13829B}"/>
+              </a:ext>
+            </a:extLst>
+          </p:cNvPr>
+          <p:cNvSpPr txBox="1"/>
+          <p:nvPr/>
+        </p:nvSpPr>
+        <p:spPr>
+          <a:xfrm>
+            <a:off x="3892087" y="5683248"/>
+            <a:ext cx="1444480" cy="400110"/>
+          </a:xfrm>
+          <a:prstGeom prst="rect">
+            <a:avLst/>
+          </a:prstGeom>
+          <a:noFill/>
+        </p:spPr>
+        <p:txBody>
+          <a:bodyPr wrap="square" rtlCol="0">
+            <a:spAutoFit/>
+          </a:bodyPr>
+          <a:lstStyle/>
+          <a:p>
+            <a:r>
+              <a:rPr lang="nb-NO" sz="1000" dirty="0"/>
+              <a:t>Bilder</a:t>
+            </a:r>
+          </a:p>
+          <a:p>
+            <a:r>
+              <a:rPr lang="nb-NO" sz="1000" dirty="0"/>
+              <a:t>(Blob Storage )</a:t>
+            </a:r>
+          </a:p>
+        </p:txBody>
+      </p:sp>
+      <p:pic>
+        <p:nvPicPr>
+          <p:cNvPr id="8" name="Graphic 7">
+            <a:extLst>
+              <a:ext uri="{FF2B5EF4-FFF2-40B4-BE49-F238E27FC236}">
+                <a16:creationId xmlns:a16="http://schemas.microsoft.com/office/drawing/2014/main" id="{E9F6AB5E-395D-4BE7-BAFB-C6D5BADE6512}"/>
+              </a:ext>
+            </a:extLst>
+          </p:cNvPr>
+          <p:cNvPicPr>
+            <a:picLocks noChangeAspect="1"/>
+          </p:cNvPicPr>
+          <p:nvPr/>
+        </p:nvPicPr>
+        <p:blipFill>
+          <a:blip r:embed="rId10">
+            <a:extLst>
+              <a:ext uri="{28A0092B-C50C-407E-A947-70E740481C1C}">
+                <a14:useLocalDpi xmlns:a14="http://schemas.microsoft.com/office/drawing/2010/main" val="0"/>
+              </a:ext>
+              <a:ext uri="{96DAC541-7B7A-43D3-8B79-37D633B846F1}">
+                <asvg:svgBlip xmlns:asvg="http://schemas.microsoft.com/office/drawing/2016/SVG/main" r:embed="rId11"/>
+              </a:ext>
+            </a:extLst>
+          </a:blip>
+          <a:stretch>
+            <a:fillRect/>
+          </a:stretch>
+        </p:blipFill>
+        <p:spPr>
+          <a:xfrm>
+            <a:off x="5254340" y="4646053"/>
+            <a:ext cx="476250" cy="476250"/>
+          </a:xfrm>
+          <a:prstGeom prst="rect">
+            <a:avLst/>
+          </a:prstGeom>
+        </p:spPr>
+      </p:pic>
+      <p:pic>
+        <p:nvPicPr>
+          <p:cNvPr id="11" name="Graphic 10">
+            <a:extLst>
+              <a:ext uri="{FF2B5EF4-FFF2-40B4-BE49-F238E27FC236}">
+                <a16:creationId xmlns:a16="http://schemas.microsoft.com/office/drawing/2014/main" id="{805DF316-D9CA-486C-AC2A-187B6828BD80}"/>
+              </a:ext>
+            </a:extLst>
+          </p:cNvPr>
+          <p:cNvPicPr>
+            <a:picLocks noChangeAspect="1"/>
+          </p:cNvPicPr>
+          <p:nvPr/>
+        </p:nvPicPr>
+        <p:blipFill>
+          <a:blip r:embed="rId12">
+            <a:extLst>
+              <a:ext uri="{28A0092B-C50C-407E-A947-70E740481C1C}">
+                <a14:useLocalDpi xmlns:a14="http://schemas.microsoft.com/office/drawing/2010/main" val="0"/>
+              </a:ext>
+              <a:ext uri="{96DAC541-7B7A-43D3-8B79-37D633B846F1}">
+                <asvg:svgBlip xmlns:asvg="http://schemas.microsoft.com/office/drawing/2016/SVG/main" r:embed="rId13"/>
+              </a:ext>
+            </a:extLst>
+          </a:blip>
+          <a:stretch>
+            <a:fillRect/>
+          </a:stretch>
+        </p:blipFill>
+        <p:spPr>
+          <a:xfrm>
+            <a:off x="5254340" y="5946238"/>
+            <a:ext cx="476250" cy="476250"/>
+          </a:xfrm>
+          <a:prstGeom prst="rect">
+            <a:avLst/>
+          </a:prstGeom>
+        </p:spPr>
+      </p:pic>
     </p:spTree>
     <p:extLst>
       <p:ext uri="{BB962C8B-B14F-4D97-AF65-F5344CB8AC3E}">
-        <p14:creationId xmlns:p14="http://schemas.microsoft.com/office/powerpoint/2010/main" val="2993526678"/>
+        <p14:creationId xmlns:p14="http://schemas.microsoft.com/office/powerpoint/2010/main" val="3204010952"/>
       </p:ext>
     </p:extLst>
   </p:cSld>
@@ -12894,7 +15075,7 @@
 </p:sld>
 </file>
 
-<file path=ppt/slides/slide2.xml><?xml version="1.0" encoding="utf-8"?>
+<file path=ppt/slides/slide24.xml><?xml version="1.0" encoding="utf-8"?>
 <p:sld xmlns:a="http://schemas.openxmlformats.org/drawingml/2006/main" xmlns:r="http://schemas.openxmlformats.org/officeDocument/2006/relationships" xmlns:p="http://schemas.openxmlformats.org/presentationml/2006/main">
   <p:cSld>
     <p:spTree>
@@ -12913,12 +15094,18 @@
       </p:grpSpPr>
       <p:sp>
         <p:nvSpPr>
-          <p:cNvPr id="4" name="Title 3"/>
+          <p:cNvPr id="2" name="Content Placeholder 1">
+            <a:extLst>
+              <a:ext uri="{FF2B5EF4-FFF2-40B4-BE49-F238E27FC236}">
+                <a16:creationId xmlns:a16="http://schemas.microsoft.com/office/drawing/2014/main" id="{DB0223AE-910A-4F0A-8FD5-0DF9471B82DB}"/>
+              </a:ext>
+            </a:extLst>
+          </p:cNvPr>
           <p:cNvSpPr>
             <a:spLocks noGrp="1"/>
           </p:cNvSpPr>
           <p:nvPr>
-            <p:ph type="ctrTitle"/>
+            <p:ph idx="1"/>
           </p:nvPr>
         </p:nvSpPr>
         <p:spPr/>
@@ -12928,19 +15115,25 @@
           <a:p>
             <a:r>
               <a:rPr lang="nb-NO" dirty="0"/>
-              <a:t>Azureskolen – Workshop #3</a:t>
-            </a:r>
-          </a:p>
-        </p:txBody>
-      </p:sp>
-      <p:sp>
-        <p:nvSpPr>
-          <p:cNvPr id="5" name="Subtitle 4"/>
+              <a:t>Legge til et </a:t>
+            </a:r>
+          </a:p>
+        </p:txBody>
+      </p:sp>
+      <p:sp>
+        <p:nvSpPr>
+          <p:cNvPr id="3" name="Title 2">
+            <a:extLst>
+              <a:ext uri="{FF2B5EF4-FFF2-40B4-BE49-F238E27FC236}">
+                <a16:creationId xmlns:a16="http://schemas.microsoft.com/office/drawing/2014/main" id="{1830904A-EAB2-4AB5-8816-AAC477CD96E8}"/>
+              </a:ext>
+            </a:extLst>
+          </p:cNvPr>
           <p:cNvSpPr>
             <a:spLocks noGrp="1"/>
           </p:cNvSpPr>
           <p:nvPr>
-            <p:ph type="subTitle" idx="1"/>
+            <p:ph type="title"/>
           </p:nvPr>
         </p:nvSpPr>
         <p:spPr/>
@@ -12950,7 +15143,7 @@
           <a:p>
             <a:r>
               <a:rPr lang="nb-NO" dirty="0"/>
-              <a:t>Sikkerhet</a:t>
+              <a:t>Demo og Bonusleksjon</a:t>
             </a:r>
           </a:p>
         </p:txBody>
@@ -12958,7 +15151,7 @@
     </p:spTree>
     <p:extLst>
       <p:ext uri="{BB962C8B-B14F-4D97-AF65-F5344CB8AC3E}">
-        <p14:creationId xmlns:p14="http://schemas.microsoft.com/office/powerpoint/2010/main" val="402582954"/>
+        <p14:creationId xmlns:p14="http://schemas.microsoft.com/office/powerpoint/2010/main" val="2993526678"/>
       </p:ext>
     </p:extLst>
   </p:cSld>
@@ -13391,6 +15584,129 @@
       </p:grpSpPr>
       <p:sp>
         <p:nvSpPr>
+          <p:cNvPr id="2" name="Content Placeholder 1">
+            <a:extLst>
+              <a:ext uri="{FF2B5EF4-FFF2-40B4-BE49-F238E27FC236}">
+                <a16:creationId xmlns:a16="http://schemas.microsoft.com/office/drawing/2014/main" id="{0D2E6551-FB34-4842-B140-5F0475BDB3EF}"/>
+              </a:ext>
+            </a:extLst>
+          </p:cNvPr>
+          <p:cNvSpPr>
+            <a:spLocks noGrp="1"/>
+          </p:cNvSpPr>
+          <p:nvPr>
+            <p:ph idx="1"/>
+          </p:nvPr>
+        </p:nvSpPr>
+        <p:spPr/>
+        <p:txBody>
+          <a:bodyPr/>
+          <a:lstStyle/>
+          <a:p>
+            <a:pPr marL="0" indent="0">
+              <a:buNone/>
+            </a:pPr>
+            <a:endParaRPr lang="nb-NO" dirty="0">
+              <a:hlinkClick r:id="rId2"/>
+            </a:endParaRPr>
+          </a:p>
+          <a:p>
+            <a:pPr marL="0" indent="0">
+              <a:buNone/>
+            </a:pPr>
+            <a:endParaRPr lang="nb-NO" dirty="0">
+              <a:hlinkClick r:id="rId2"/>
+            </a:endParaRPr>
+          </a:p>
+          <a:p>
+            <a:r>
+              <a:rPr lang="nb-NO" dirty="0">
+                <a:hlinkClick r:id="rId2"/>
+              </a:rPr>
+              <a:t>https://minside.bouvet.no/bouvet-alle/meg-som-ansatt/sikkerhet-i-dna-et-vart</a:t>
+            </a:r>
+            <a:endParaRPr lang="nb-NO" dirty="0"/>
+          </a:p>
+          <a:p>
+            <a:pPr marL="0" indent="0">
+              <a:buNone/>
+            </a:pPr>
+            <a:endParaRPr lang="nb-NO" dirty="0"/>
+          </a:p>
+          <a:p>
+            <a:r>
+              <a:rPr lang="nb-NO" dirty="0">
+                <a:hlinkClick r:id="rId3"/>
+              </a:rPr>
+              <a:t>https://minside.bouvet.no/metoder/cloud-security</a:t>
+            </a:r>
+            <a:endParaRPr lang="nb-NO" dirty="0"/>
+          </a:p>
+          <a:p>
+            <a:endParaRPr lang="nb-NO" dirty="0"/>
+          </a:p>
+        </p:txBody>
+      </p:sp>
+      <p:sp>
+        <p:nvSpPr>
+          <p:cNvPr id="3" name="Title 2">
+            <a:extLst>
+              <a:ext uri="{FF2B5EF4-FFF2-40B4-BE49-F238E27FC236}">
+                <a16:creationId xmlns:a16="http://schemas.microsoft.com/office/drawing/2014/main" id="{0799CBB5-0E2C-4344-96B8-3F135E8ED7F7}"/>
+              </a:ext>
+            </a:extLst>
+          </p:cNvPr>
+          <p:cNvSpPr>
+            <a:spLocks noGrp="1"/>
+          </p:cNvSpPr>
+          <p:nvPr>
+            <p:ph type="title"/>
+          </p:nvPr>
+        </p:nvSpPr>
+        <p:spPr/>
+        <p:txBody>
+          <a:bodyPr/>
+          <a:lstStyle/>
+          <a:p>
+            <a:r>
+              <a:rPr lang="nb-NO" dirty="0"/>
+              <a:t>Sikkerhet i DNAet vårt (Bouvet interne)</a:t>
+            </a:r>
+          </a:p>
+        </p:txBody>
+      </p:sp>
+    </p:spTree>
+    <p:extLst>
+      <p:ext uri="{BB962C8B-B14F-4D97-AF65-F5344CB8AC3E}">
+        <p14:creationId xmlns:p14="http://schemas.microsoft.com/office/powerpoint/2010/main" val="1163624278"/>
+      </p:ext>
+    </p:extLst>
+  </p:cSld>
+  <p:clrMapOvr>
+    <a:masterClrMapping/>
+  </p:clrMapOvr>
+</p:sld>
+</file>
+
+<file path=ppt/slides/slide6.xml><?xml version="1.0" encoding="utf-8"?>
+<p:sld xmlns:a="http://schemas.openxmlformats.org/drawingml/2006/main" xmlns:r="http://schemas.openxmlformats.org/officeDocument/2006/relationships" xmlns:p="http://schemas.openxmlformats.org/presentationml/2006/main">
+  <p:cSld>
+    <p:spTree>
+      <p:nvGrpSpPr>
+        <p:cNvPr id="1" name=""/>
+        <p:cNvGrpSpPr/>
+        <p:nvPr/>
+      </p:nvGrpSpPr>
+      <p:grpSpPr>
+        <a:xfrm>
+          <a:off x="0" y="0"/>
+          <a:ext cx="0" cy="0"/>
+          <a:chOff x="0" y="0"/>
+          <a:chExt cx="0" cy="0"/>
+        </a:xfrm>
+      </p:grpSpPr>
+      <p:sp>
+        <p:nvSpPr>
           <p:cNvPr id="2" name="Content Placeholder 1"/>
           <p:cNvSpPr>
             <a:spLocks noGrp="1"/>
@@ -13539,7 +15855,7 @@
 </p:sld>
 </file>
 
-<file path=ppt/slides/slide6.xml><?xml version="1.0" encoding="utf-8"?>
+<file path=ppt/slides/slide7.xml><?xml version="1.0" encoding="utf-8"?>
 <p:sld xmlns:a="http://schemas.openxmlformats.org/drawingml/2006/main" xmlns:r="http://schemas.openxmlformats.org/officeDocument/2006/relationships" xmlns:p="http://schemas.openxmlformats.org/presentationml/2006/main">
   <p:cSld>
     <p:spTree>
@@ -13738,7 +16054,7 @@
 </p:sld>
 </file>
 
-<file path=ppt/slides/slide7.xml><?xml version="1.0" encoding="utf-8"?>
+<file path=ppt/slides/slide8.xml><?xml version="1.0" encoding="utf-8"?>
 <p:sld xmlns:a="http://schemas.openxmlformats.org/drawingml/2006/main" xmlns:r="http://schemas.openxmlformats.org/officeDocument/2006/relationships" xmlns:p="http://schemas.openxmlformats.org/presentationml/2006/main">
   <p:cSld>
     <p:spTree>
@@ -13889,200 +16205,6 @@
     <p:extLst>
       <p:ext uri="{BB962C8B-B14F-4D97-AF65-F5344CB8AC3E}">
         <p14:creationId xmlns:p14="http://schemas.microsoft.com/office/powerpoint/2010/main" val="2892039909"/>
-      </p:ext>
-    </p:extLst>
-  </p:cSld>
-  <p:clrMapOvr>
-    <a:masterClrMapping/>
-  </p:clrMapOvr>
-</p:sld>
-</file>
-
-<file path=ppt/slides/slide8.xml><?xml version="1.0" encoding="utf-8"?>
-<p:sld xmlns:a="http://schemas.openxmlformats.org/drawingml/2006/main" xmlns:r="http://schemas.openxmlformats.org/officeDocument/2006/relationships" xmlns:p="http://schemas.openxmlformats.org/presentationml/2006/main">
-  <p:cSld>
-    <p:spTree>
-      <p:nvGrpSpPr>
-        <p:cNvPr id="1" name=""/>
-        <p:cNvGrpSpPr/>
-        <p:nvPr/>
-      </p:nvGrpSpPr>
-      <p:grpSpPr>
-        <a:xfrm>
-          <a:off x="0" y="0"/>
-          <a:ext cx="0" cy="0"/>
-          <a:chOff x="0" y="0"/>
-          <a:chExt cx="0" cy="0"/>
-        </a:xfrm>
-      </p:grpSpPr>
-      <p:sp>
-        <p:nvSpPr>
-          <p:cNvPr id="2" name="Content Placeholder 1">
-            <a:extLst>
-              <a:ext uri="{FF2B5EF4-FFF2-40B4-BE49-F238E27FC236}">
-                <a16:creationId xmlns:a16="http://schemas.microsoft.com/office/drawing/2014/main" id="{7E0053A4-7AD4-492F-BC64-A947322D867F}"/>
-              </a:ext>
-            </a:extLst>
-          </p:cNvPr>
-          <p:cNvSpPr>
-            <a:spLocks noGrp="1"/>
-          </p:cNvSpPr>
-          <p:nvPr>
-            <p:ph idx="1"/>
-          </p:nvPr>
-        </p:nvSpPr>
-        <p:spPr/>
-        <p:txBody>
-          <a:bodyPr/>
-          <a:lstStyle/>
-          <a:p>
-            <a:r>
-              <a:rPr lang="nb-NO" dirty="0" err="1"/>
-              <a:t>Monitoring</a:t>
-            </a:r>
-            <a:r>
-              <a:rPr lang="nb-NO" dirty="0"/>
-              <a:t> service for sikkerhet</a:t>
-            </a:r>
-          </a:p>
-          <a:p>
-            <a:endParaRPr lang="nb-NO" dirty="0"/>
-          </a:p>
-          <a:p>
-            <a:r>
-              <a:rPr lang="nb-NO" dirty="0"/>
-              <a:t>Anbefalinger: scanner tjenester for å finne usikker konfigurasjon </a:t>
-            </a:r>
-          </a:p>
-          <a:p>
-            <a:r>
-              <a:rPr lang="nb-NO" dirty="0"/>
-              <a:t>Overvåking av tjenester (Standard)</a:t>
-            </a:r>
-          </a:p>
-          <a:p>
-            <a:r>
-              <a:rPr lang="nb-NO" dirty="0"/>
-              <a:t>Sikkerhetsscore og compliance</a:t>
-            </a:r>
-          </a:p>
-          <a:p>
-            <a:r>
-              <a:rPr lang="nb-NO" dirty="0"/>
-              <a:t>To prisnivåer</a:t>
-            </a:r>
-          </a:p>
-          <a:p>
-            <a:pPr lvl="1"/>
-            <a:r>
-              <a:rPr lang="nb-NO" dirty="0" err="1"/>
-              <a:t>Free</a:t>
-            </a:r>
-            <a:r>
-              <a:rPr lang="nb-NO" dirty="0"/>
-              <a:t> tier: Tilbyr anbefalinger </a:t>
-            </a:r>
-          </a:p>
-          <a:p>
-            <a:pPr lvl="1"/>
-            <a:r>
-              <a:rPr lang="nb-NO" dirty="0"/>
-              <a:t>Standard tier: Tilbyr alle tjenester som overvåkning av tjenester</a:t>
-            </a:r>
-          </a:p>
-          <a:p>
-            <a:endParaRPr lang="nb-NO" dirty="0"/>
-          </a:p>
-          <a:p>
-            <a:pPr marL="0" indent="0">
-              <a:buNone/>
-            </a:pPr>
-            <a:endParaRPr lang="nb-NO" dirty="0"/>
-          </a:p>
-          <a:p>
-            <a:endParaRPr lang="nb-NO" dirty="0"/>
-          </a:p>
-        </p:txBody>
-      </p:sp>
-      <p:sp>
-        <p:nvSpPr>
-          <p:cNvPr id="3" name="Title 2">
-            <a:extLst>
-              <a:ext uri="{FF2B5EF4-FFF2-40B4-BE49-F238E27FC236}">
-                <a16:creationId xmlns:a16="http://schemas.microsoft.com/office/drawing/2014/main" id="{588209D4-0181-4A79-95F6-D34F1CB44558}"/>
-              </a:ext>
-            </a:extLst>
-          </p:cNvPr>
-          <p:cNvSpPr>
-            <a:spLocks noGrp="1"/>
-          </p:cNvSpPr>
-          <p:nvPr>
-            <p:ph type="title"/>
-          </p:nvPr>
-        </p:nvSpPr>
-        <p:spPr/>
-        <p:txBody>
-          <a:bodyPr/>
-          <a:lstStyle/>
-          <a:p>
-            <a:r>
-              <a:rPr lang="nb-NO" dirty="0"/>
-              <a:t>Azure Security Center</a:t>
-            </a:r>
-          </a:p>
-        </p:txBody>
-      </p:sp>
-      <p:pic>
-        <p:nvPicPr>
-          <p:cNvPr id="2050" name="Picture 2" descr="Bilderesultat for azure security center">
-            <a:extLst>
-              <a:ext uri="{FF2B5EF4-FFF2-40B4-BE49-F238E27FC236}">
-                <a16:creationId xmlns:a16="http://schemas.microsoft.com/office/drawing/2014/main" id="{78200B77-F882-4721-B5FB-EE76BBDDEFCF}"/>
-              </a:ext>
-            </a:extLst>
-          </p:cNvPr>
-          <p:cNvPicPr>
-            <a:picLocks noChangeAspect="1" noChangeArrowheads="1"/>
-          </p:cNvPicPr>
-          <p:nvPr/>
-        </p:nvPicPr>
-        <p:blipFill>
-          <a:blip r:embed="rId3">
-            <a:extLst>
-              <a:ext uri="{28A0092B-C50C-407E-A947-70E740481C1C}">
-                <a14:useLocalDpi xmlns:a14="http://schemas.microsoft.com/office/drawing/2010/main" val="0"/>
-              </a:ext>
-            </a:extLst>
-          </a:blip>
-          <a:srcRect/>
-          <a:stretch>
-            <a:fillRect/>
-          </a:stretch>
-        </p:blipFill>
-        <p:spPr bwMode="auto">
-          <a:xfrm>
-            <a:off x="8978921" y="2357437"/>
-            <a:ext cx="2143125" cy="2143125"/>
-          </a:xfrm>
-          <a:prstGeom prst="rect">
-            <a:avLst/>
-          </a:prstGeom>
-          <a:noFill/>
-          <a:extLst>
-            <a:ext uri="{909E8E84-426E-40DD-AFC4-6F175D3DCCD1}">
-              <a14:hiddenFill xmlns:a14="http://schemas.microsoft.com/office/drawing/2010/main">
-                <a:solidFill>
-                  <a:srgbClr val="FFFFFF"/>
-                </a:solidFill>
-              </a14:hiddenFill>
-            </a:ext>
-          </a:extLst>
-        </p:spPr>
-      </p:pic>
-    </p:spTree>
-    <p:extLst>
-      <p:ext uri="{BB962C8B-B14F-4D97-AF65-F5344CB8AC3E}">
-        <p14:creationId xmlns:p14="http://schemas.microsoft.com/office/powerpoint/2010/main" val="1414863137"/>
       </p:ext>
     </p:extLst>
   </p:cSld>
@@ -14114,7 +16236,7 @@
           <p:cNvPr id="2" name="Content Placeholder 1">
             <a:extLst>
               <a:ext uri="{FF2B5EF4-FFF2-40B4-BE49-F238E27FC236}">
-                <a16:creationId xmlns:a16="http://schemas.microsoft.com/office/drawing/2014/main" id="{0D2E6551-FB34-4842-B140-5F0475BDB3EF}"/>
+                <a16:creationId xmlns:a16="http://schemas.microsoft.com/office/drawing/2014/main" id="{BBC2A59F-0F2D-472D-B779-1AEF06956744}"/>
               </a:ext>
             </a:extLst>
           </p:cNvPr>
@@ -14130,39 +16252,69 @@
           <a:bodyPr/>
           <a:lstStyle/>
           <a:p>
-            <a:pPr marL="0" indent="0">
-              <a:buNone/>
-            </a:pPr>
-            <a:endParaRPr lang="nb-NO" dirty="0">
-              <a:hlinkClick r:id="rId2"/>
-            </a:endParaRPr>
-          </a:p>
-          <a:p>
-            <a:r>
-              <a:rPr lang="nb-NO" dirty="0">
-                <a:hlinkClick r:id="rId2"/>
-              </a:rPr>
-              <a:t>https://minside.bouvet.no/bouvet-alle/meg-som-ansatt/sikkerhet-i-dna-et-vart</a:t>
-            </a:r>
-            <a:endParaRPr lang="nb-NO" dirty="0"/>
-          </a:p>
-          <a:p>
-            <a:pPr marL="0" indent="0">
-              <a:buNone/>
-            </a:pPr>
-            <a:endParaRPr lang="nb-NO" dirty="0"/>
-          </a:p>
-          <a:p>
-            <a:r>
-              <a:rPr lang="nb-NO" dirty="0">
-                <a:hlinkClick r:id="rId3"/>
-              </a:rPr>
-              <a:t>https://minside.bouvet.no/metoder/cloud-security</a:t>
-            </a:r>
-            <a:endParaRPr lang="nb-NO" dirty="0"/>
-          </a:p>
-          <a:p>
-            <a:endParaRPr lang="nb-NO" dirty="0"/>
+            <a:r>
+              <a:rPr lang="nb-NO" dirty="0"/>
+              <a:t>Påse at kryptering er påslått både for ..</a:t>
+            </a:r>
+          </a:p>
+          <a:p>
+            <a:pPr lvl="1"/>
+            <a:r>
+              <a:rPr lang="nb-NO" dirty="0"/>
+              <a:t>Lagrede data (encryption at rest)</a:t>
+            </a:r>
+          </a:p>
+          <a:p>
+            <a:pPr lvl="1"/>
+            <a:r>
+              <a:rPr lang="nb-NO" dirty="0"/>
+              <a:t>Data i transport (encryption in transit)</a:t>
+            </a:r>
+          </a:p>
+          <a:p>
+            <a:r>
+              <a:rPr lang="nb-NO" dirty="0"/>
+              <a:t>Ikke gi mere tilganger enn strengt nødvendig (Least Priviligue)</a:t>
+            </a:r>
+          </a:p>
+          <a:p>
+            <a:r>
+              <a:rPr lang="nb-NO" dirty="0"/>
+              <a:t>Kreve autentisering mot alle endepunkt (Zero Trust)</a:t>
+            </a:r>
+          </a:p>
+          <a:p>
+            <a:r>
+              <a:rPr lang="nb-NO" dirty="0"/>
+              <a:t>Ikke eksponere flere endepunkter enn nødvendig</a:t>
+            </a:r>
+          </a:p>
+          <a:p>
+            <a:r>
+              <a:rPr lang="nb-NO" dirty="0"/>
+              <a:t>Følge gode prinsipper for sikker utvikling:</a:t>
+            </a:r>
+          </a:p>
+          <a:p>
+            <a:pPr lvl="1"/>
+            <a:r>
+              <a:rPr lang="nb-NO" dirty="0"/>
+              <a:t>Gode prinsipper for websikkerhet (OWASP top 10)</a:t>
+            </a:r>
+          </a:p>
+          <a:p>
+            <a:pPr lvl="1"/>
+            <a:r>
+              <a:rPr lang="nb-NO" dirty="0"/>
+              <a:t>Holde biblioteker oppdaterte (nuget, npm etc)</a:t>
+            </a:r>
+          </a:p>
+          <a:p>
+            <a:pPr lvl="1"/>
+            <a:r>
+              <a:rPr lang="nb-NO" dirty="0"/>
+              <a:t>Sikkerhetskrav, trusselmodellering, DevSecOps osv.</a:t>
+            </a:r>
           </a:p>
         </p:txBody>
       </p:sp>
@@ -14171,7 +16323,7 @@
           <p:cNvPr id="3" name="Title 2">
             <a:extLst>
               <a:ext uri="{FF2B5EF4-FFF2-40B4-BE49-F238E27FC236}">
-                <a16:creationId xmlns:a16="http://schemas.microsoft.com/office/drawing/2014/main" id="{0799CBB5-0E2C-4344-96B8-3F135E8ED7F7}"/>
+                <a16:creationId xmlns:a16="http://schemas.microsoft.com/office/drawing/2014/main" id="{B52EA130-61A8-472B-BB96-7A427FC83EF1}"/>
               </a:ext>
             </a:extLst>
           </p:cNvPr>
@@ -14189,7 +16341,7 @@
           <a:p>
             <a:r>
               <a:rPr lang="nb-NO" dirty="0"/>
-              <a:t>Nyttige lenker (Bouvet interne)</a:t>
+              <a:t>Fortsatt vårt ansvar å..  (eksempler)</a:t>
             </a:r>
           </a:p>
         </p:txBody>
@@ -14197,7 +16349,7 @@
     </p:spTree>
     <p:extLst>
       <p:ext uri="{BB962C8B-B14F-4D97-AF65-F5344CB8AC3E}">
-        <p14:creationId xmlns:p14="http://schemas.microsoft.com/office/powerpoint/2010/main" val="1163624278"/>
+        <p14:creationId xmlns:p14="http://schemas.microsoft.com/office/powerpoint/2010/main" val="3567370827"/>
       </p:ext>
     </p:extLst>
   </p:cSld>
@@ -15739,12 +17891,6 @@
 </file>
 
 <file path=customXml/item1.xml><?xml version="1.0" encoding="utf-8"?>
-<p:properties xmlns:p="http://schemas.microsoft.com/office/2006/metadata/properties" xmlns:xsi="http://www.w3.org/2001/XMLSchema-instance" xmlns:pc="http://schemas.microsoft.com/office/infopath/2007/PartnerControls">
-  <documentManagement/>
-</p:properties>
-</file>
-
-<file path=customXml/item2.xml><?xml version="1.0" encoding="utf-8"?>
 <ct:contentTypeSchema xmlns:ct="http://schemas.microsoft.com/office/2006/metadata/contentType" xmlns:ma="http://schemas.microsoft.com/office/2006/metadata/properties/metaAttributes" ct:_="" ma:_="" ma:contentTypeName="Document" ma:contentTypeID="0x0101005D3CE5A03C88D04F8FE0CC8617320B29" ma:contentTypeVersion="2" ma:contentTypeDescription="Create a new document." ma:contentTypeScope="" ma:versionID="23c508fadb5761cd27fdc7efc393bb78">
   <xsd:schema xmlns:xsd="http://www.w3.org/2001/XMLSchema" xmlns:xs="http://www.w3.org/2001/XMLSchema" xmlns:p="http://schemas.microsoft.com/office/2006/metadata/properties" xmlns:ns2="323bcd62-7d27-4513-9df1-9bc20f03554b" targetNamespace="http://schemas.microsoft.com/office/2006/metadata/properties" ma:root="true" ma:fieldsID="4120a6a9df7c81c23a4d646d2ccf1355" ns2:_="">
     <xsd:import namespace="323bcd62-7d27-4513-9df1-9bc20f03554b"/>
@@ -15876,6 +18022,12 @@
 </ct:contentTypeSchema>
 </file>
 
+<file path=customXml/item2.xml><?xml version="1.0" encoding="utf-8"?>
+<p:properties xmlns:p="http://schemas.microsoft.com/office/2006/metadata/properties" xmlns:xsi="http://www.w3.org/2001/XMLSchema-instance" xmlns:pc="http://schemas.microsoft.com/office/infopath/2007/PartnerControls">
+  <documentManagement/>
+</p:properties>
+</file>
+
 <file path=customXml/item3.xml><?xml version="1.0" encoding="utf-8"?>
 <?mso-contentType ?>
 <FormTemplates xmlns="http://schemas.microsoft.com/sharepoint/v3/contenttype/forms">
@@ -15886,23 +18038,6 @@
 </file>
 
 <file path=customXml/itemProps1.xml><?xml version="1.0" encoding="utf-8"?>
-<ds:datastoreItem xmlns:ds="http://schemas.openxmlformats.org/officeDocument/2006/customXml" ds:itemID="{9D2CB842-18D5-4EEF-9009-B0CAFCE7AC3E}">
-  <ds:schemaRefs>
-    <ds:schemaRef ds:uri="http://schemas.microsoft.com/office/2006/documentManagement/types"/>
-    <ds:schemaRef ds:uri="http://schemas.microsoft.com/office/infopath/2007/PartnerControls"/>
-    <ds:schemaRef ds:uri="cd7095a3-97f1-4663-a71f-a762e9d8a5de"/>
-    <ds:schemaRef ds:uri="http://purl.org/dc/elements/1.1/"/>
-    <ds:schemaRef ds:uri="http://schemas.microsoft.com/office/2006/metadata/properties"/>
-    <ds:schemaRef ds:uri="http://schemas.microsoft.com/sharepoint/v3"/>
-    <ds:schemaRef ds:uri="http://purl.org/dc/terms/"/>
-    <ds:schemaRef ds:uri="http://schemas.openxmlformats.org/package/2006/metadata/core-properties"/>
-    <ds:schemaRef ds:uri="http://www.w3.org/XML/1998/namespace"/>
-    <ds:schemaRef ds:uri="http://purl.org/dc/dcmitype/"/>
-  </ds:schemaRefs>
-</ds:datastoreItem>
-</file>
-
-<file path=customXml/itemProps2.xml><?xml version="1.0" encoding="utf-8"?>
 <ds:datastoreItem xmlns:ds="http://schemas.openxmlformats.org/officeDocument/2006/customXml" ds:itemID="{0377EA4A-9170-43AD-A052-6EABC948F73F}">
   <ds:schemaRefs>
     <ds:schemaRef ds:uri="http://schemas.microsoft.com/office/2006/metadata/contentType"/>
@@ -15920,6 +18055,23 @@
 </ds:datastoreItem>
 </file>
 
+<file path=customXml/itemProps2.xml><?xml version="1.0" encoding="utf-8"?>
+<ds:datastoreItem xmlns:ds="http://schemas.openxmlformats.org/officeDocument/2006/customXml" ds:itemID="{9D2CB842-18D5-4EEF-9009-B0CAFCE7AC3E}">
+  <ds:schemaRefs>
+    <ds:schemaRef ds:uri="http://schemas.microsoft.com/office/2006/documentManagement/types"/>
+    <ds:schemaRef ds:uri="http://schemas.microsoft.com/office/infopath/2007/PartnerControls"/>
+    <ds:schemaRef ds:uri="cd7095a3-97f1-4663-a71f-a762e9d8a5de"/>
+    <ds:schemaRef ds:uri="http://purl.org/dc/elements/1.1/"/>
+    <ds:schemaRef ds:uri="http://schemas.microsoft.com/office/2006/metadata/properties"/>
+    <ds:schemaRef ds:uri="http://schemas.microsoft.com/sharepoint/v3"/>
+    <ds:schemaRef ds:uri="http://purl.org/dc/terms/"/>
+    <ds:schemaRef ds:uri="http://schemas.openxmlformats.org/package/2006/metadata/core-properties"/>
+    <ds:schemaRef ds:uri="http://www.w3.org/XML/1998/namespace"/>
+    <ds:schemaRef ds:uri="http://purl.org/dc/dcmitype/"/>
+  </ds:schemaRefs>
+</ds:datastoreItem>
+</file>
+
 <file path=customXml/itemProps3.xml><?xml version="1.0" encoding="utf-8"?>
 <ds:datastoreItem xmlns:ds="http://schemas.openxmlformats.org/officeDocument/2006/customXml" ds:itemID="{BB82CC63-55FC-4D22-9ED3-DB88AF6228E1}">
   <ds:schemaRefs>

</xml_diff>